<commit_message>
feat: create a pdf version of proof
</commit_message>
<xml_diff>
--- a/images-for-proof.pptx
+++ b/images-for-proof.pptx
@@ -105,6 +105,11 @@
       </a:defRPr>
     </a:lvl9pPr>
   </p:defaultTextStyle>
+  <p:extLst>
+    <p:ext uri="{EFAFB233-063F-42B5-8137-9DF3F51BA10A}">
+      <p15:sldGuideLst xmlns:p15="http://schemas.microsoft.com/office/powerpoint/2012/main"/>
+    </p:ext>
+  </p:extLst>
 </p:presentation>
 </file>
 
@@ -4400,10 +4405,10 @@
       </p:grpSpPr>
       <p:sp>
         <p:nvSpPr>
-          <p:cNvPr id="2" name="Oval 1">
-            <a:extLst>
-              <a:ext uri="{FF2B5EF4-FFF2-40B4-BE49-F238E27FC236}">
-                <a16:creationId xmlns:a16="http://schemas.microsoft.com/office/drawing/2014/main" id="{CC64F687-7660-175A-B8D1-600624F17D89}"/>
+          <p:cNvPr id="5" name="Oval 4">
+            <a:extLst>
+              <a:ext uri="{FF2B5EF4-FFF2-40B4-BE49-F238E27FC236}">
+                <a16:creationId xmlns:a16="http://schemas.microsoft.com/office/drawing/2014/main" id="{E647D604-AEA9-AD2F-ED25-7CEAA0605509}"/>
               </a:ext>
             </a:extLst>
           </p:cNvPr>
@@ -4412,7 +4417,7 @@
         </p:nvSpPr>
         <p:spPr>
           <a:xfrm>
-            <a:off x="5115104" y="3510810"/>
+            <a:off x="3698380" y="3516055"/>
             <a:ext cx="274320" cy="274320"/>
           </a:xfrm>
           <a:prstGeom prst="ellipse">
@@ -4452,10 +4457,10 @@
       </p:sp>
       <p:sp>
         <p:nvSpPr>
-          <p:cNvPr id="3" name="Oval 2">
-            <a:extLst>
-              <a:ext uri="{FF2B5EF4-FFF2-40B4-BE49-F238E27FC236}">
-                <a16:creationId xmlns:a16="http://schemas.microsoft.com/office/drawing/2014/main" id="{23CF49B9-C552-361B-55DB-20C0B7998E6D}"/>
+          <p:cNvPr id="6" name="Oval 5">
+            <a:extLst>
+              <a:ext uri="{FF2B5EF4-FFF2-40B4-BE49-F238E27FC236}">
+                <a16:creationId xmlns:a16="http://schemas.microsoft.com/office/drawing/2014/main" id="{5CB29627-146C-B9A3-C685-02C6E69F328E}"/>
               </a:ext>
             </a:extLst>
           </p:cNvPr>
@@ -4464,7 +4469,7 @@
         </p:nvSpPr>
         <p:spPr>
           <a:xfrm>
-            <a:off x="5663744" y="3510810"/>
+            <a:off x="4139255" y="3516055"/>
             <a:ext cx="274320" cy="274320"/>
           </a:xfrm>
           <a:prstGeom prst="ellipse">
@@ -4504,10 +4509,10 @@
       </p:sp>
       <p:sp>
         <p:nvSpPr>
-          <p:cNvPr id="4" name="Oval 3">
-            <a:extLst>
-              <a:ext uri="{FF2B5EF4-FFF2-40B4-BE49-F238E27FC236}">
-                <a16:creationId xmlns:a16="http://schemas.microsoft.com/office/drawing/2014/main" id="{86EA66DF-08B7-D20E-5CB9-D521A4C08363}"/>
+          <p:cNvPr id="7" name="Oval 6">
+            <a:extLst>
+              <a:ext uri="{FF2B5EF4-FFF2-40B4-BE49-F238E27FC236}">
+                <a16:creationId xmlns:a16="http://schemas.microsoft.com/office/drawing/2014/main" id="{0E920BBA-BFA8-BBFE-A1FF-95FB164B7BFC}"/>
               </a:ext>
             </a:extLst>
           </p:cNvPr>
@@ -4516,7 +4521,7 @@
         </p:nvSpPr>
         <p:spPr>
           <a:xfrm>
-            <a:off x="5389424" y="3106218"/>
+            <a:off x="3698380" y="3112022"/>
             <a:ext cx="274320" cy="274320"/>
           </a:xfrm>
           <a:prstGeom prst="ellipse">
@@ -4527,6 +4532,7 @@
             <a:solidFill>
               <a:schemeClr val="tx1"/>
             </a:solidFill>
+            <a:prstDash val="dash"/>
           </a:ln>
         </p:spPr>
         <p:style>
@@ -4556,10 +4562,10 @@
       </p:sp>
       <p:sp>
         <p:nvSpPr>
-          <p:cNvPr id="5" name="Oval 4">
-            <a:extLst>
-              <a:ext uri="{FF2B5EF4-FFF2-40B4-BE49-F238E27FC236}">
-                <a16:creationId xmlns:a16="http://schemas.microsoft.com/office/drawing/2014/main" id="{E647D604-AEA9-AD2F-ED25-7CEAA0605509}"/>
+          <p:cNvPr id="8" name="Oval 7">
+            <a:extLst>
+              <a:ext uri="{FF2B5EF4-FFF2-40B4-BE49-F238E27FC236}">
+                <a16:creationId xmlns:a16="http://schemas.microsoft.com/office/drawing/2014/main" id="{5AE3FDA4-CF9B-D1BB-25B2-E5CC5382F63D}"/>
               </a:ext>
             </a:extLst>
           </p:cNvPr>
@@ -4568,163 +4574,7 @@
         </p:nvSpPr>
         <p:spPr>
           <a:xfrm>
-            <a:off x="6857988" y="3510251"/>
-            <a:ext cx="274320" cy="274320"/>
-          </a:xfrm>
-          <a:prstGeom prst="ellipse">
-            <a:avLst/>
-          </a:prstGeom>
-          <a:noFill/>
-          <a:ln>
-            <a:solidFill>
-              <a:schemeClr val="tx1"/>
-            </a:solidFill>
-          </a:ln>
-        </p:spPr>
-        <p:style>
-          <a:lnRef idx="2">
-            <a:schemeClr val="accent1">
-              <a:shade val="15000"/>
-            </a:schemeClr>
-          </a:lnRef>
-          <a:fillRef idx="1">
-            <a:schemeClr val="accent1"/>
-          </a:fillRef>
-          <a:effectRef idx="0">
-            <a:schemeClr val="accent1"/>
-          </a:effectRef>
-          <a:fontRef idx="minor">
-            <a:schemeClr val="lt1"/>
-          </a:fontRef>
-        </p:style>
-        <p:txBody>
-          <a:bodyPr rtlCol="0" anchor="ctr"/>
-          <a:lstStyle/>
-          <a:p>
-            <a:pPr algn="ctr"/>
-            <a:endParaRPr lang="en-US"/>
-          </a:p>
-        </p:txBody>
-      </p:sp>
-      <p:sp>
-        <p:nvSpPr>
-          <p:cNvPr id="6" name="Oval 5">
-            <a:extLst>
-              <a:ext uri="{FF2B5EF4-FFF2-40B4-BE49-F238E27FC236}">
-                <a16:creationId xmlns:a16="http://schemas.microsoft.com/office/drawing/2014/main" id="{5CB29627-146C-B9A3-C685-02C6E69F328E}"/>
-              </a:ext>
-            </a:extLst>
-          </p:cNvPr>
-          <p:cNvSpPr/>
-          <p:nvPr/>
-        </p:nvSpPr>
-        <p:spPr>
-          <a:xfrm>
-            <a:off x="7298863" y="3510251"/>
-            <a:ext cx="274320" cy="274320"/>
-          </a:xfrm>
-          <a:prstGeom prst="ellipse">
-            <a:avLst/>
-          </a:prstGeom>
-          <a:noFill/>
-          <a:ln>
-            <a:solidFill>
-              <a:schemeClr val="tx1"/>
-            </a:solidFill>
-          </a:ln>
-        </p:spPr>
-        <p:style>
-          <a:lnRef idx="2">
-            <a:schemeClr val="accent1">
-              <a:shade val="15000"/>
-            </a:schemeClr>
-          </a:lnRef>
-          <a:fillRef idx="1">
-            <a:schemeClr val="accent1"/>
-          </a:fillRef>
-          <a:effectRef idx="0">
-            <a:schemeClr val="accent1"/>
-          </a:effectRef>
-          <a:fontRef idx="minor">
-            <a:schemeClr val="lt1"/>
-          </a:fontRef>
-        </p:style>
-        <p:txBody>
-          <a:bodyPr rtlCol="0" anchor="ctr"/>
-          <a:lstStyle/>
-          <a:p>
-            <a:pPr algn="ctr"/>
-            <a:endParaRPr lang="en-US"/>
-          </a:p>
-        </p:txBody>
-      </p:sp>
-      <p:sp>
-        <p:nvSpPr>
-          <p:cNvPr id="7" name="Oval 6">
-            <a:extLst>
-              <a:ext uri="{FF2B5EF4-FFF2-40B4-BE49-F238E27FC236}">
-                <a16:creationId xmlns:a16="http://schemas.microsoft.com/office/drawing/2014/main" id="{0E920BBA-BFA8-BBFE-A1FF-95FB164B7BFC}"/>
-              </a:ext>
-            </a:extLst>
-          </p:cNvPr>
-          <p:cNvSpPr/>
-          <p:nvPr/>
-        </p:nvSpPr>
-        <p:spPr>
-          <a:xfrm>
-            <a:off x="6857988" y="3106218"/>
-            <a:ext cx="274320" cy="274320"/>
-          </a:xfrm>
-          <a:prstGeom prst="ellipse">
-            <a:avLst/>
-          </a:prstGeom>
-          <a:noFill/>
-          <a:ln>
-            <a:solidFill>
-              <a:schemeClr val="tx1"/>
-            </a:solidFill>
-          </a:ln>
-        </p:spPr>
-        <p:style>
-          <a:lnRef idx="2">
-            <a:schemeClr val="accent1">
-              <a:shade val="15000"/>
-            </a:schemeClr>
-          </a:lnRef>
-          <a:fillRef idx="1">
-            <a:schemeClr val="accent1"/>
-          </a:fillRef>
-          <a:effectRef idx="0">
-            <a:schemeClr val="accent1"/>
-          </a:effectRef>
-          <a:fontRef idx="minor">
-            <a:schemeClr val="lt1"/>
-          </a:fontRef>
-        </p:style>
-        <p:txBody>
-          <a:bodyPr rtlCol="0" anchor="ctr"/>
-          <a:lstStyle/>
-          <a:p>
-            <a:pPr algn="ctr"/>
-            <a:endParaRPr lang="en-US"/>
-          </a:p>
-        </p:txBody>
-      </p:sp>
-      <p:sp>
-        <p:nvSpPr>
-          <p:cNvPr id="8" name="Oval 7">
-            <a:extLst>
-              <a:ext uri="{FF2B5EF4-FFF2-40B4-BE49-F238E27FC236}">
-                <a16:creationId xmlns:a16="http://schemas.microsoft.com/office/drawing/2014/main" id="{5AE3FDA4-CF9B-D1BB-25B2-E5CC5382F63D}"/>
-              </a:ext>
-            </a:extLst>
-          </p:cNvPr>
-          <p:cNvSpPr/>
-          <p:nvPr/>
-        </p:nvSpPr>
-        <p:spPr>
-          <a:xfrm>
-            <a:off x="7298863" y="3106218"/>
+            <a:off x="4139255" y="3112022"/>
             <a:ext cx="274320" cy="274320"/>
           </a:xfrm>
           <a:prstGeom prst="ellipse">
@@ -4880,7 +4730,7 @@
         </p:nvSpPr>
         <p:spPr>
           <a:xfrm>
-            <a:off x="4832104" y="2737466"/>
+            <a:off x="3327982" y="2756952"/>
             <a:ext cx="1371600" cy="1411550"/>
           </a:xfrm>
           <a:prstGeom prst="rect">
@@ -4932,7 +4782,7 @@
         </p:nvSpPr>
         <p:spPr>
           <a:xfrm>
-            <a:off x="6519503" y="2737466"/>
+            <a:off x="5015381" y="2756952"/>
             <a:ext cx="1371600" cy="1411550"/>
           </a:xfrm>
           <a:prstGeom prst="rect">
@@ -4970,8 +4820,8 @@
           </a:p>
         </p:txBody>
       </p:sp>
-      <mc:AlternateContent xmlns:mc="http://schemas.openxmlformats.org/markup-compatibility/2006">
-        <mc:Choice xmlns:a14="http://schemas.microsoft.com/office/drawing/2010/main" Requires="a14">
+      <mc:AlternateContent xmlns:mc="http://schemas.openxmlformats.org/markup-compatibility/2006" xmlns:a14="http://schemas.microsoft.com/office/drawing/2010/main">
+        <mc:Choice Requires="a14">
           <p:sp>
             <p:nvSpPr>
               <p:cNvPr id="22" name="TextBox 21">
@@ -5027,7 +4877,7 @@
             </p:txBody>
           </p:sp>
         </mc:Choice>
-        <mc:Fallback>
+        <mc:Fallback xmlns="">
           <p:sp>
             <p:nvSpPr>
               <p:cNvPr id="22" name="TextBox 21">
@@ -5072,114 +4922,12 @@
           </p:sp>
         </mc:Fallback>
       </mc:AlternateContent>
-      <mc:AlternateContent xmlns:mc="http://schemas.openxmlformats.org/markup-compatibility/2006">
-        <mc:Choice xmlns:a14="http://schemas.microsoft.com/office/drawing/2010/main" Requires="a14">
-          <p:sp>
-            <p:nvSpPr>
-              <p:cNvPr id="23" name="TextBox 22">
-                <a:extLst>
-                  <a:ext uri="{FF2B5EF4-FFF2-40B4-BE49-F238E27FC236}">
-                    <a16:creationId xmlns:a16="http://schemas.microsoft.com/office/drawing/2014/main" id="{E51FBBAF-C932-286A-6ED8-BC74CED1E384}"/>
-                  </a:ext>
-                </a:extLst>
-              </p:cNvPr>
-              <p:cNvSpPr txBox="1"/>
-              <p:nvPr/>
-            </p:nvSpPr>
-            <p:spPr>
-              <a:xfrm>
-                <a:off x="2335961" y="2041864"/>
-                <a:ext cx="1371600" cy="646331"/>
-              </a:xfrm>
-              <a:prstGeom prst="rect">
-                <a:avLst/>
-              </a:prstGeom>
-              <a:noFill/>
-            </p:spPr>
-            <p:txBody>
-              <a:bodyPr wrap="square" rtlCol="0">
-                <a:spAutoFit/>
-              </a:bodyPr>
-              <a:lstStyle/>
-              <a:p>
-                <a:r>
-                  <a:rPr lang="en-US" dirty="0"/>
-                  <a:t>Household </a:t>
-                </a:r>
-              </a:p>
-              <a:p>
-                <a:pPr algn="ctr"/>
-                <a14:m>
-                  <m:oMathPara xmlns:m="http://schemas.openxmlformats.org/officeDocument/2006/math">
-                    <m:oMathParaPr>
-                      <m:jc m:val="centerGroup"/>
-                    </m:oMathParaPr>
-                    <m:oMath xmlns:m="http://schemas.openxmlformats.org/officeDocument/2006/math">
-                      <m:r>
-                        <a:rPr lang="en-US" i="1" dirty="0" smtClean="0">
-                          <a:latin typeface="Cambria Math" panose="02040503050406030204" pitchFamily="18" charset="0"/>
-                        </a:rPr>
-                        <m:t>2</m:t>
-                      </m:r>
-                    </m:oMath>
-                  </m:oMathPara>
-                </a14:m>
-                <a:endParaRPr lang="en-US" dirty="0"/>
-              </a:p>
-            </p:txBody>
-          </p:sp>
-        </mc:Choice>
-        <mc:Fallback>
-          <p:sp>
-            <p:nvSpPr>
-              <p:cNvPr id="23" name="TextBox 22">
-                <a:extLst>
-                  <a:ext uri="{FF2B5EF4-FFF2-40B4-BE49-F238E27FC236}">
-                    <a16:creationId xmlns:a16="http://schemas.microsoft.com/office/drawing/2014/main" id="{E51FBBAF-C932-286A-6ED8-BC74CED1E384}"/>
-                  </a:ext>
-                </a:extLst>
-              </p:cNvPr>
-              <p:cNvSpPr txBox="1">
-                <a:spLocks noRot="1" noChangeAspect="1" noMove="1" noResize="1" noEditPoints="1" noAdjustHandles="1" noChangeArrowheads="1" noChangeShapeType="1" noTextEdit="1"/>
-              </p:cNvSpPr>
-              <p:nvPr/>
-            </p:nvSpPr>
-            <p:spPr>
-              <a:xfrm>
-                <a:off x="2335961" y="2041864"/>
-                <a:ext cx="1371600" cy="646331"/>
-              </a:xfrm>
-              <a:prstGeom prst="rect">
-                <a:avLst/>
-              </a:prstGeom>
-              <a:blipFill>
-                <a:blip r:embed="rId3"/>
-                <a:stretch>
-                  <a:fillRect l="-3556" t="-4717"/>
-                </a:stretch>
-              </a:blipFill>
-            </p:spPr>
-            <p:txBody>
-              <a:bodyPr/>
-              <a:lstStyle/>
-              <a:p>
-                <a:r>
-                  <a:rPr lang="en-US">
-                    <a:noFill/>
-                  </a:rPr>
-                  <a:t> </a:t>
-                </a:r>
-              </a:p>
-            </p:txBody>
-          </p:sp>
-        </mc:Fallback>
-      </mc:AlternateContent>
-      <p:sp>
-        <p:nvSpPr>
-          <p:cNvPr id="24" name="Oval 23">
-            <a:extLst>
-              <a:ext uri="{FF2B5EF4-FFF2-40B4-BE49-F238E27FC236}">
-                <a16:creationId xmlns:a16="http://schemas.microsoft.com/office/drawing/2014/main" id="{4C60EEEC-E799-1CF1-E17B-70A66E3EB7B9}"/>
+      <p:sp>
+        <p:nvSpPr>
+          <p:cNvPr id="28" name="Oval 27">
+            <a:extLst>
+              <a:ext uri="{FF2B5EF4-FFF2-40B4-BE49-F238E27FC236}">
+                <a16:creationId xmlns:a16="http://schemas.microsoft.com/office/drawing/2014/main" id="{CC316D0F-1E3F-0AC1-8498-6B6B7B441C09}"/>
               </a:ext>
             </a:extLst>
           </p:cNvPr>
@@ -5188,7 +4936,7 @@
         </p:nvSpPr>
         <p:spPr>
           <a:xfrm>
-            <a:off x="2575164" y="3496569"/>
+            <a:off x="8243118" y="3113897"/>
             <a:ext cx="274320" cy="274320"/>
           </a:xfrm>
           <a:prstGeom prst="ellipse">
@@ -5228,10 +4976,10 @@
       </p:sp>
       <p:sp>
         <p:nvSpPr>
-          <p:cNvPr id="25" name="Oval 24">
-            <a:extLst>
-              <a:ext uri="{FF2B5EF4-FFF2-40B4-BE49-F238E27FC236}">
-                <a16:creationId xmlns:a16="http://schemas.microsoft.com/office/drawing/2014/main" id="{6AC31528-E768-F86B-9EA7-A0CD70146B87}"/>
+          <p:cNvPr id="29" name="Oval 28">
+            <a:extLst>
+              <a:ext uri="{FF2B5EF4-FFF2-40B4-BE49-F238E27FC236}">
+                <a16:creationId xmlns:a16="http://schemas.microsoft.com/office/drawing/2014/main" id="{A0E501C7-7609-C152-F7DA-6246A484AC5C}"/>
               </a:ext>
             </a:extLst>
           </p:cNvPr>
@@ -5240,7 +4988,7 @@
         </p:nvSpPr>
         <p:spPr>
           <a:xfrm>
-            <a:off x="3123804" y="3496569"/>
+            <a:off x="8243118" y="3516055"/>
             <a:ext cx="274320" cy="274320"/>
           </a:xfrm>
           <a:prstGeom prst="ellipse">
@@ -5280,10 +5028,10 @@
       </p:sp>
       <p:sp>
         <p:nvSpPr>
-          <p:cNvPr id="26" name="Oval 25">
-            <a:extLst>
-              <a:ext uri="{FF2B5EF4-FFF2-40B4-BE49-F238E27FC236}">
-                <a16:creationId xmlns:a16="http://schemas.microsoft.com/office/drawing/2014/main" id="{B049E7EC-2351-FC17-D470-88108BC8342A}"/>
+          <p:cNvPr id="30" name="Rectangle 29">
+            <a:extLst>
+              <a:ext uri="{FF2B5EF4-FFF2-40B4-BE49-F238E27FC236}">
+                <a16:creationId xmlns:a16="http://schemas.microsoft.com/office/drawing/2014/main" id="{98BE49F1-CCD6-D225-667A-B348B47E213C}"/>
               </a:ext>
             </a:extLst>
           </p:cNvPr>
@@ -5292,59 +5040,7 @@
         </p:nvSpPr>
         <p:spPr>
           <a:xfrm>
-            <a:off x="2849484" y="3091977"/>
-            <a:ext cx="274320" cy="274320"/>
-          </a:xfrm>
-          <a:prstGeom prst="ellipse">
-            <a:avLst/>
-          </a:prstGeom>
-          <a:noFill/>
-          <a:ln>
-            <a:solidFill>
-              <a:schemeClr val="tx1"/>
-            </a:solidFill>
-          </a:ln>
-        </p:spPr>
-        <p:style>
-          <a:lnRef idx="2">
-            <a:schemeClr val="accent1">
-              <a:shade val="15000"/>
-            </a:schemeClr>
-          </a:lnRef>
-          <a:fillRef idx="1">
-            <a:schemeClr val="accent1"/>
-          </a:fillRef>
-          <a:effectRef idx="0">
-            <a:schemeClr val="accent1"/>
-          </a:effectRef>
-          <a:fontRef idx="minor">
-            <a:schemeClr val="lt1"/>
-          </a:fontRef>
-        </p:style>
-        <p:txBody>
-          <a:bodyPr rtlCol="0" anchor="ctr"/>
-          <a:lstStyle/>
-          <a:p>
-            <a:pPr algn="ctr"/>
-            <a:endParaRPr lang="en-US"/>
-          </a:p>
-        </p:txBody>
-      </p:sp>
-      <p:sp>
-        <p:nvSpPr>
-          <p:cNvPr id="27" name="Rectangle 26">
-            <a:extLst>
-              <a:ext uri="{FF2B5EF4-FFF2-40B4-BE49-F238E27FC236}">
-                <a16:creationId xmlns:a16="http://schemas.microsoft.com/office/drawing/2014/main" id="{AFD054AA-7032-0925-88C0-1342F52301B4}"/>
-              </a:ext>
-            </a:extLst>
-          </p:cNvPr>
-          <p:cNvSpPr/>
-          <p:nvPr/>
-        </p:nvSpPr>
-        <p:spPr>
-          <a:xfrm>
-            <a:off x="2292164" y="2723225"/>
+            <a:off x="7709914" y="2742711"/>
             <a:ext cx="1371600" cy="1411550"/>
           </a:xfrm>
           <a:prstGeom prst="rect">
@@ -5382,162 +5078,6 @@
           </a:p>
         </p:txBody>
       </p:sp>
-      <p:sp>
-        <p:nvSpPr>
-          <p:cNvPr id="28" name="Oval 27">
-            <a:extLst>
-              <a:ext uri="{FF2B5EF4-FFF2-40B4-BE49-F238E27FC236}">
-                <a16:creationId xmlns:a16="http://schemas.microsoft.com/office/drawing/2014/main" id="{CC316D0F-1E3F-0AC1-8498-6B6B7B441C09}"/>
-              </a:ext>
-            </a:extLst>
-          </p:cNvPr>
-          <p:cNvSpPr/>
-          <p:nvPr/>
-        </p:nvSpPr>
-        <p:spPr>
-          <a:xfrm>
-            <a:off x="9747240" y="3094411"/>
-            <a:ext cx="274320" cy="274320"/>
-          </a:xfrm>
-          <a:prstGeom prst="ellipse">
-            <a:avLst/>
-          </a:prstGeom>
-          <a:noFill/>
-          <a:ln>
-            <a:solidFill>
-              <a:schemeClr val="tx1"/>
-            </a:solidFill>
-          </a:ln>
-        </p:spPr>
-        <p:style>
-          <a:lnRef idx="2">
-            <a:schemeClr val="accent1">
-              <a:shade val="15000"/>
-            </a:schemeClr>
-          </a:lnRef>
-          <a:fillRef idx="1">
-            <a:schemeClr val="accent1"/>
-          </a:fillRef>
-          <a:effectRef idx="0">
-            <a:schemeClr val="accent1"/>
-          </a:effectRef>
-          <a:fontRef idx="minor">
-            <a:schemeClr val="lt1"/>
-          </a:fontRef>
-        </p:style>
-        <p:txBody>
-          <a:bodyPr rtlCol="0" anchor="ctr"/>
-          <a:lstStyle/>
-          <a:p>
-            <a:pPr algn="ctr"/>
-            <a:endParaRPr lang="en-US"/>
-          </a:p>
-        </p:txBody>
-      </p:sp>
-      <p:sp>
-        <p:nvSpPr>
-          <p:cNvPr id="29" name="Oval 28">
-            <a:extLst>
-              <a:ext uri="{FF2B5EF4-FFF2-40B4-BE49-F238E27FC236}">
-                <a16:creationId xmlns:a16="http://schemas.microsoft.com/office/drawing/2014/main" id="{A0E501C7-7609-C152-F7DA-6246A484AC5C}"/>
-              </a:ext>
-            </a:extLst>
-          </p:cNvPr>
-          <p:cNvSpPr/>
-          <p:nvPr/>
-        </p:nvSpPr>
-        <p:spPr>
-          <a:xfrm>
-            <a:off x="9747240" y="3496569"/>
-            <a:ext cx="274320" cy="274320"/>
-          </a:xfrm>
-          <a:prstGeom prst="ellipse">
-            <a:avLst/>
-          </a:prstGeom>
-          <a:noFill/>
-          <a:ln>
-            <a:solidFill>
-              <a:schemeClr val="tx1"/>
-            </a:solidFill>
-          </a:ln>
-        </p:spPr>
-        <p:style>
-          <a:lnRef idx="2">
-            <a:schemeClr val="accent1">
-              <a:shade val="15000"/>
-            </a:schemeClr>
-          </a:lnRef>
-          <a:fillRef idx="1">
-            <a:schemeClr val="accent1"/>
-          </a:fillRef>
-          <a:effectRef idx="0">
-            <a:schemeClr val="accent1"/>
-          </a:effectRef>
-          <a:fontRef idx="minor">
-            <a:schemeClr val="lt1"/>
-          </a:fontRef>
-        </p:style>
-        <p:txBody>
-          <a:bodyPr rtlCol="0" anchor="ctr"/>
-          <a:lstStyle/>
-          <a:p>
-            <a:pPr algn="ctr"/>
-            <a:endParaRPr lang="en-US"/>
-          </a:p>
-        </p:txBody>
-      </p:sp>
-      <p:sp>
-        <p:nvSpPr>
-          <p:cNvPr id="30" name="Rectangle 29">
-            <a:extLst>
-              <a:ext uri="{FF2B5EF4-FFF2-40B4-BE49-F238E27FC236}">
-                <a16:creationId xmlns:a16="http://schemas.microsoft.com/office/drawing/2014/main" id="{98BE49F1-CCD6-D225-667A-B348B47E213C}"/>
-              </a:ext>
-            </a:extLst>
-          </p:cNvPr>
-          <p:cNvSpPr/>
-          <p:nvPr/>
-        </p:nvSpPr>
-        <p:spPr>
-          <a:xfrm>
-            <a:off x="9214036" y="2723225"/>
-            <a:ext cx="1371600" cy="1411550"/>
-          </a:xfrm>
-          <a:prstGeom prst="rect">
-            <a:avLst/>
-          </a:prstGeom>
-          <a:noFill/>
-          <a:ln>
-            <a:solidFill>
-              <a:schemeClr val="tx1"/>
-            </a:solidFill>
-          </a:ln>
-        </p:spPr>
-        <p:style>
-          <a:lnRef idx="2">
-            <a:schemeClr val="accent1">
-              <a:shade val="15000"/>
-            </a:schemeClr>
-          </a:lnRef>
-          <a:fillRef idx="1">
-            <a:schemeClr val="accent1"/>
-          </a:fillRef>
-          <a:effectRef idx="0">
-            <a:schemeClr val="accent1"/>
-          </a:effectRef>
-          <a:fontRef idx="minor">
-            <a:schemeClr val="lt1"/>
-          </a:fontRef>
-        </p:style>
-        <p:txBody>
-          <a:bodyPr rtlCol="0" anchor="ctr"/>
-          <a:lstStyle/>
-          <a:p>
-            <a:pPr algn="ctr"/>
-            <a:endParaRPr lang="en-US"/>
-          </a:p>
-        </p:txBody>
-      </p:sp>
       <mc:AlternateContent xmlns:mc="http://schemas.openxmlformats.org/markup-compatibility/2006">
         <mc:Choice xmlns:a14="http://schemas.microsoft.com/office/drawing/2010/main" Requires="a14">
           <p:sp>
@@ -5554,7 +5094,7 @@
             </p:nvSpPr>
             <p:spPr>
               <a:xfrm>
-                <a:off x="9214036" y="2038199"/>
+                <a:off x="7709914" y="2057685"/>
                 <a:ext cx="1371600" cy="646331"/>
               </a:xfrm>
               <a:prstGeom prst="rect">
@@ -5612,16 +5152,16 @@
             </p:nvSpPr>
             <p:spPr>
               <a:xfrm>
-                <a:off x="9214036" y="2038199"/>
+                <a:off x="7709914" y="2057685"/>
                 <a:ext cx="1371600" cy="646331"/>
               </a:xfrm>
               <a:prstGeom prst="rect">
                 <a:avLst/>
               </a:prstGeom>
               <a:blipFill>
-                <a:blip r:embed="rId4"/>
+                <a:blip r:embed="rId3"/>
                 <a:stretch>
-                  <a:fillRect l="-3556" t="-3774"/>
+                  <a:fillRect l="-4000" t="-4717"/>
                 </a:stretch>
               </a:blipFill>
             </p:spPr>
@@ -5656,7 +5196,7 @@
             </p:nvSpPr>
             <p:spPr>
               <a:xfrm>
-                <a:off x="4840784" y="2050414"/>
+                <a:off x="3336662" y="2069900"/>
                 <a:ext cx="1371600" cy="646331"/>
               </a:xfrm>
               <a:prstGeom prst="rect">
@@ -5714,16 +5254,16 @@
             </p:nvSpPr>
             <p:spPr>
               <a:xfrm>
-                <a:off x="4840784" y="2050414"/>
+                <a:off x="3336662" y="2069900"/>
                 <a:ext cx="1371600" cy="646331"/>
               </a:xfrm>
               <a:prstGeom prst="rect">
                 <a:avLst/>
               </a:prstGeom>
               <a:blipFill>
-                <a:blip r:embed="rId5"/>
+                <a:blip r:embed="rId4"/>
                 <a:stretch>
-                  <a:fillRect l="-3556" t="-3774"/>
+                  <a:fillRect l="-3556" t="-4717"/>
                 </a:stretch>
               </a:blipFill>
             </p:spPr>
@@ -5758,7 +5298,7 @@
             </p:nvSpPr>
             <p:spPr>
               <a:xfrm>
-                <a:off x="6559527" y="2045301"/>
+                <a:off x="5055405" y="2064787"/>
                 <a:ext cx="1371600" cy="646331"/>
               </a:xfrm>
               <a:prstGeom prst="rect">
@@ -5814,14 +5354,14 @@
             </p:nvSpPr>
             <p:spPr>
               <a:xfrm>
-                <a:off x="6559527" y="2045301"/>
+                <a:off x="5055405" y="2064787"/>
                 <a:ext cx="1371600" cy="646331"/>
               </a:xfrm>
               <a:prstGeom prst="rect">
                 <a:avLst/>
               </a:prstGeom>
               <a:blipFill>
-                <a:blip r:embed="rId6"/>
+                <a:blip r:embed="rId5"/>
                 <a:stretch>
                   <a:fillRect l="-3556" t="-4717" b="-15094"/>
                 </a:stretch>
@@ -5856,7 +5396,7 @@
         </p:nvSpPr>
         <p:spPr>
           <a:xfrm>
-            <a:off x="3672444" y="2847000"/>
+            <a:off x="2168322" y="2866486"/>
             <a:ext cx="923525" cy="923330"/>
           </a:xfrm>
           <a:prstGeom prst="rect">
@@ -5892,7 +5432,7 @@
         </p:nvSpPr>
         <p:spPr>
           <a:xfrm>
-            <a:off x="8106387" y="2861241"/>
+            <a:off x="6602265" y="2880727"/>
             <a:ext cx="923525" cy="923330"/>
           </a:xfrm>
           <a:prstGeom prst="rect">
@@ -5914,12 +5454,704 @@
           </a:p>
         </p:txBody>
       </p:sp>
-      <p:sp>
-        <p:nvSpPr>
-          <p:cNvPr id="37" name="Oval 36">
-            <a:extLst>
-              <a:ext uri="{FF2B5EF4-FFF2-40B4-BE49-F238E27FC236}">
-                <a16:creationId xmlns:a16="http://schemas.microsoft.com/office/drawing/2014/main" id="{A515B0EC-4FCC-53CA-DAF5-1BDE1B390B82}"/>
+      <mc:AlternateContent xmlns:mc="http://schemas.openxmlformats.org/markup-compatibility/2006">
+        <mc:Choice xmlns:a14="http://schemas.microsoft.com/office/drawing/2010/main" Requires="a14">
+          <p:sp>
+            <p:nvSpPr>
+              <p:cNvPr id="9" name="TextBox 8">
+                <a:extLst>
+                  <a:ext uri="{FF2B5EF4-FFF2-40B4-BE49-F238E27FC236}">
+                    <a16:creationId xmlns:a16="http://schemas.microsoft.com/office/drawing/2014/main" id="{0A1E69AB-3A34-24E1-441A-3C342625F5EB}"/>
+                  </a:ext>
+                </a:extLst>
+              </p:cNvPr>
+              <p:cNvSpPr txBox="1"/>
+              <p:nvPr/>
+            </p:nvSpPr>
+            <p:spPr>
+              <a:xfrm>
+                <a:off x="659561" y="1203559"/>
+                <a:ext cx="3179140" cy="553998"/>
+              </a:xfrm>
+              <a:prstGeom prst="rect">
+                <a:avLst/>
+              </a:prstGeom>
+              <a:noFill/>
+            </p:spPr>
+            <p:txBody>
+              <a:bodyPr wrap="none" lIns="0" tIns="0" rIns="0" bIns="0" rtlCol="0">
+                <a:spAutoFit/>
+              </a:bodyPr>
+              <a:lstStyle/>
+              <a:p>
+                <a14:m>
+                  <m:oMathPara xmlns:m="http://schemas.openxmlformats.org/officeDocument/2006/math">
+                    <m:oMathParaPr>
+                      <m:jc m:val="centerGroup"/>
+                    </m:oMathParaPr>
+                    <m:oMath xmlns:m="http://schemas.openxmlformats.org/officeDocument/2006/math">
+                      <m:sSub>
+                        <m:sSubPr>
+                          <m:ctrlPr>
+                            <a:rPr lang="en-US" sz="3600" b="0" i="1" smtClean="0">
+                              <a:latin typeface="Cambria Math" panose="02040503050406030204" pitchFamily="18" charset="0"/>
+                            </a:rPr>
+                          </m:ctrlPr>
+                        </m:sSubPr>
+                        <m:e>
+                          <m:r>
+                            <a:rPr lang="en-US" sz="3600" b="0" i="1" smtClean="0">
+                              <a:latin typeface="Cambria Math" panose="02040503050406030204" pitchFamily="18" charset="0"/>
+                            </a:rPr>
+                            <m:t>𝑚</m:t>
+                          </m:r>
+                        </m:e>
+                        <m:sub>
+                          <m:r>
+                            <a:rPr lang="en-US" sz="3600" b="0" i="1" smtClean="0">
+                              <a:latin typeface="Cambria Math" panose="02040503050406030204" pitchFamily="18" charset="0"/>
+                            </a:rPr>
+                            <m:t>𝑘</m:t>
+                          </m:r>
+                          <m:r>
+                            <a:rPr lang="en-US" sz="3600" b="0" i="1" smtClean="0">
+                              <a:latin typeface="Cambria Math" panose="02040503050406030204" pitchFamily="18" charset="0"/>
+                            </a:rPr>
+                            <m:t>+1</m:t>
+                          </m:r>
+                        </m:sub>
+                      </m:sSub>
+                      <m:r>
+                        <a:rPr lang="en-US" sz="3600" b="0" i="1" smtClean="0">
+                          <a:latin typeface="Cambria Math" panose="02040503050406030204" pitchFamily="18" charset="0"/>
+                        </a:rPr>
+                        <m:t>=</m:t>
+                      </m:r>
+                      <m:sSub>
+                        <m:sSubPr>
+                          <m:ctrlPr>
+                            <a:rPr lang="en-US" sz="3600" b="0" i="1" smtClean="0">
+                              <a:latin typeface="Cambria Math" panose="02040503050406030204" pitchFamily="18" charset="0"/>
+                            </a:rPr>
+                          </m:ctrlPr>
+                        </m:sSubPr>
+                        <m:e>
+                          <m:r>
+                            <a:rPr lang="en-US" sz="3600" b="0" i="1" smtClean="0">
+                              <a:latin typeface="Cambria Math" panose="02040503050406030204" pitchFamily="18" charset="0"/>
+                            </a:rPr>
+                            <m:t>𝑚</m:t>
+                          </m:r>
+                        </m:e>
+                        <m:sub>
+                          <m:r>
+                            <a:rPr lang="en-US" sz="3600" b="0" i="1" smtClean="0">
+                              <a:latin typeface="Cambria Math" panose="02040503050406030204" pitchFamily="18" charset="0"/>
+                            </a:rPr>
+                            <m:t>𝑘</m:t>
+                          </m:r>
+                        </m:sub>
+                      </m:sSub>
+                      <m:r>
+                        <a:rPr lang="en-US" sz="3600" b="0" i="1" smtClean="0">
+                          <a:latin typeface="Cambria Math" panose="02040503050406030204" pitchFamily="18" charset="0"/>
+                        </a:rPr>
+                        <m:t>−1</m:t>
+                      </m:r>
+                    </m:oMath>
+                  </m:oMathPara>
+                </a14:m>
+                <a:endParaRPr lang="en-US" sz="3600" dirty="0"/>
+              </a:p>
+            </p:txBody>
+          </p:sp>
+        </mc:Choice>
+        <mc:Fallback>
+          <p:sp>
+            <p:nvSpPr>
+              <p:cNvPr id="9" name="TextBox 8">
+                <a:extLst>
+                  <a:ext uri="{FF2B5EF4-FFF2-40B4-BE49-F238E27FC236}">
+                    <a16:creationId xmlns:a16="http://schemas.microsoft.com/office/drawing/2014/main" id="{0A1E69AB-3A34-24E1-441A-3C342625F5EB}"/>
+                  </a:ext>
+                </a:extLst>
+              </p:cNvPr>
+              <p:cNvSpPr txBox="1">
+                <a:spLocks noRot="1" noChangeAspect="1" noMove="1" noResize="1" noEditPoints="1" noAdjustHandles="1" noChangeArrowheads="1" noChangeShapeType="1" noTextEdit="1"/>
+              </p:cNvSpPr>
+              <p:nvPr/>
+            </p:nvSpPr>
+            <p:spPr>
+              <a:xfrm>
+                <a:off x="659561" y="1203559"/>
+                <a:ext cx="3179140" cy="553998"/>
+              </a:xfrm>
+              <a:prstGeom prst="rect">
+                <a:avLst/>
+              </a:prstGeom>
+              <a:blipFill>
+                <a:blip r:embed="rId6"/>
+                <a:stretch>
+                  <a:fillRect/>
+                </a:stretch>
+              </a:blipFill>
+            </p:spPr>
+            <p:txBody>
+              <a:bodyPr/>
+              <a:lstStyle/>
+              <a:p>
+                <a:r>
+                  <a:rPr lang="en-US">
+                    <a:noFill/>
+                  </a:rPr>
+                  <a:t> </a:t>
+                </a:r>
+              </a:p>
+            </p:txBody>
+          </p:sp>
+        </mc:Fallback>
+      </mc:AlternateContent>
+      <mc:AlternateContent xmlns:mc="http://schemas.openxmlformats.org/markup-compatibility/2006">
+        <mc:Choice xmlns:a14="http://schemas.microsoft.com/office/drawing/2010/main" Requires="a14">
+          <p:sp>
+            <p:nvSpPr>
+              <p:cNvPr id="10" name="TextBox 9">
+                <a:extLst>
+                  <a:ext uri="{FF2B5EF4-FFF2-40B4-BE49-F238E27FC236}">
+                    <a16:creationId xmlns:a16="http://schemas.microsoft.com/office/drawing/2014/main" id="{169BCDE5-C572-2C0D-A2A9-57067DCE3181}"/>
+                  </a:ext>
+                </a:extLst>
+              </p:cNvPr>
+              <p:cNvSpPr txBox="1"/>
+              <p:nvPr/>
+            </p:nvSpPr>
+            <p:spPr>
+              <a:xfrm>
+                <a:off x="573106" y="3804057"/>
+                <a:ext cx="991648" cy="338554"/>
+              </a:xfrm>
+              <a:prstGeom prst="rect">
+                <a:avLst/>
+              </a:prstGeom>
+              <a:noFill/>
+            </p:spPr>
+            <p:txBody>
+              <a:bodyPr wrap="square" rtlCol="0">
+                <a:spAutoFit/>
+              </a:bodyPr>
+              <a:lstStyle/>
+              <a:p>
+                <a:pPr algn="ctr"/>
+                <a14:m>
+                  <m:oMathPara xmlns:m="http://schemas.openxmlformats.org/officeDocument/2006/math">
+                    <m:oMathParaPr>
+                      <m:jc m:val="centerGroup"/>
+                    </m:oMathParaPr>
+                    <m:oMath xmlns:m="http://schemas.openxmlformats.org/officeDocument/2006/math">
+                      <m:sSub>
+                        <m:sSubPr>
+                          <m:ctrlPr>
+                            <a:rPr lang="en-US" sz="1600" b="0" i="1" smtClean="0">
+                              <a:latin typeface="Cambria Math" panose="02040503050406030204" pitchFamily="18" charset="0"/>
+                            </a:rPr>
+                          </m:ctrlPr>
+                        </m:sSubPr>
+                        <m:e>
+                          <m:r>
+                            <a:rPr lang="en-US" sz="1600" b="0" i="1" smtClean="0">
+                              <a:latin typeface="Cambria Math" panose="02040503050406030204" pitchFamily="18" charset="0"/>
+                            </a:rPr>
+                            <m:t>𝑚</m:t>
+                          </m:r>
+                        </m:e>
+                        <m:sub>
+                          <m:r>
+                            <a:rPr lang="en-US" sz="1600" b="0" i="1" smtClean="0">
+                              <a:latin typeface="Cambria Math" panose="02040503050406030204" pitchFamily="18" charset="0"/>
+                            </a:rPr>
+                            <m:t>1</m:t>
+                          </m:r>
+                        </m:sub>
+                      </m:sSub>
+                      <m:r>
+                        <a:rPr lang="en-US" sz="1600" b="0" i="1" smtClean="0">
+                          <a:latin typeface="Cambria Math" panose="02040503050406030204" pitchFamily="18" charset="0"/>
+                        </a:rPr>
+                        <m:t>=1</m:t>
+                      </m:r>
+                    </m:oMath>
+                  </m:oMathPara>
+                </a14:m>
+                <a:endParaRPr lang="en-US" sz="1600" dirty="0"/>
+              </a:p>
+            </p:txBody>
+          </p:sp>
+        </mc:Choice>
+        <mc:Fallback>
+          <p:sp>
+            <p:nvSpPr>
+              <p:cNvPr id="10" name="TextBox 9">
+                <a:extLst>
+                  <a:ext uri="{FF2B5EF4-FFF2-40B4-BE49-F238E27FC236}">
+                    <a16:creationId xmlns:a16="http://schemas.microsoft.com/office/drawing/2014/main" id="{169BCDE5-C572-2C0D-A2A9-57067DCE3181}"/>
+                  </a:ext>
+                </a:extLst>
+              </p:cNvPr>
+              <p:cNvSpPr txBox="1">
+                <a:spLocks noRot="1" noChangeAspect="1" noMove="1" noResize="1" noEditPoints="1" noAdjustHandles="1" noChangeArrowheads="1" noChangeShapeType="1" noTextEdit="1"/>
+              </p:cNvSpPr>
+              <p:nvPr/>
+            </p:nvSpPr>
+            <p:spPr>
+              <a:xfrm>
+                <a:off x="573106" y="3804057"/>
+                <a:ext cx="991648" cy="338554"/>
+              </a:xfrm>
+              <a:prstGeom prst="rect">
+                <a:avLst/>
+              </a:prstGeom>
+              <a:blipFill>
+                <a:blip r:embed="rId7"/>
+                <a:stretch>
+                  <a:fillRect/>
+                </a:stretch>
+              </a:blipFill>
+            </p:spPr>
+            <p:txBody>
+              <a:bodyPr/>
+              <a:lstStyle/>
+              <a:p>
+                <a:r>
+                  <a:rPr lang="en-US">
+                    <a:noFill/>
+                  </a:rPr>
+                  <a:t> </a:t>
+                </a:r>
+              </a:p>
+            </p:txBody>
+          </p:sp>
+        </mc:Fallback>
+      </mc:AlternateContent>
+      <mc:AlternateContent xmlns:mc="http://schemas.openxmlformats.org/markup-compatibility/2006">
+        <mc:Choice xmlns:a14="http://schemas.microsoft.com/office/drawing/2010/main" Requires="a14">
+          <p:sp>
+            <p:nvSpPr>
+              <p:cNvPr id="12" name="TextBox 11">
+                <a:extLst>
+                  <a:ext uri="{FF2B5EF4-FFF2-40B4-BE49-F238E27FC236}">
+                    <a16:creationId xmlns:a16="http://schemas.microsoft.com/office/drawing/2014/main" id="{7343C678-C484-3EDD-1DC6-CE58A7DE1CC3}"/>
+                  </a:ext>
+                </a:extLst>
+              </p:cNvPr>
+              <p:cNvSpPr txBox="1"/>
+              <p:nvPr/>
+            </p:nvSpPr>
+            <p:spPr>
+              <a:xfrm>
+                <a:off x="3284767" y="3870669"/>
+                <a:ext cx="991648" cy="338554"/>
+              </a:xfrm>
+              <a:prstGeom prst="rect">
+                <a:avLst/>
+              </a:prstGeom>
+              <a:noFill/>
+            </p:spPr>
+            <p:txBody>
+              <a:bodyPr wrap="square" rtlCol="0">
+                <a:spAutoFit/>
+              </a:bodyPr>
+              <a:lstStyle/>
+              <a:p>
+                <a:pPr algn="ctr"/>
+                <a14:m>
+                  <m:oMathPara xmlns:m="http://schemas.openxmlformats.org/officeDocument/2006/math">
+                    <m:oMathParaPr>
+                      <m:jc m:val="centerGroup"/>
+                    </m:oMathParaPr>
+                    <m:oMath xmlns:m="http://schemas.openxmlformats.org/officeDocument/2006/math">
+                      <m:sSub>
+                        <m:sSubPr>
+                          <m:ctrlPr>
+                            <a:rPr lang="en-US" sz="1600" b="0" i="1" smtClean="0">
+                              <a:latin typeface="Cambria Math" panose="02040503050406030204" pitchFamily="18" charset="0"/>
+                            </a:rPr>
+                          </m:ctrlPr>
+                        </m:sSubPr>
+                        <m:e>
+                          <m:r>
+                            <a:rPr lang="en-US" sz="1600" b="0" i="1" smtClean="0">
+                              <a:latin typeface="Cambria Math" panose="02040503050406030204" pitchFamily="18" charset="0"/>
+                            </a:rPr>
+                            <m:t>𝑚</m:t>
+                          </m:r>
+                        </m:e>
+                        <m:sub>
+                          <m:r>
+                            <a:rPr lang="en-US" sz="1600" b="0" i="1" smtClean="0">
+                              <a:latin typeface="Cambria Math" panose="02040503050406030204" pitchFamily="18" charset="0"/>
+                            </a:rPr>
+                            <m:t>𝑘</m:t>
+                          </m:r>
+                        </m:sub>
+                      </m:sSub>
+                      <m:r>
+                        <a:rPr lang="en-US" sz="1600" b="0" i="1" smtClean="0">
+                          <a:latin typeface="Cambria Math" panose="02040503050406030204" pitchFamily="18" charset="0"/>
+                        </a:rPr>
+                        <m:t>=4</m:t>
+                      </m:r>
+                    </m:oMath>
+                  </m:oMathPara>
+                </a14:m>
+                <a:endParaRPr lang="en-US" sz="1600" dirty="0"/>
+              </a:p>
+            </p:txBody>
+          </p:sp>
+        </mc:Choice>
+        <mc:Fallback>
+          <p:sp>
+            <p:nvSpPr>
+              <p:cNvPr id="12" name="TextBox 11">
+                <a:extLst>
+                  <a:ext uri="{FF2B5EF4-FFF2-40B4-BE49-F238E27FC236}">
+                    <a16:creationId xmlns:a16="http://schemas.microsoft.com/office/drawing/2014/main" id="{7343C678-C484-3EDD-1DC6-CE58A7DE1CC3}"/>
+                  </a:ext>
+                </a:extLst>
+              </p:cNvPr>
+              <p:cNvSpPr txBox="1">
+                <a:spLocks noRot="1" noChangeAspect="1" noMove="1" noResize="1" noEditPoints="1" noAdjustHandles="1" noChangeArrowheads="1" noChangeShapeType="1" noTextEdit="1"/>
+              </p:cNvSpPr>
+              <p:nvPr/>
+            </p:nvSpPr>
+            <p:spPr>
+              <a:xfrm>
+                <a:off x="3284767" y="3870669"/>
+                <a:ext cx="991648" cy="338554"/>
+              </a:xfrm>
+              <a:prstGeom prst="rect">
+                <a:avLst/>
+              </a:prstGeom>
+              <a:blipFill>
+                <a:blip r:embed="rId8"/>
+                <a:stretch>
+                  <a:fillRect/>
+                </a:stretch>
+              </a:blipFill>
+            </p:spPr>
+            <p:txBody>
+              <a:bodyPr/>
+              <a:lstStyle/>
+              <a:p>
+                <a:r>
+                  <a:rPr lang="en-US">
+                    <a:noFill/>
+                  </a:rPr>
+                  <a:t> </a:t>
+                </a:r>
+              </a:p>
+            </p:txBody>
+          </p:sp>
+        </mc:Fallback>
+      </mc:AlternateContent>
+      <mc:AlternateContent xmlns:mc="http://schemas.openxmlformats.org/markup-compatibility/2006">
+        <mc:Choice xmlns:a14="http://schemas.microsoft.com/office/drawing/2010/main" Requires="a14">
+          <p:sp>
+            <p:nvSpPr>
+              <p:cNvPr id="13" name="TextBox 12">
+                <a:extLst>
+                  <a:ext uri="{FF2B5EF4-FFF2-40B4-BE49-F238E27FC236}">
+                    <a16:creationId xmlns:a16="http://schemas.microsoft.com/office/drawing/2014/main" id="{6E6E8C74-9189-2902-D126-B02BFEA8D3F7}"/>
+                  </a:ext>
+                </a:extLst>
+              </p:cNvPr>
+              <p:cNvSpPr txBox="1"/>
+              <p:nvPr/>
+            </p:nvSpPr>
+            <p:spPr>
+              <a:xfrm>
+                <a:off x="4948931" y="3842893"/>
+                <a:ext cx="1266338" cy="338554"/>
+              </a:xfrm>
+              <a:prstGeom prst="rect">
+                <a:avLst/>
+              </a:prstGeom>
+              <a:noFill/>
+            </p:spPr>
+            <p:txBody>
+              <a:bodyPr wrap="square" rtlCol="0">
+                <a:spAutoFit/>
+              </a:bodyPr>
+              <a:lstStyle/>
+              <a:p>
+                <a:pPr algn="ctr"/>
+                <a14:m>
+                  <m:oMathPara xmlns:m="http://schemas.openxmlformats.org/officeDocument/2006/math">
+                    <m:oMathParaPr>
+                      <m:jc m:val="centerGroup"/>
+                    </m:oMathParaPr>
+                    <m:oMath xmlns:m="http://schemas.openxmlformats.org/officeDocument/2006/math">
+                      <m:sSub>
+                        <m:sSubPr>
+                          <m:ctrlPr>
+                            <a:rPr lang="en-US" sz="1600" b="0" i="1" smtClean="0">
+                              <a:latin typeface="Cambria Math" panose="02040503050406030204" pitchFamily="18" charset="0"/>
+                            </a:rPr>
+                          </m:ctrlPr>
+                        </m:sSubPr>
+                        <m:e>
+                          <m:r>
+                            <a:rPr lang="en-US" sz="1600" b="0" i="1" smtClean="0">
+                              <a:latin typeface="Cambria Math" panose="02040503050406030204" pitchFamily="18" charset="0"/>
+                            </a:rPr>
+                            <m:t>𝑚</m:t>
+                          </m:r>
+                        </m:e>
+                        <m:sub>
+                          <m:r>
+                            <a:rPr lang="en-US" sz="1600" b="0" i="1" smtClean="0">
+                              <a:latin typeface="Cambria Math" panose="02040503050406030204" pitchFamily="18" charset="0"/>
+                            </a:rPr>
+                            <m:t>𝑘</m:t>
+                          </m:r>
+                          <m:r>
+                            <a:rPr lang="en-US" sz="1600" b="0" i="1" smtClean="0">
+                              <a:latin typeface="Cambria Math" panose="02040503050406030204" pitchFamily="18" charset="0"/>
+                            </a:rPr>
+                            <m:t>+1</m:t>
+                          </m:r>
+                        </m:sub>
+                      </m:sSub>
+                      <m:r>
+                        <a:rPr lang="en-US" sz="1600" b="0" i="1" smtClean="0">
+                          <a:latin typeface="Cambria Math" panose="02040503050406030204" pitchFamily="18" charset="0"/>
+                        </a:rPr>
+                        <m:t>=3</m:t>
+                      </m:r>
+                    </m:oMath>
+                  </m:oMathPara>
+                </a14:m>
+                <a:endParaRPr lang="en-US" sz="1600" dirty="0"/>
+              </a:p>
+            </p:txBody>
+          </p:sp>
+        </mc:Choice>
+        <mc:Fallback>
+          <p:sp>
+            <p:nvSpPr>
+              <p:cNvPr id="13" name="TextBox 12">
+                <a:extLst>
+                  <a:ext uri="{FF2B5EF4-FFF2-40B4-BE49-F238E27FC236}">
+                    <a16:creationId xmlns:a16="http://schemas.microsoft.com/office/drawing/2014/main" id="{6E6E8C74-9189-2902-D126-B02BFEA8D3F7}"/>
+                  </a:ext>
+                </a:extLst>
+              </p:cNvPr>
+              <p:cNvSpPr txBox="1">
+                <a:spLocks noRot="1" noChangeAspect="1" noMove="1" noResize="1" noEditPoints="1" noAdjustHandles="1" noChangeArrowheads="1" noChangeShapeType="1" noTextEdit="1"/>
+              </p:cNvSpPr>
+              <p:nvPr/>
+            </p:nvSpPr>
+            <p:spPr>
+              <a:xfrm>
+                <a:off x="4948931" y="3842893"/>
+                <a:ext cx="1266338" cy="338554"/>
+              </a:xfrm>
+              <a:prstGeom prst="rect">
+                <a:avLst/>
+              </a:prstGeom>
+              <a:blipFill>
+                <a:blip r:embed="rId9"/>
+                <a:stretch>
+                  <a:fillRect/>
+                </a:stretch>
+              </a:blipFill>
+            </p:spPr>
+            <p:txBody>
+              <a:bodyPr/>
+              <a:lstStyle/>
+              <a:p>
+                <a:r>
+                  <a:rPr lang="en-US">
+                    <a:noFill/>
+                  </a:rPr>
+                  <a:t> </a:t>
+                </a:r>
+              </a:p>
+            </p:txBody>
+          </p:sp>
+        </mc:Fallback>
+      </mc:AlternateContent>
+      <mc:AlternateContent xmlns:mc="http://schemas.openxmlformats.org/markup-compatibility/2006">
+        <mc:Choice xmlns:a14="http://schemas.microsoft.com/office/drawing/2010/main" Requires="a14">
+          <p:sp>
+            <p:nvSpPr>
+              <p:cNvPr id="14" name="TextBox 13">
+                <a:extLst>
+                  <a:ext uri="{FF2B5EF4-FFF2-40B4-BE49-F238E27FC236}">
+                    <a16:creationId xmlns:a16="http://schemas.microsoft.com/office/drawing/2014/main" id="{540803A6-FB32-B6F7-3390-5CE259E2BB26}"/>
+                  </a:ext>
+                </a:extLst>
+              </p:cNvPr>
+              <p:cNvSpPr txBox="1"/>
+              <p:nvPr/>
+            </p:nvSpPr>
+            <p:spPr>
+              <a:xfrm>
+                <a:off x="7609949" y="3823543"/>
+                <a:ext cx="1266338" cy="338554"/>
+              </a:xfrm>
+              <a:prstGeom prst="rect">
+                <a:avLst/>
+              </a:prstGeom>
+              <a:noFill/>
+            </p:spPr>
+            <p:txBody>
+              <a:bodyPr wrap="square" rtlCol="0">
+                <a:spAutoFit/>
+              </a:bodyPr>
+              <a:lstStyle/>
+              <a:p>
+                <a:pPr algn="ctr"/>
+                <a14:m>
+                  <m:oMathPara xmlns:m="http://schemas.openxmlformats.org/officeDocument/2006/math">
+                    <m:oMathParaPr>
+                      <m:jc m:val="centerGroup"/>
+                    </m:oMathParaPr>
+                    <m:oMath xmlns:m="http://schemas.openxmlformats.org/officeDocument/2006/math">
+                      <m:sSub>
+                        <m:sSubPr>
+                          <m:ctrlPr>
+                            <a:rPr lang="en-US" sz="1600" b="0" i="1" smtClean="0">
+                              <a:latin typeface="Cambria Math" panose="02040503050406030204" pitchFamily="18" charset="0"/>
+                            </a:rPr>
+                          </m:ctrlPr>
+                        </m:sSubPr>
+                        <m:e>
+                          <m:r>
+                            <a:rPr lang="en-US" sz="1600" b="0" i="1" smtClean="0">
+                              <a:latin typeface="Cambria Math" panose="02040503050406030204" pitchFamily="18" charset="0"/>
+                            </a:rPr>
+                            <m:t>𝑚</m:t>
+                          </m:r>
+                        </m:e>
+                        <m:sub>
+                          <m:r>
+                            <a:rPr lang="en-US" sz="1600" b="0" i="1" smtClean="0">
+                              <a:latin typeface="Cambria Math" panose="02040503050406030204" pitchFamily="18" charset="0"/>
+                            </a:rPr>
+                            <m:t>𝐻</m:t>
+                          </m:r>
+                        </m:sub>
+                      </m:sSub>
+                      <m:r>
+                        <a:rPr lang="en-US" sz="1600" b="0" i="1" smtClean="0">
+                          <a:latin typeface="Cambria Math" panose="02040503050406030204" pitchFamily="18" charset="0"/>
+                        </a:rPr>
+                        <m:t>=1</m:t>
+                      </m:r>
+                    </m:oMath>
+                  </m:oMathPara>
+                </a14:m>
+                <a:endParaRPr lang="en-US" sz="1600" dirty="0"/>
+              </a:p>
+            </p:txBody>
+          </p:sp>
+        </mc:Choice>
+        <mc:Fallback>
+          <p:sp>
+            <p:nvSpPr>
+              <p:cNvPr id="14" name="TextBox 13">
+                <a:extLst>
+                  <a:ext uri="{FF2B5EF4-FFF2-40B4-BE49-F238E27FC236}">
+                    <a16:creationId xmlns:a16="http://schemas.microsoft.com/office/drawing/2014/main" id="{540803A6-FB32-B6F7-3390-5CE259E2BB26}"/>
+                  </a:ext>
+                </a:extLst>
+              </p:cNvPr>
+              <p:cNvSpPr txBox="1">
+                <a:spLocks noRot="1" noChangeAspect="1" noMove="1" noResize="1" noEditPoints="1" noAdjustHandles="1" noChangeArrowheads="1" noChangeShapeType="1" noTextEdit="1"/>
+              </p:cNvSpPr>
+              <p:nvPr/>
+            </p:nvSpPr>
+            <p:spPr>
+              <a:xfrm>
+                <a:off x="7609949" y="3823543"/>
+                <a:ext cx="1266338" cy="338554"/>
+              </a:xfrm>
+              <a:prstGeom prst="rect">
+                <a:avLst/>
+              </a:prstGeom>
+              <a:blipFill>
+                <a:blip r:embed="rId10"/>
+                <a:stretch>
+                  <a:fillRect/>
+                </a:stretch>
+              </a:blipFill>
+            </p:spPr>
+            <p:txBody>
+              <a:bodyPr/>
+              <a:lstStyle/>
+              <a:p>
+                <a:r>
+                  <a:rPr lang="en-US">
+                    <a:noFill/>
+                  </a:rPr>
+                  <a:t> </a:t>
+                </a:r>
+              </a:p>
+            </p:txBody>
+          </p:sp>
+        </mc:Fallback>
+      </mc:AlternateContent>
+      <p:cxnSp>
+        <p:nvCxnSpPr>
+          <p:cNvPr id="18" name="Connector: Curved 17">
+            <a:extLst>
+              <a:ext uri="{FF2B5EF4-FFF2-40B4-BE49-F238E27FC236}">
+                <a16:creationId xmlns:a16="http://schemas.microsoft.com/office/drawing/2014/main" id="{6F6EC37A-7B8D-5EE1-9036-B9AC9A239628}"/>
+              </a:ext>
+            </a:extLst>
+          </p:cNvPr>
+          <p:cNvCxnSpPr>
+            <a:cxnSpLocks/>
+            <a:stCxn id="7" idx="0"/>
+            <a:endCxn id="41" idx="0"/>
+          </p:cNvCxnSpPr>
+          <p:nvPr/>
+        </p:nvCxnSpPr>
+        <p:spPr>
+          <a:xfrm rot="16200000" flipH="1">
+            <a:off x="4644319" y="2303243"/>
+            <a:ext cx="13682" cy="1631241"/>
+          </a:xfrm>
+          <a:prstGeom prst="curvedConnector3">
+            <a:avLst>
+              <a:gd name="adj1" fmla="val -1670808"/>
+            </a:avLst>
+          </a:prstGeom>
+          <a:ln>
+            <a:tailEnd type="triangle"/>
+          </a:ln>
+        </p:spPr>
+        <p:style>
+          <a:lnRef idx="2">
+            <a:schemeClr val="accent1"/>
+          </a:lnRef>
+          <a:fillRef idx="0">
+            <a:schemeClr val="accent1"/>
+          </a:fillRef>
+          <a:effectRef idx="1">
+            <a:schemeClr val="accent1"/>
+          </a:effectRef>
+          <a:fontRef idx="minor">
+            <a:schemeClr val="tx1"/>
+          </a:fontRef>
+        </p:style>
+      </p:cxnSp>
+      <p:sp>
+        <p:nvSpPr>
+          <p:cNvPr id="39" name="Oval 38">
+            <a:extLst>
+              <a:ext uri="{FF2B5EF4-FFF2-40B4-BE49-F238E27FC236}">
+                <a16:creationId xmlns:a16="http://schemas.microsoft.com/office/drawing/2014/main" id="{BEE29219-9B59-C3E9-7F30-17E6B37021F0}"/>
               </a:ext>
             </a:extLst>
           </p:cNvPr>
@@ -5928,8 +6160,8 @@
         </p:nvSpPr>
         <p:spPr>
           <a:xfrm>
-            <a:off x="5380744" y="5282727"/>
-            <a:ext cx="457200" cy="457200"/>
+            <a:off x="5329621" y="3529737"/>
+            <a:ext cx="274320" cy="274320"/>
           </a:xfrm>
           <a:prstGeom prst="ellipse">
             <a:avLst/>
@@ -5939,7 +6171,167 @@
             <a:solidFill>
               <a:schemeClr val="tx1"/>
             </a:solidFill>
-            <a:prstDash val="dash"/>
+          </a:ln>
+        </p:spPr>
+        <p:style>
+          <a:lnRef idx="2">
+            <a:schemeClr val="accent1">
+              <a:shade val="15000"/>
+            </a:schemeClr>
+          </a:lnRef>
+          <a:fillRef idx="1">
+            <a:schemeClr val="accent1"/>
+          </a:fillRef>
+          <a:effectRef idx="0">
+            <a:schemeClr val="accent1"/>
+          </a:effectRef>
+          <a:fontRef idx="minor">
+            <a:schemeClr val="lt1"/>
+          </a:fontRef>
+        </p:style>
+        <p:txBody>
+          <a:bodyPr rtlCol="0" anchor="ctr"/>
+          <a:lstStyle/>
+          <a:p>
+            <a:pPr algn="ctr"/>
+            <a:endParaRPr lang="en-US"/>
+          </a:p>
+        </p:txBody>
+      </p:sp>
+      <p:sp>
+        <p:nvSpPr>
+          <p:cNvPr id="40" name="Oval 39">
+            <a:extLst>
+              <a:ext uri="{FF2B5EF4-FFF2-40B4-BE49-F238E27FC236}">
+                <a16:creationId xmlns:a16="http://schemas.microsoft.com/office/drawing/2014/main" id="{68DBDA80-11CA-1532-8D3B-4088C1DC0ED5}"/>
+              </a:ext>
+            </a:extLst>
+          </p:cNvPr>
+          <p:cNvSpPr/>
+          <p:nvPr/>
+        </p:nvSpPr>
+        <p:spPr>
+          <a:xfrm>
+            <a:off x="5770496" y="3529737"/>
+            <a:ext cx="274320" cy="274320"/>
+          </a:xfrm>
+          <a:prstGeom prst="ellipse">
+            <a:avLst/>
+          </a:prstGeom>
+          <a:noFill/>
+          <a:ln>
+            <a:solidFill>
+              <a:schemeClr val="tx1"/>
+            </a:solidFill>
+          </a:ln>
+        </p:spPr>
+        <p:style>
+          <a:lnRef idx="2">
+            <a:schemeClr val="accent1">
+              <a:shade val="15000"/>
+            </a:schemeClr>
+          </a:lnRef>
+          <a:fillRef idx="1">
+            <a:schemeClr val="accent1"/>
+          </a:fillRef>
+          <a:effectRef idx="0">
+            <a:schemeClr val="accent1"/>
+          </a:effectRef>
+          <a:fontRef idx="minor">
+            <a:schemeClr val="lt1"/>
+          </a:fontRef>
+        </p:style>
+        <p:txBody>
+          <a:bodyPr rtlCol="0" anchor="ctr"/>
+          <a:lstStyle/>
+          <a:p>
+            <a:pPr algn="ctr"/>
+            <a:endParaRPr lang="en-US"/>
+          </a:p>
+        </p:txBody>
+      </p:sp>
+      <p:sp>
+        <p:nvSpPr>
+          <p:cNvPr id="41" name="Oval 40">
+            <a:extLst>
+              <a:ext uri="{FF2B5EF4-FFF2-40B4-BE49-F238E27FC236}">
+                <a16:creationId xmlns:a16="http://schemas.microsoft.com/office/drawing/2014/main" id="{89C91348-3D3D-6FFC-4A6C-68979E41DEE8}"/>
+              </a:ext>
+            </a:extLst>
+          </p:cNvPr>
+          <p:cNvSpPr/>
+          <p:nvPr/>
+        </p:nvSpPr>
+        <p:spPr>
+          <a:xfrm>
+            <a:off x="5329621" y="3125704"/>
+            <a:ext cx="274320" cy="274320"/>
+          </a:xfrm>
+          <a:prstGeom prst="ellipse">
+            <a:avLst/>
+          </a:prstGeom>
+          <a:solidFill>
+            <a:schemeClr val="bg2">
+              <a:lumMod val="90000"/>
+            </a:schemeClr>
+          </a:solidFill>
+          <a:ln>
+            <a:solidFill>
+              <a:schemeClr val="tx1"/>
+            </a:solidFill>
+            <a:prstDash val="solid"/>
+          </a:ln>
+        </p:spPr>
+        <p:style>
+          <a:lnRef idx="2">
+            <a:schemeClr val="accent1">
+              <a:shade val="15000"/>
+            </a:schemeClr>
+          </a:lnRef>
+          <a:fillRef idx="1">
+            <a:schemeClr val="accent1"/>
+          </a:fillRef>
+          <a:effectRef idx="0">
+            <a:schemeClr val="accent1"/>
+          </a:effectRef>
+          <a:fontRef idx="minor">
+            <a:schemeClr val="lt1"/>
+          </a:fontRef>
+        </p:style>
+        <p:txBody>
+          <a:bodyPr rtlCol="0" anchor="ctr"/>
+          <a:lstStyle/>
+          <a:p>
+            <a:pPr algn="ctr"/>
+            <a:endParaRPr lang="en-US"/>
+          </a:p>
+        </p:txBody>
+      </p:sp>
+      <p:sp>
+        <p:nvSpPr>
+          <p:cNvPr id="42" name="Oval 41">
+            <a:extLst>
+              <a:ext uri="{FF2B5EF4-FFF2-40B4-BE49-F238E27FC236}">
+                <a16:creationId xmlns:a16="http://schemas.microsoft.com/office/drawing/2014/main" id="{806C4772-8DDB-3576-7807-E99F6967B99A}"/>
+              </a:ext>
+            </a:extLst>
+          </p:cNvPr>
+          <p:cNvSpPr/>
+          <p:nvPr/>
+        </p:nvSpPr>
+        <p:spPr>
+          <a:xfrm>
+            <a:off x="5770496" y="3125704"/>
+            <a:ext cx="274320" cy="274320"/>
+          </a:xfrm>
+          <a:prstGeom prst="ellipse">
+            <a:avLst/>
+          </a:prstGeom>
+          <a:noFill/>
+          <a:ln>
+            <a:solidFill>
+              <a:schemeClr val="tx1"/>
+            </a:solidFill>
           </a:ln>
         </p:spPr>
         <p:style>

</xml_diff>

<commit_message>
feat: remove title from within figure 1.3 image
</commit_message>
<xml_diff>
--- a/images-for-proof.pptx
+++ b/images-for-proof.pptx
@@ -7,6 +7,7 @@
   <p:sldIdLst>
     <p:sldId id="257" r:id="rId2"/>
     <p:sldId id="258" r:id="rId3"/>
+    <p:sldId id="259" r:id="rId4"/>
   </p:sldIdLst>
   <p:sldSz cx="12192000" cy="6858000"/>
   <p:notesSz cx="6858000" cy="9144000"/>
@@ -6127,19 +6128,19 @@
               <a:gd name="adj1" fmla="val -1670808"/>
             </a:avLst>
           </a:prstGeom>
-          <a:ln>
+          <a:ln w="38100">
             <a:tailEnd type="triangle"/>
           </a:ln>
         </p:spPr>
         <p:style>
           <a:lnRef idx="2">
-            <a:schemeClr val="accent1"/>
+            <a:schemeClr val="accent4"/>
           </a:lnRef>
           <a:fillRef idx="0">
-            <a:schemeClr val="accent1"/>
+            <a:schemeClr val="accent4"/>
           </a:fillRef>
           <a:effectRef idx="1">
-            <a:schemeClr val="accent1"/>
+            <a:schemeClr val="accent4"/>
           </a:effectRef>
           <a:fontRef idx="minor">
             <a:schemeClr val="tx1"/>
@@ -6363,6 +6364,66 @@
     <p:extLst>
       <p:ext uri="{BB962C8B-B14F-4D97-AF65-F5344CB8AC3E}">
         <p14:creationId xmlns:p14="http://schemas.microsoft.com/office/powerpoint/2010/main" val="2696115594"/>
+      </p:ext>
+    </p:extLst>
+  </p:cSld>
+  <p:clrMapOvr>
+    <a:masterClrMapping/>
+  </p:clrMapOvr>
+</p:sld>
+</file>
+
+<file path=ppt/slides/slide3.xml><?xml version="1.0" encoding="utf-8"?>
+<p:sld xmlns:a="http://schemas.openxmlformats.org/drawingml/2006/main" xmlns:r="http://schemas.openxmlformats.org/officeDocument/2006/relationships" xmlns:p="http://schemas.openxmlformats.org/presentationml/2006/main">
+  <p:cSld>
+    <p:spTree>
+      <p:nvGrpSpPr>
+        <p:cNvPr id="1" name=""/>
+        <p:cNvGrpSpPr/>
+        <p:nvPr/>
+      </p:nvGrpSpPr>
+      <p:grpSpPr>
+        <a:xfrm>
+          <a:off x="0" y="0"/>
+          <a:ext cx="0" cy="0"/>
+          <a:chOff x="0" y="0"/>
+          <a:chExt cx="0" cy="0"/>
+        </a:xfrm>
+      </p:grpSpPr>
+      <p:pic>
+        <p:nvPicPr>
+          <p:cNvPr id="3" name="Picture 2">
+            <a:extLst>
+              <a:ext uri="{FF2B5EF4-FFF2-40B4-BE49-F238E27FC236}">
+                <a16:creationId xmlns:a16="http://schemas.microsoft.com/office/drawing/2014/main" id="{5540239E-6D4F-4046-906C-371DDADAEF81}"/>
+              </a:ext>
+            </a:extLst>
+          </p:cNvPr>
+          <p:cNvPicPr>
+            <a:picLocks noChangeAspect="1"/>
+          </p:cNvPicPr>
+          <p:nvPr/>
+        </p:nvPicPr>
+        <p:blipFill>
+          <a:blip r:embed="rId2"/>
+          <a:stretch>
+            <a:fillRect/>
+          </a:stretch>
+        </p:blipFill>
+        <p:spPr>
+          <a:xfrm>
+            <a:off x="1834526" y="2331625"/>
+            <a:ext cx="8522947" cy="2194750"/>
+          </a:xfrm>
+          <a:prstGeom prst="rect">
+            <a:avLst/>
+          </a:prstGeom>
+        </p:spPr>
+      </p:pic>
+    </p:spTree>
+    <p:extLst>
+      <p:ext uri="{BB962C8B-B14F-4D97-AF65-F5344CB8AC3E}">
+        <p14:creationId xmlns:p14="http://schemas.microsoft.com/office/powerpoint/2010/main" val="3372185848"/>
       </p:ext>
     </p:extLst>
   </p:cSld>

</xml_diff>

<commit_message>
fix: correction to figure 1-3 (and improvement in clarity of intro)
</commit_message>
<xml_diff>
--- a/images-for-proof.pptx
+++ b/images-for-proof.pptx
@@ -265,7 +265,7 @@
           <a:p>
             <a:fld id="{80B7F96D-77AA-4333-BC36-470FA2610C7E}" type="datetimeFigureOut">
               <a:rPr lang="en-US" smtClean="0"/>
-              <a:t>3/19/2025</a:t>
+              <a:t>3/27/2025</a:t>
             </a:fld>
             <a:endParaRPr lang="en-US"/>
           </a:p>
@@ -463,7 +463,7 @@
           <a:p>
             <a:fld id="{80B7F96D-77AA-4333-BC36-470FA2610C7E}" type="datetimeFigureOut">
               <a:rPr lang="en-US" smtClean="0"/>
-              <a:t>3/19/2025</a:t>
+              <a:t>3/27/2025</a:t>
             </a:fld>
             <a:endParaRPr lang="en-US"/>
           </a:p>
@@ -671,7 +671,7 @@
           <a:p>
             <a:fld id="{80B7F96D-77AA-4333-BC36-470FA2610C7E}" type="datetimeFigureOut">
               <a:rPr lang="en-US" smtClean="0"/>
-              <a:t>3/19/2025</a:t>
+              <a:t>3/27/2025</a:t>
             </a:fld>
             <a:endParaRPr lang="en-US"/>
           </a:p>
@@ -869,7 +869,7 @@
           <a:p>
             <a:fld id="{80B7F96D-77AA-4333-BC36-470FA2610C7E}" type="datetimeFigureOut">
               <a:rPr lang="en-US" smtClean="0"/>
-              <a:t>3/19/2025</a:t>
+              <a:t>3/27/2025</a:t>
             </a:fld>
             <a:endParaRPr lang="en-US"/>
           </a:p>
@@ -1144,7 +1144,7 @@
           <a:p>
             <a:fld id="{80B7F96D-77AA-4333-BC36-470FA2610C7E}" type="datetimeFigureOut">
               <a:rPr lang="en-US" smtClean="0"/>
-              <a:t>3/19/2025</a:t>
+              <a:t>3/27/2025</a:t>
             </a:fld>
             <a:endParaRPr lang="en-US"/>
           </a:p>
@@ -1409,7 +1409,7 @@
           <a:p>
             <a:fld id="{80B7F96D-77AA-4333-BC36-470FA2610C7E}" type="datetimeFigureOut">
               <a:rPr lang="en-US" smtClean="0"/>
-              <a:t>3/19/2025</a:t>
+              <a:t>3/27/2025</a:t>
             </a:fld>
             <a:endParaRPr lang="en-US"/>
           </a:p>
@@ -1821,7 +1821,7 @@
           <a:p>
             <a:fld id="{80B7F96D-77AA-4333-BC36-470FA2610C7E}" type="datetimeFigureOut">
               <a:rPr lang="en-US" smtClean="0"/>
-              <a:t>3/19/2025</a:t>
+              <a:t>3/27/2025</a:t>
             </a:fld>
             <a:endParaRPr lang="en-US"/>
           </a:p>
@@ -1962,7 +1962,7 @@
           <a:p>
             <a:fld id="{80B7F96D-77AA-4333-BC36-470FA2610C7E}" type="datetimeFigureOut">
               <a:rPr lang="en-US" smtClean="0"/>
-              <a:t>3/19/2025</a:t>
+              <a:t>3/27/2025</a:t>
             </a:fld>
             <a:endParaRPr lang="en-US"/>
           </a:p>
@@ -2075,7 +2075,7 @@
           <a:p>
             <a:fld id="{80B7F96D-77AA-4333-BC36-470FA2610C7E}" type="datetimeFigureOut">
               <a:rPr lang="en-US" smtClean="0"/>
-              <a:t>3/19/2025</a:t>
+              <a:t>3/27/2025</a:t>
             </a:fld>
             <a:endParaRPr lang="en-US"/>
           </a:p>
@@ -2386,7 +2386,7 @@
           <a:p>
             <a:fld id="{80B7F96D-77AA-4333-BC36-470FA2610C7E}" type="datetimeFigureOut">
               <a:rPr lang="en-US" smtClean="0"/>
-              <a:t>3/19/2025</a:t>
+              <a:t>3/27/2025</a:t>
             </a:fld>
             <a:endParaRPr lang="en-US"/>
           </a:p>
@@ -2674,7 +2674,7 @@
           <a:p>
             <a:fld id="{80B7F96D-77AA-4333-BC36-470FA2610C7E}" type="datetimeFigureOut">
               <a:rPr lang="en-US" smtClean="0"/>
-              <a:t>3/19/2025</a:t>
+              <a:t>3/27/2025</a:t>
             </a:fld>
             <a:endParaRPr lang="en-US"/>
           </a:p>
@@ -2915,7 +2915,7 @@
           <a:p>
             <a:fld id="{80B7F96D-77AA-4333-BC36-470FA2610C7E}" type="datetimeFigureOut">
               <a:rPr lang="en-US" smtClean="0"/>
-              <a:t>3/19/2025</a:t>
+              <a:t>3/27/2025</a:t>
             </a:fld>
             <a:endParaRPr lang="en-US"/>
           </a:p>
@@ -4422,7 +4422,7 @@
         </p:nvSpPr>
         <p:spPr>
           <a:xfrm>
-            <a:off x="3698380" y="3516055"/>
+            <a:off x="3655253" y="3516055"/>
             <a:ext cx="274320" cy="274320"/>
           </a:xfrm>
           <a:prstGeom prst="ellipse">
@@ -4474,7 +4474,7 @@
         </p:nvSpPr>
         <p:spPr>
           <a:xfrm>
-            <a:off x="4139255" y="3516055"/>
+            <a:off x="4096128" y="3516055"/>
             <a:ext cx="274320" cy="274320"/>
           </a:xfrm>
           <a:prstGeom prst="ellipse">
@@ -4526,7 +4526,7 @@
         </p:nvSpPr>
         <p:spPr>
           <a:xfrm>
-            <a:off x="3698380" y="3112022"/>
+            <a:off x="3655253" y="3112022"/>
             <a:ext cx="274320" cy="274320"/>
           </a:xfrm>
           <a:prstGeom prst="ellipse">
@@ -4579,7 +4579,7 @@
         </p:nvSpPr>
         <p:spPr>
           <a:xfrm>
-            <a:off x="4139255" y="3112022"/>
+            <a:off x="4096128" y="3112022"/>
             <a:ext cx="274320" cy="274320"/>
           </a:xfrm>
           <a:prstGeom prst="ellipse">
@@ -5235,8 +5235,8 @@
           </p:sp>
         </mc:Fallback>
       </mc:AlternateContent>
-      <mc:AlternateContent xmlns:mc="http://schemas.openxmlformats.org/markup-compatibility/2006">
-        <mc:Choice xmlns:a14="http://schemas.microsoft.com/office/drawing/2010/main" Requires="a14">
+      <mc:AlternateContent xmlns:mc="http://schemas.openxmlformats.org/markup-compatibility/2006" xmlns:a14="http://schemas.microsoft.com/office/drawing/2010/main">
+        <mc:Choice Requires="a14">
           <p:sp>
             <p:nvSpPr>
               <p:cNvPr id="33" name="TextBox 32">
@@ -5298,7 +5298,7 @@
             </p:txBody>
           </p:sp>
         </mc:Choice>
-        <mc:Fallback>
+        <mc:Fallback xmlns="">
           <p:sp>
             <p:nvSpPr>
               <p:cNvPr id="33" name="TextBox 32">
@@ -5953,13 +5953,13 @@
           <p:nvPr/>
         </p:nvCxnSpPr>
         <p:spPr>
-          <a:xfrm rot="16200000" flipH="1">
-            <a:off x="4753640" y="2193922"/>
-            <a:ext cx="7700" cy="1843901"/>
+          <a:xfrm rot="5400000" flipH="1" flipV="1">
+            <a:off x="4626283" y="2278152"/>
+            <a:ext cx="12700" cy="1667741"/>
           </a:xfrm>
           <a:prstGeom prst="curvedConnector3">
             <a:avLst>
-              <a:gd name="adj1" fmla="val -6773571"/>
+              <a:gd name="adj1" fmla="val 3782606"/>
             </a:avLst>
           </a:prstGeom>
           <a:ln w="38100">
@@ -6035,10 +6035,10 @@
       </p:sp>
       <p:sp>
         <p:nvSpPr>
-          <p:cNvPr id="24" name="Oval 23">
-            <a:extLst>
-              <a:ext uri="{FF2B5EF4-FFF2-40B4-BE49-F238E27FC236}">
-                <a16:creationId xmlns:a16="http://schemas.microsoft.com/office/drawing/2014/main" id="{C14B0229-EB41-BB00-4429-03CF4383F885}"/>
+          <p:cNvPr id="26" name="Oval 25">
+            <a:extLst>
+              <a:ext uri="{FF2B5EF4-FFF2-40B4-BE49-F238E27FC236}">
+                <a16:creationId xmlns:a16="http://schemas.microsoft.com/office/drawing/2014/main" id="{F680068D-CFA7-8195-1FD5-25B8083522F9}"/>
               </a:ext>
             </a:extLst>
           </p:cNvPr>
@@ -6047,111 +6047,7 @@
         </p:nvSpPr>
         <p:spPr>
           <a:xfrm>
-            <a:off x="5329621" y="3529737"/>
-            <a:ext cx="274320" cy="274320"/>
-          </a:xfrm>
-          <a:prstGeom prst="ellipse">
-            <a:avLst/>
-          </a:prstGeom>
-          <a:noFill/>
-          <a:ln>
-            <a:solidFill>
-              <a:schemeClr val="tx1"/>
-            </a:solidFill>
-          </a:ln>
-        </p:spPr>
-        <p:style>
-          <a:lnRef idx="2">
-            <a:schemeClr val="accent1">
-              <a:shade val="15000"/>
-            </a:schemeClr>
-          </a:lnRef>
-          <a:fillRef idx="1">
-            <a:schemeClr val="accent1"/>
-          </a:fillRef>
-          <a:effectRef idx="0">
-            <a:schemeClr val="accent1"/>
-          </a:effectRef>
-          <a:fontRef idx="minor">
-            <a:schemeClr val="lt1"/>
-          </a:fontRef>
-        </p:style>
-        <p:txBody>
-          <a:bodyPr rtlCol="0" anchor="ctr"/>
-          <a:lstStyle/>
-          <a:p>
-            <a:pPr algn="ctr"/>
-            <a:endParaRPr lang="en-US"/>
-          </a:p>
-        </p:txBody>
-      </p:sp>
-      <p:sp>
-        <p:nvSpPr>
-          <p:cNvPr id="25" name="Oval 24">
-            <a:extLst>
-              <a:ext uri="{FF2B5EF4-FFF2-40B4-BE49-F238E27FC236}">
-                <a16:creationId xmlns:a16="http://schemas.microsoft.com/office/drawing/2014/main" id="{142EF08F-85FD-3E26-7E1F-CB3B142BCDF3}"/>
-              </a:ext>
-            </a:extLst>
-          </p:cNvPr>
-          <p:cNvSpPr/>
-          <p:nvPr/>
-        </p:nvSpPr>
-        <p:spPr>
-          <a:xfrm>
-            <a:off x="5770496" y="3529737"/>
-            <a:ext cx="274320" cy="274320"/>
-          </a:xfrm>
-          <a:prstGeom prst="ellipse">
-            <a:avLst/>
-          </a:prstGeom>
-          <a:noFill/>
-          <a:ln>
-            <a:solidFill>
-              <a:schemeClr val="tx1"/>
-            </a:solidFill>
-          </a:ln>
-        </p:spPr>
-        <p:style>
-          <a:lnRef idx="2">
-            <a:schemeClr val="accent1">
-              <a:shade val="15000"/>
-            </a:schemeClr>
-          </a:lnRef>
-          <a:fillRef idx="1">
-            <a:schemeClr val="accent1"/>
-          </a:fillRef>
-          <a:effectRef idx="0">
-            <a:schemeClr val="accent1"/>
-          </a:effectRef>
-          <a:fontRef idx="minor">
-            <a:schemeClr val="lt1"/>
-          </a:fontRef>
-        </p:style>
-        <p:txBody>
-          <a:bodyPr rtlCol="0" anchor="ctr"/>
-          <a:lstStyle/>
-          <a:p>
-            <a:pPr algn="ctr"/>
-            <a:endParaRPr lang="en-US"/>
-          </a:p>
-        </p:txBody>
-      </p:sp>
-      <p:sp>
-        <p:nvSpPr>
-          <p:cNvPr id="26" name="Oval 25">
-            <a:extLst>
-              <a:ext uri="{FF2B5EF4-FFF2-40B4-BE49-F238E27FC236}">
-                <a16:creationId xmlns:a16="http://schemas.microsoft.com/office/drawing/2014/main" id="{F680068D-CFA7-8195-1FD5-25B8083522F9}"/>
-              </a:ext>
-            </a:extLst>
-          </p:cNvPr>
-          <p:cNvSpPr/>
-          <p:nvPr/>
-        </p:nvSpPr>
-        <p:spPr>
-          <a:xfrm>
-            <a:off x="5542281" y="3119722"/>
+            <a:off x="5322994" y="3112022"/>
             <a:ext cx="274320" cy="274320"/>
           </a:xfrm>
           <a:prstGeom prst="ellipse">
@@ -6272,7 +6168,7 @@
                         <a:rPr lang="en-US" sz="1600" b="0" i="1" smtClean="0">
                           <a:latin typeface="Cambria Math" panose="02040503050406030204" pitchFamily="18" charset="0"/>
                         </a:rPr>
-                        <m:t>2</m:t>
+                        <m:t>3</m:t>
                       </m:r>
                     </m:oMath>
                   </m:oMathPara>
@@ -6322,19 +6218,13 @@
                         <a:rPr lang="en-US" sz="1600" b="0" i="1" smtClean="0">
                           <a:latin typeface="Cambria Math" panose="02040503050406030204" pitchFamily="18" charset="0"/>
                         </a:rPr>
-                        <m:t>′</m:t>
+                        <m:t>′=</m:t>
                       </m:r>
                       <m:r>
                         <a:rPr lang="en-US" sz="1600" b="0" i="1" smtClean="0">
                           <a:latin typeface="Cambria Math" panose="02040503050406030204" pitchFamily="18" charset="0"/>
                         </a:rPr>
-                        <m:t>=</m:t>
-                      </m:r>
-                      <m:r>
-                        <a:rPr lang="en-US" sz="1600" b="0" i="1" smtClean="0">
-                          <a:latin typeface="Cambria Math" panose="02040503050406030204" pitchFamily="18" charset="0"/>
-                        </a:rPr>
-                        <m:t>3</m:t>
+                        <m:t>4</m:t>
                       </m:r>
                     </m:oMath>
                   </m:oMathPara>
@@ -6389,8 +6279,8 @@
           </p:sp>
         </mc:Fallback>
       </mc:AlternateContent>
-      <mc:AlternateContent xmlns:mc="http://schemas.openxmlformats.org/markup-compatibility/2006">
-        <mc:Choice xmlns:a14="http://schemas.microsoft.com/office/drawing/2010/main" Requires="a14">
+      <mc:AlternateContent xmlns:mc="http://schemas.openxmlformats.org/markup-compatibility/2006" xmlns:a14="http://schemas.microsoft.com/office/drawing/2010/main">
+        <mc:Choice Requires="a14">
           <p:sp>
             <p:nvSpPr>
               <p:cNvPr id="38" name="TextBox 37">
@@ -6499,19 +6389,7 @@
                         <a:rPr lang="en-US" sz="1600" b="0" i="1" smtClean="0">
                           <a:latin typeface="Cambria Math" panose="02040503050406030204" pitchFamily="18" charset="0"/>
                         </a:rPr>
-                        <m:t>′</m:t>
-                      </m:r>
-                      <m:r>
-                        <a:rPr lang="en-US" sz="1600" b="0" i="1" smtClean="0">
-                          <a:latin typeface="Cambria Math" panose="02040503050406030204" pitchFamily="18" charset="0"/>
-                        </a:rPr>
-                        <m:t>=</m:t>
-                      </m:r>
-                      <m:r>
-                        <a:rPr lang="en-US" sz="1600" b="0" i="1" smtClean="0">
-                          <a:latin typeface="Cambria Math" panose="02040503050406030204" pitchFamily="18" charset="0"/>
-                        </a:rPr>
-                        <m:t>3</m:t>
+                        <m:t>′=3</m:t>
                       </m:r>
                     </m:oMath>
                   </m:oMathPara>
@@ -6521,7 +6399,7 @@
             </p:txBody>
           </p:sp>
         </mc:Choice>
-        <mc:Fallback>
+        <mc:Fallback xmlns="">
           <p:sp>
             <p:nvSpPr>
               <p:cNvPr id="38" name="TextBox 37">
@@ -6566,8 +6444,8 @@
           </p:sp>
         </mc:Fallback>
       </mc:AlternateContent>
-      <mc:AlternateContent xmlns:mc="http://schemas.openxmlformats.org/markup-compatibility/2006">
-        <mc:Choice xmlns:a14="http://schemas.microsoft.com/office/drawing/2010/main" Requires="a14">
+      <mc:AlternateContent xmlns:mc="http://schemas.openxmlformats.org/markup-compatibility/2006" xmlns:a14="http://schemas.microsoft.com/office/drawing/2010/main">
+        <mc:Choice Requires="a14">
           <p:sp>
             <p:nvSpPr>
               <p:cNvPr id="44" name="TextBox 43">
@@ -6632,13 +6510,7 @@
                         <a:rPr lang="en-US" sz="1600" b="0" i="1" smtClean="0">
                           <a:latin typeface="Cambria Math" panose="02040503050406030204" pitchFamily="18" charset="0"/>
                         </a:rPr>
-                        <m:t>=</m:t>
-                      </m:r>
-                      <m:r>
-                        <a:rPr lang="en-US" sz="1600" b="0" i="1" smtClean="0">
-                          <a:latin typeface="Cambria Math" panose="02040503050406030204" pitchFamily="18" charset="0"/>
-                        </a:rPr>
-                        <m:t>1</m:t>
+                        <m:t>=1</m:t>
                       </m:r>
                     </m:oMath>
                   </m:oMathPara>
@@ -6682,19 +6554,7 @@
                         <a:rPr lang="en-US" sz="1600" b="0" i="1" smtClean="0">
                           <a:latin typeface="Cambria Math" panose="02040503050406030204" pitchFamily="18" charset="0"/>
                         </a:rPr>
-                        <m:t>′</m:t>
-                      </m:r>
-                      <m:r>
-                        <a:rPr lang="en-US" sz="1600" b="0" i="1" smtClean="0">
-                          <a:latin typeface="Cambria Math" panose="02040503050406030204" pitchFamily="18" charset="0"/>
-                        </a:rPr>
-                        <m:t>=</m:t>
-                      </m:r>
-                      <m:r>
-                        <a:rPr lang="en-US" sz="1600" b="0" i="1" smtClean="0">
-                          <a:latin typeface="Cambria Math" panose="02040503050406030204" pitchFamily="18" charset="0"/>
-                        </a:rPr>
-                        <m:t>1</m:t>
+                        <m:t>′=1</m:t>
                       </m:r>
                     </m:oMath>
                   </m:oMathPara>
@@ -6704,7 +6564,7 @@
             </p:txBody>
           </p:sp>
         </mc:Choice>
-        <mc:Fallback>
+        <mc:Fallback xmlns="">
           <p:sp>
             <p:nvSpPr>
               <p:cNvPr id="44" name="TextBox 43">
@@ -6749,8 +6609,8 @@
           </p:sp>
         </mc:Fallback>
       </mc:AlternateContent>
-      <mc:AlternateContent xmlns:mc="http://schemas.openxmlformats.org/markup-compatibility/2006">
-        <mc:Choice xmlns:a14="http://schemas.microsoft.com/office/drawing/2010/main" Requires="a14">
+      <mc:AlternateContent xmlns:mc="http://schemas.openxmlformats.org/markup-compatibility/2006" xmlns:a14="http://schemas.microsoft.com/office/drawing/2010/main">
+        <mc:Choice Requires="a14">
           <p:sp>
             <p:nvSpPr>
               <p:cNvPr id="45" name="TextBox 44">
@@ -6815,13 +6675,7 @@
                         <a:rPr lang="en-US" sz="1600" b="0" i="1" smtClean="0">
                           <a:latin typeface="Cambria Math" panose="02040503050406030204" pitchFamily="18" charset="0"/>
                         </a:rPr>
-                        <m:t>=</m:t>
-                      </m:r>
-                      <m:r>
-                        <a:rPr lang="en-US" sz="1600" b="0" i="1" smtClean="0">
-                          <a:latin typeface="Cambria Math" panose="02040503050406030204" pitchFamily="18" charset="0"/>
-                        </a:rPr>
-                        <m:t>2</m:t>
+                        <m:t>=2</m:t>
                       </m:r>
                     </m:oMath>
                   </m:oMathPara>
@@ -6865,13 +6719,7 @@
                         <a:rPr lang="en-US" sz="1600" b="0" i="1" smtClean="0">
                           <a:latin typeface="Cambria Math" panose="02040503050406030204" pitchFamily="18" charset="0"/>
                         </a:rPr>
-                        <m:t>′</m:t>
-                      </m:r>
-                      <m:r>
-                        <a:rPr lang="en-US" sz="1600" b="0" i="1" smtClean="0">
-                          <a:latin typeface="Cambria Math" panose="02040503050406030204" pitchFamily="18" charset="0"/>
-                        </a:rPr>
-                        <m:t>=2</m:t>
+                        <m:t>′=2</m:t>
                       </m:r>
                     </m:oMath>
                   </m:oMathPara>
@@ -6881,7 +6729,7 @@
             </p:txBody>
           </p:sp>
         </mc:Choice>
-        <mc:Fallback>
+        <mc:Fallback xmlns="">
           <p:sp>
             <p:nvSpPr>
               <p:cNvPr id="45" name="TextBox 44">
@@ -6926,6 +6774,162 @@
           </p:sp>
         </mc:Fallback>
       </mc:AlternateContent>
+      <p:sp>
+        <p:nvSpPr>
+          <p:cNvPr id="2" name="Oval 1">
+            <a:extLst>
+              <a:ext uri="{FF2B5EF4-FFF2-40B4-BE49-F238E27FC236}">
+                <a16:creationId xmlns:a16="http://schemas.microsoft.com/office/drawing/2014/main" id="{6D933059-E379-E931-B78E-AC5E53C23BD3}"/>
+              </a:ext>
+            </a:extLst>
+          </p:cNvPr>
+          <p:cNvSpPr/>
+          <p:nvPr/>
+        </p:nvSpPr>
+        <p:spPr>
+          <a:xfrm>
+            <a:off x="5322994" y="3516055"/>
+            <a:ext cx="274320" cy="274320"/>
+          </a:xfrm>
+          <a:prstGeom prst="ellipse">
+            <a:avLst/>
+          </a:prstGeom>
+          <a:noFill/>
+          <a:ln>
+            <a:solidFill>
+              <a:schemeClr val="tx1"/>
+            </a:solidFill>
+          </a:ln>
+        </p:spPr>
+        <p:style>
+          <a:lnRef idx="2">
+            <a:schemeClr val="accent1">
+              <a:shade val="15000"/>
+            </a:schemeClr>
+          </a:lnRef>
+          <a:fillRef idx="1">
+            <a:schemeClr val="accent1"/>
+          </a:fillRef>
+          <a:effectRef idx="0">
+            <a:schemeClr val="accent1"/>
+          </a:effectRef>
+          <a:fontRef idx="minor">
+            <a:schemeClr val="lt1"/>
+          </a:fontRef>
+        </p:style>
+        <p:txBody>
+          <a:bodyPr rtlCol="0" anchor="ctr"/>
+          <a:lstStyle/>
+          <a:p>
+            <a:pPr algn="ctr"/>
+            <a:endParaRPr lang="en-US"/>
+          </a:p>
+        </p:txBody>
+      </p:sp>
+      <p:sp>
+        <p:nvSpPr>
+          <p:cNvPr id="3" name="Oval 2">
+            <a:extLst>
+              <a:ext uri="{FF2B5EF4-FFF2-40B4-BE49-F238E27FC236}">
+                <a16:creationId xmlns:a16="http://schemas.microsoft.com/office/drawing/2014/main" id="{44BED1BC-5F8A-3768-686A-518EB7B751A8}"/>
+              </a:ext>
+            </a:extLst>
+          </p:cNvPr>
+          <p:cNvSpPr/>
+          <p:nvPr/>
+        </p:nvSpPr>
+        <p:spPr>
+          <a:xfrm>
+            <a:off x="5763869" y="3516055"/>
+            <a:ext cx="274320" cy="274320"/>
+          </a:xfrm>
+          <a:prstGeom prst="ellipse">
+            <a:avLst/>
+          </a:prstGeom>
+          <a:noFill/>
+          <a:ln>
+            <a:solidFill>
+              <a:schemeClr val="tx1"/>
+            </a:solidFill>
+          </a:ln>
+        </p:spPr>
+        <p:style>
+          <a:lnRef idx="2">
+            <a:schemeClr val="accent1">
+              <a:shade val="15000"/>
+            </a:schemeClr>
+          </a:lnRef>
+          <a:fillRef idx="1">
+            <a:schemeClr val="accent1"/>
+          </a:fillRef>
+          <a:effectRef idx="0">
+            <a:schemeClr val="accent1"/>
+          </a:effectRef>
+          <a:fontRef idx="minor">
+            <a:schemeClr val="lt1"/>
+          </a:fontRef>
+        </p:style>
+        <p:txBody>
+          <a:bodyPr rtlCol="0" anchor="ctr"/>
+          <a:lstStyle/>
+          <a:p>
+            <a:pPr algn="ctr"/>
+            <a:endParaRPr lang="en-US"/>
+          </a:p>
+        </p:txBody>
+      </p:sp>
+      <p:sp>
+        <p:nvSpPr>
+          <p:cNvPr id="11" name="Oval 10">
+            <a:extLst>
+              <a:ext uri="{FF2B5EF4-FFF2-40B4-BE49-F238E27FC236}">
+                <a16:creationId xmlns:a16="http://schemas.microsoft.com/office/drawing/2014/main" id="{2676FB3B-7A42-0577-2F81-DFFBDF9EC511}"/>
+              </a:ext>
+            </a:extLst>
+          </p:cNvPr>
+          <p:cNvSpPr/>
+          <p:nvPr/>
+        </p:nvSpPr>
+        <p:spPr>
+          <a:xfrm>
+            <a:off x="5763869" y="3112022"/>
+            <a:ext cx="274320" cy="274320"/>
+          </a:xfrm>
+          <a:prstGeom prst="ellipse">
+            <a:avLst/>
+          </a:prstGeom>
+          <a:noFill/>
+          <a:ln>
+            <a:solidFill>
+              <a:schemeClr val="tx1"/>
+            </a:solidFill>
+          </a:ln>
+        </p:spPr>
+        <p:style>
+          <a:lnRef idx="2">
+            <a:schemeClr val="accent1">
+              <a:shade val="15000"/>
+            </a:schemeClr>
+          </a:lnRef>
+          <a:fillRef idx="1">
+            <a:schemeClr val="accent1"/>
+          </a:fillRef>
+          <a:effectRef idx="0">
+            <a:schemeClr val="accent1"/>
+          </a:effectRef>
+          <a:fontRef idx="minor">
+            <a:schemeClr val="lt1"/>
+          </a:fontRef>
+        </p:style>
+        <p:txBody>
+          <a:bodyPr rtlCol="0" anchor="ctr"/>
+          <a:lstStyle/>
+          <a:p>
+            <a:pPr algn="ctr"/>
+            <a:endParaRPr lang="en-US"/>
+          </a:p>
+        </p:txBody>
+      </p:sp>
     </p:spTree>
     <p:extLst>
       <p:ext uri="{BB962C8B-B14F-4D97-AF65-F5344CB8AC3E}">
@@ -7580,8 +7584,8 @@
           </p:sp>
         </mc:Fallback>
       </mc:AlternateContent>
-      <mc:AlternateContent xmlns:mc="http://schemas.openxmlformats.org/markup-compatibility/2006">
-        <mc:Choice xmlns:a14="http://schemas.microsoft.com/office/drawing/2010/main" Requires="a14">
+      <mc:AlternateContent xmlns:mc="http://schemas.openxmlformats.org/markup-compatibility/2006" xmlns:a14="http://schemas.microsoft.com/office/drawing/2010/main">
+        <mc:Choice Requires="a14">
           <p:sp>
             <p:nvSpPr>
               <p:cNvPr id="33" name="TextBox 32">
@@ -7643,7 +7647,7 @@
             </p:txBody>
           </p:sp>
         </mc:Choice>
-        <mc:Fallback>
+        <mc:Fallback xmlns="">
           <p:sp>
             <p:nvSpPr>
               <p:cNvPr id="33" name="TextBox 32">
@@ -7760,8 +7764,8 @@
           </a:p>
         </p:txBody>
       </p:sp>
-      <mc:AlternateContent xmlns:mc="http://schemas.openxmlformats.org/markup-compatibility/2006">
-        <mc:Choice xmlns:a14="http://schemas.microsoft.com/office/drawing/2010/main" Requires="a14">
+      <mc:AlternateContent xmlns:mc="http://schemas.openxmlformats.org/markup-compatibility/2006" xmlns:a14="http://schemas.microsoft.com/office/drawing/2010/main">
+        <mc:Choice Requires="a14">
           <p:sp>
             <p:nvSpPr>
               <p:cNvPr id="9" name="TextBox 8">
@@ -7873,7 +7877,7 @@
             </p:txBody>
           </p:sp>
         </mc:Choice>
-        <mc:Fallback>
+        <mc:Fallback xmlns="">
           <p:sp>
             <p:nvSpPr>
               <p:cNvPr id="9" name="TextBox 8">
@@ -8437,8 +8441,8 @@
           </a:p>
         </p:txBody>
       </p:sp>
-      <mc:AlternateContent xmlns:mc="http://schemas.openxmlformats.org/markup-compatibility/2006">
-        <mc:Choice xmlns:a14="http://schemas.microsoft.com/office/drawing/2010/main" Requires="a14">
+      <mc:AlternateContent xmlns:mc="http://schemas.openxmlformats.org/markup-compatibility/2006" xmlns:a14="http://schemas.microsoft.com/office/drawing/2010/main">
+        <mc:Choice Requires="a14">
           <p:sp>
             <p:nvSpPr>
               <p:cNvPr id="45" name="TextBox 44">
@@ -8503,13 +8507,7 @@
                         <a:rPr lang="en-US" sz="1600" b="0" i="1" smtClean="0">
                           <a:latin typeface="Cambria Math" panose="02040503050406030204" pitchFamily="18" charset="0"/>
                         </a:rPr>
-                        <m:t>=</m:t>
-                      </m:r>
-                      <m:r>
-                        <a:rPr lang="en-US" sz="1600" b="0" i="1" smtClean="0">
-                          <a:latin typeface="Cambria Math" panose="02040503050406030204" pitchFamily="18" charset="0"/>
-                        </a:rPr>
-                        <m:t>1</m:t>
+                        <m:t>=1</m:t>
                       </m:r>
                     </m:oMath>
                   </m:oMathPara>
@@ -8553,19 +8551,7 @@
                         <a:rPr lang="en-US" sz="1600" b="0" i="1" smtClean="0">
                           <a:latin typeface="Cambria Math" panose="02040503050406030204" pitchFamily="18" charset="0"/>
                         </a:rPr>
-                        <m:t>′</m:t>
-                      </m:r>
-                      <m:r>
-                        <a:rPr lang="en-US" sz="1600" b="0" i="1" smtClean="0">
-                          <a:latin typeface="Cambria Math" panose="02040503050406030204" pitchFamily="18" charset="0"/>
-                        </a:rPr>
-                        <m:t>=</m:t>
-                      </m:r>
-                      <m:r>
-                        <a:rPr lang="en-US" sz="1600" b="0" i="1" smtClean="0">
-                          <a:latin typeface="Cambria Math" panose="02040503050406030204" pitchFamily="18" charset="0"/>
-                        </a:rPr>
-                        <m:t>1</m:t>
+                        <m:t>′=1</m:t>
                       </m:r>
                     </m:oMath>
                   </m:oMathPara>
@@ -8575,7 +8561,7 @@
             </p:txBody>
           </p:sp>
         </mc:Choice>
-        <mc:Fallback>
+        <mc:Fallback xmlns="">
           <p:sp>
             <p:nvSpPr>
               <p:cNvPr id="45" name="TextBox 44">
@@ -8620,8 +8606,8 @@
           </p:sp>
         </mc:Fallback>
       </mc:AlternateContent>
-      <mc:AlternateContent xmlns:mc="http://schemas.openxmlformats.org/markup-compatibility/2006">
-        <mc:Choice xmlns:a14="http://schemas.microsoft.com/office/drawing/2010/main" Requires="a14">
+      <mc:AlternateContent xmlns:mc="http://schemas.openxmlformats.org/markup-compatibility/2006" xmlns:a14="http://schemas.microsoft.com/office/drawing/2010/main">
+        <mc:Choice Requires="a14">
           <p:sp>
             <p:nvSpPr>
               <p:cNvPr id="47" name="TextBox 46">
@@ -8730,19 +8716,7 @@
                         <a:rPr lang="en-US" sz="1600" b="0" i="1" smtClean="0">
                           <a:latin typeface="Cambria Math" panose="02040503050406030204" pitchFamily="18" charset="0"/>
                         </a:rPr>
-                        <m:t>′</m:t>
-                      </m:r>
-                      <m:r>
-                        <a:rPr lang="en-US" sz="1600" b="0" i="1" smtClean="0">
-                          <a:latin typeface="Cambria Math" panose="02040503050406030204" pitchFamily="18" charset="0"/>
-                        </a:rPr>
-                        <m:t>=</m:t>
-                      </m:r>
-                      <m:r>
-                        <a:rPr lang="en-US" sz="1600" b="0" i="1" smtClean="0">
-                          <a:latin typeface="Cambria Math" panose="02040503050406030204" pitchFamily="18" charset="0"/>
-                        </a:rPr>
-                        <m:t>4</m:t>
+                        <m:t>′=4</m:t>
                       </m:r>
                     </m:oMath>
                   </m:oMathPara>
@@ -8752,7 +8726,7 @@
             </p:txBody>
           </p:sp>
         </mc:Choice>
-        <mc:Fallback>
+        <mc:Fallback xmlns="">
           <p:sp>
             <p:nvSpPr>
               <p:cNvPr id="47" name="TextBox 46">
@@ -8797,8 +8771,8 @@
           </p:sp>
         </mc:Fallback>
       </mc:AlternateContent>
-      <mc:AlternateContent xmlns:mc="http://schemas.openxmlformats.org/markup-compatibility/2006">
-        <mc:Choice xmlns:a14="http://schemas.microsoft.com/office/drawing/2010/main" Requires="a14">
+      <mc:AlternateContent xmlns:mc="http://schemas.openxmlformats.org/markup-compatibility/2006" xmlns:a14="http://schemas.microsoft.com/office/drawing/2010/main">
+        <mc:Choice Requires="a14">
           <p:sp>
             <p:nvSpPr>
               <p:cNvPr id="48" name="TextBox 47">
@@ -8869,13 +8843,7 @@
                         <a:rPr lang="en-US" sz="1600" b="0" i="1" smtClean="0">
                           <a:latin typeface="Cambria Math" panose="02040503050406030204" pitchFamily="18" charset="0"/>
                         </a:rPr>
-                        <m:t>=</m:t>
-                      </m:r>
-                      <m:r>
-                        <a:rPr lang="en-US" sz="1600" b="0" i="1" smtClean="0">
-                          <a:latin typeface="Cambria Math" panose="02040503050406030204" pitchFamily="18" charset="0"/>
-                        </a:rPr>
-                        <m:t>2</m:t>
+                        <m:t>=2</m:t>
                       </m:r>
                     </m:oMath>
                   </m:oMathPara>
@@ -8925,19 +8893,7 @@
                         <a:rPr lang="en-US" sz="1600" b="0" i="1" smtClean="0">
                           <a:latin typeface="Cambria Math" panose="02040503050406030204" pitchFamily="18" charset="0"/>
                         </a:rPr>
-                        <m:t>′</m:t>
-                      </m:r>
-                      <m:r>
-                        <a:rPr lang="en-US" sz="1600" b="0" i="1" smtClean="0">
-                          <a:latin typeface="Cambria Math" panose="02040503050406030204" pitchFamily="18" charset="0"/>
-                        </a:rPr>
-                        <m:t>=</m:t>
-                      </m:r>
-                      <m:r>
-                        <a:rPr lang="en-US" sz="1600" b="0" i="1" smtClean="0">
-                          <a:latin typeface="Cambria Math" panose="02040503050406030204" pitchFamily="18" charset="0"/>
-                        </a:rPr>
-                        <m:t>3</m:t>
+                        <m:t>′=3</m:t>
                       </m:r>
                     </m:oMath>
                   </m:oMathPara>
@@ -8947,7 +8903,7 @@
             </p:txBody>
           </p:sp>
         </mc:Choice>
-        <mc:Fallback>
+        <mc:Fallback xmlns="">
           <p:sp>
             <p:nvSpPr>
               <p:cNvPr id="48" name="TextBox 47">
@@ -8992,8 +8948,8 @@
           </p:sp>
         </mc:Fallback>
       </mc:AlternateContent>
-      <mc:AlternateContent xmlns:mc="http://schemas.openxmlformats.org/markup-compatibility/2006">
-        <mc:Choice xmlns:a14="http://schemas.microsoft.com/office/drawing/2010/main" Requires="a14">
+      <mc:AlternateContent xmlns:mc="http://schemas.openxmlformats.org/markup-compatibility/2006" xmlns:a14="http://schemas.microsoft.com/office/drawing/2010/main">
+        <mc:Choice Requires="a14">
           <p:sp>
             <p:nvSpPr>
               <p:cNvPr id="49" name="TextBox 48">
@@ -9058,13 +9014,7 @@
                         <a:rPr lang="en-US" sz="1600" b="0" i="1" smtClean="0">
                           <a:latin typeface="Cambria Math" panose="02040503050406030204" pitchFamily="18" charset="0"/>
                         </a:rPr>
-                        <m:t>=</m:t>
-                      </m:r>
-                      <m:r>
-                        <a:rPr lang="en-US" sz="1600" b="0" i="1" smtClean="0">
-                          <a:latin typeface="Cambria Math" panose="02040503050406030204" pitchFamily="18" charset="0"/>
-                        </a:rPr>
-                        <m:t>2</m:t>
+                        <m:t>=2</m:t>
                       </m:r>
                     </m:oMath>
                   </m:oMathPara>
@@ -9108,13 +9058,7 @@
                         <a:rPr lang="en-US" sz="1600" b="0" i="1" smtClean="0">
                           <a:latin typeface="Cambria Math" panose="02040503050406030204" pitchFamily="18" charset="0"/>
                         </a:rPr>
-                        <m:t>′</m:t>
-                      </m:r>
-                      <m:r>
-                        <a:rPr lang="en-US" sz="1600" b="0" i="1" smtClean="0">
-                          <a:latin typeface="Cambria Math" panose="02040503050406030204" pitchFamily="18" charset="0"/>
-                        </a:rPr>
-                        <m:t>=2</m:t>
+                        <m:t>′=2</m:t>
                       </m:r>
                     </m:oMath>
                   </m:oMathPara>
@@ -9124,7 +9068,7 @@
             </p:txBody>
           </p:sp>
         </mc:Choice>
-        <mc:Fallback>
+        <mc:Fallback xmlns="">
           <p:sp>
             <p:nvSpPr>
               <p:cNvPr id="49" name="TextBox 48">
@@ -9823,8 +9767,8 @@
           </p:sp>
         </mc:Fallback>
       </mc:AlternateContent>
-      <mc:AlternateContent xmlns:mc="http://schemas.openxmlformats.org/markup-compatibility/2006">
-        <mc:Choice xmlns:a14="http://schemas.microsoft.com/office/drawing/2010/main" Requires="a14">
+      <mc:AlternateContent xmlns:mc="http://schemas.openxmlformats.org/markup-compatibility/2006" xmlns:a14="http://schemas.microsoft.com/office/drawing/2010/main">
+        <mc:Choice Requires="a14">
           <p:sp>
             <p:nvSpPr>
               <p:cNvPr id="33" name="TextBox 32">
@@ -9886,7 +9830,7 @@
             </p:txBody>
           </p:sp>
         </mc:Choice>
-        <mc:Fallback>
+        <mc:Fallback xmlns="">
           <p:sp>
             <p:nvSpPr>
               <p:cNvPr id="33" name="TextBox 32">
@@ -10003,8 +9947,8 @@
           </a:p>
         </p:txBody>
       </p:sp>
-      <mc:AlternateContent xmlns:mc="http://schemas.openxmlformats.org/markup-compatibility/2006">
-        <mc:Choice xmlns:a14="http://schemas.microsoft.com/office/drawing/2010/main" Requires="a14">
+      <mc:AlternateContent xmlns:mc="http://schemas.openxmlformats.org/markup-compatibility/2006" xmlns:a14="http://schemas.microsoft.com/office/drawing/2010/main">
+        <mc:Choice Requires="a14">
           <p:sp>
             <p:nvSpPr>
               <p:cNvPr id="9" name="TextBox 8">
@@ -10116,7 +10060,7 @@
             </p:txBody>
           </p:sp>
         </mc:Choice>
-        <mc:Fallback>
+        <mc:Fallback xmlns="">
           <p:sp>
             <p:nvSpPr>
               <p:cNvPr id="9" name="TextBox 8">
@@ -10161,8 +10105,8 @@
           </p:sp>
         </mc:Fallback>
       </mc:AlternateContent>
-      <mc:AlternateContent xmlns:mc="http://schemas.openxmlformats.org/markup-compatibility/2006">
-        <mc:Choice xmlns:a14="http://schemas.microsoft.com/office/drawing/2010/main" Requires="a14">
+      <mc:AlternateContent xmlns:mc="http://schemas.openxmlformats.org/markup-compatibility/2006" xmlns:a14="http://schemas.microsoft.com/office/drawing/2010/main">
+        <mc:Choice Requires="a14">
           <p:sp>
             <p:nvSpPr>
               <p:cNvPr id="12" name="TextBox 11">
@@ -10227,13 +10171,7 @@
                         <a:rPr lang="en-US" sz="1600" b="0" i="1" smtClean="0">
                           <a:latin typeface="Cambria Math" panose="02040503050406030204" pitchFamily="18" charset="0"/>
                         </a:rPr>
-                        <m:t>=</m:t>
-                      </m:r>
-                      <m:r>
-                        <a:rPr lang="en-US" sz="1600" b="0" i="1" smtClean="0">
-                          <a:latin typeface="Cambria Math" panose="02040503050406030204" pitchFamily="18" charset="0"/>
-                        </a:rPr>
-                        <m:t>2</m:t>
+                        <m:t>=2</m:t>
                       </m:r>
                     </m:oMath>
                   </m:oMathPara>
@@ -10277,19 +10215,7 @@
                         <a:rPr lang="en-US" sz="1600" b="0" i="1" smtClean="0">
                           <a:latin typeface="Cambria Math" panose="02040503050406030204" pitchFamily="18" charset="0"/>
                         </a:rPr>
-                        <m:t>′</m:t>
-                      </m:r>
-                      <m:r>
-                        <a:rPr lang="en-US" sz="1600" b="0" i="1" smtClean="0">
-                          <a:latin typeface="Cambria Math" panose="02040503050406030204" pitchFamily="18" charset="0"/>
-                        </a:rPr>
-                        <m:t>=</m:t>
-                      </m:r>
-                      <m:r>
-                        <a:rPr lang="en-US" sz="1600" b="0" i="1" smtClean="0">
-                          <a:latin typeface="Cambria Math" panose="02040503050406030204" pitchFamily="18" charset="0"/>
-                        </a:rPr>
-                        <m:t>1</m:t>
+                        <m:t>′=1</m:t>
                       </m:r>
                     </m:oMath>
                   </m:oMathPara>
@@ -10299,7 +10225,7 @@
             </p:txBody>
           </p:sp>
         </mc:Choice>
-        <mc:Fallback>
+        <mc:Fallback xmlns="">
           <p:sp>
             <p:nvSpPr>
               <p:cNvPr id="12" name="TextBox 11">
@@ -10344,8 +10270,8 @@
           </p:sp>
         </mc:Fallback>
       </mc:AlternateContent>
-      <mc:AlternateContent xmlns:mc="http://schemas.openxmlformats.org/markup-compatibility/2006">
-        <mc:Choice xmlns:a14="http://schemas.microsoft.com/office/drawing/2010/main" Requires="a14">
+      <mc:AlternateContent xmlns:mc="http://schemas.openxmlformats.org/markup-compatibility/2006" xmlns:a14="http://schemas.microsoft.com/office/drawing/2010/main">
+        <mc:Choice Requires="a14">
           <p:sp>
             <p:nvSpPr>
               <p:cNvPr id="14" name="TextBox 13">
@@ -10410,13 +10336,7 @@
                         <a:rPr lang="en-US" sz="1600" b="0" i="1" smtClean="0">
                           <a:latin typeface="Cambria Math" panose="02040503050406030204" pitchFamily="18" charset="0"/>
                         </a:rPr>
-                        <m:t>=</m:t>
-                      </m:r>
-                      <m:r>
-                        <a:rPr lang="en-US" sz="1600" b="0" i="1" smtClean="0">
-                          <a:latin typeface="Cambria Math" panose="02040503050406030204" pitchFamily="18" charset="0"/>
-                        </a:rPr>
-                        <m:t>2</m:t>
+                        <m:t>=2</m:t>
                       </m:r>
                     </m:oMath>
                   </m:oMathPara>
@@ -10460,13 +10380,7 @@
                         <a:rPr lang="en-US" sz="1600" b="0" i="1" smtClean="0">
                           <a:latin typeface="Cambria Math" panose="02040503050406030204" pitchFamily="18" charset="0"/>
                         </a:rPr>
-                        <m:t>′</m:t>
-                      </m:r>
-                      <m:r>
-                        <a:rPr lang="en-US" sz="1600" b="0" i="1" smtClean="0">
-                          <a:latin typeface="Cambria Math" panose="02040503050406030204" pitchFamily="18" charset="0"/>
-                        </a:rPr>
-                        <m:t>=2</m:t>
+                        <m:t>′=2</m:t>
                       </m:r>
                     </m:oMath>
                   </m:oMathPara>
@@ -10476,7 +10390,7 @@
             </p:txBody>
           </p:sp>
         </mc:Choice>
-        <mc:Fallback>
+        <mc:Fallback xmlns="">
           <p:sp>
             <p:nvSpPr>
               <p:cNvPr id="14" name="TextBox 13">
@@ -10884,8 +10798,8 @@
           </a:p>
         </p:txBody>
       </p:sp>
-      <mc:AlternateContent xmlns:mc="http://schemas.openxmlformats.org/markup-compatibility/2006">
-        <mc:Choice xmlns:a14="http://schemas.microsoft.com/office/drawing/2010/main" Requires="a14">
+      <mc:AlternateContent xmlns:mc="http://schemas.openxmlformats.org/markup-compatibility/2006" xmlns:a14="http://schemas.microsoft.com/office/drawing/2010/main">
+        <mc:Choice Requires="a14">
           <p:sp>
             <p:nvSpPr>
               <p:cNvPr id="23" name="TextBox 22">
@@ -10956,13 +10870,7 @@
                         <a:rPr lang="en-US" sz="1600" b="0" i="1" smtClean="0">
                           <a:latin typeface="Cambria Math" panose="02040503050406030204" pitchFamily="18" charset="0"/>
                         </a:rPr>
-                        <m:t>=</m:t>
-                      </m:r>
-                      <m:r>
-                        <a:rPr lang="en-US" sz="1600" b="0" i="1" smtClean="0">
-                          <a:latin typeface="Cambria Math" panose="02040503050406030204" pitchFamily="18" charset="0"/>
-                        </a:rPr>
-                        <m:t>2</m:t>
+                        <m:t>=2</m:t>
                       </m:r>
                     </m:oMath>
                   </m:oMathPara>
@@ -11012,19 +10920,7 @@
                         <a:rPr lang="en-US" sz="1600" b="0" i="1" smtClean="0">
                           <a:latin typeface="Cambria Math" panose="02040503050406030204" pitchFamily="18" charset="0"/>
                         </a:rPr>
-                        <m:t>′</m:t>
-                      </m:r>
-                      <m:r>
-                        <a:rPr lang="en-US" sz="1600" b="0" i="1" smtClean="0">
-                          <a:latin typeface="Cambria Math" panose="02040503050406030204" pitchFamily="18" charset="0"/>
-                        </a:rPr>
-                        <m:t>=</m:t>
-                      </m:r>
-                      <m:r>
-                        <a:rPr lang="en-US" sz="1600" b="0" i="1" smtClean="0">
-                          <a:latin typeface="Cambria Math" panose="02040503050406030204" pitchFamily="18" charset="0"/>
-                        </a:rPr>
-                        <m:t>3</m:t>
+                        <m:t>′=3</m:t>
                       </m:r>
                     </m:oMath>
                   </m:oMathPara>
@@ -11034,7 +10930,7 @@
             </p:txBody>
           </p:sp>
         </mc:Choice>
-        <mc:Fallback>
+        <mc:Fallback xmlns="">
           <p:sp>
             <p:nvSpPr>
               <p:cNvPr id="23" name="TextBox 22">
@@ -11079,8 +10975,8 @@
           </p:sp>
         </mc:Fallback>
       </mc:AlternateContent>
-      <mc:AlternateContent xmlns:mc="http://schemas.openxmlformats.org/markup-compatibility/2006">
-        <mc:Choice xmlns:a14="http://schemas.microsoft.com/office/drawing/2010/main" Requires="a14">
+      <mc:AlternateContent xmlns:mc="http://schemas.openxmlformats.org/markup-compatibility/2006" xmlns:a14="http://schemas.microsoft.com/office/drawing/2010/main">
+        <mc:Choice Requires="a14">
           <p:sp>
             <p:nvSpPr>
               <p:cNvPr id="24" name="TextBox 23">
@@ -11145,13 +11041,7 @@
                         <a:rPr lang="en-US" sz="1600" b="0" i="1" smtClean="0">
                           <a:latin typeface="Cambria Math" panose="02040503050406030204" pitchFamily="18" charset="0"/>
                         </a:rPr>
-                        <m:t>=</m:t>
-                      </m:r>
-                      <m:r>
-                        <a:rPr lang="en-US" sz="1600" b="0" i="1" smtClean="0">
-                          <a:latin typeface="Cambria Math" panose="02040503050406030204" pitchFamily="18" charset="0"/>
-                        </a:rPr>
-                        <m:t>1</m:t>
+                        <m:t>=1</m:t>
                       </m:r>
                     </m:oMath>
                   </m:oMathPara>
@@ -11195,19 +11085,7 @@
                         <a:rPr lang="en-US" sz="1600" b="0" i="1" smtClean="0">
                           <a:latin typeface="Cambria Math" panose="02040503050406030204" pitchFamily="18" charset="0"/>
                         </a:rPr>
-                        <m:t>′</m:t>
-                      </m:r>
-                      <m:r>
-                        <a:rPr lang="en-US" sz="1600" b="0" i="1" smtClean="0">
-                          <a:latin typeface="Cambria Math" panose="02040503050406030204" pitchFamily="18" charset="0"/>
-                        </a:rPr>
-                        <m:t>=</m:t>
-                      </m:r>
-                      <m:r>
-                        <a:rPr lang="en-US" sz="1600" b="0" i="1" smtClean="0">
-                          <a:latin typeface="Cambria Math" panose="02040503050406030204" pitchFamily="18" charset="0"/>
-                        </a:rPr>
-                        <m:t>1</m:t>
+                        <m:t>′=1</m:t>
                       </m:r>
                     </m:oMath>
                   </m:oMathPara>
@@ -11217,7 +11095,7 @@
             </p:txBody>
           </p:sp>
         </mc:Choice>
-        <mc:Fallback>
+        <mc:Fallback xmlns="">
           <p:sp>
             <p:nvSpPr>
               <p:cNvPr id="24" name="TextBox 23">
@@ -11292,38 +11170,8 @@
           <a:chExt cx="0" cy="0"/>
         </a:xfrm>
       </p:grpSpPr>
-      <p:pic>
-        <p:nvPicPr>
-          <p:cNvPr id="2" name="Picture 1">
-            <a:extLst>
-              <a:ext uri="{FF2B5EF4-FFF2-40B4-BE49-F238E27FC236}">
-                <a16:creationId xmlns:a16="http://schemas.microsoft.com/office/drawing/2014/main" id="{FE82D148-6B91-06C5-C906-D0AA0EF92BB6}"/>
-              </a:ext>
-            </a:extLst>
-          </p:cNvPr>
-          <p:cNvPicPr>
-            <a:picLocks noChangeAspect="1"/>
-          </p:cNvPicPr>
-          <p:nvPr/>
-        </p:nvPicPr>
-        <p:blipFill>
-          <a:blip r:embed="rId2"/>
-          <a:stretch>
-            <a:fillRect/>
-          </a:stretch>
-        </p:blipFill>
-        <p:spPr>
-          <a:xfrm>
-            <a:off x="1834526" y="2038991"/>
-            <a:ext cx="8522947" cy="2780017"/>
-          </a:xfrm>
-          <a:prstGeom prst="rect">
-            <a:avLst/>
-          </a:prstGeom>
-        </p:spPr>
-      </p:pic>
-      <mc:AlternateContent xmlns:mc="http://schemas.openxmlformats.org/markup-compatibility/2006">
-        <mc:Choice xmlns:a14="http://schemas.microsoft.com/office/drawing/2010/main" Requires="a14">
+      <mc:AlternateContent xmlns:mc="http://schemas.openxmlformats.org/markup-compatibility/2006" xmlns:a14="http://schemas.microsoft.com/office/drawing/2010/main">
+        <mc:Choice Requires="a14">
           <p:sp>
             <p:nvSpPr>
               <p:cNvPr id="4" name="TextBox 3">
@@ -11352,7 +11200,6 @@
               </a:bodyPr>
               <a:lstStyle/>
               <a:p>
-                <a:pPr/>
                 <a14:m>
                   <m:oMath xmlns:m="http://schemas.openxmlformats.org/officeDocument/2006/math">
                     <m:sSub>
@@ -11433,7 +11280,7 @@
             </p:txBody>
           </p:sp>
         </mc:Choice>
-        <mc:Fallback>
+        <mc:Fallback xmlns="">
           <p:sp>
             <p:nvSpPr>
               <p:cNvPr id="4" name="TextBox 3">
@@ -11478,6 +11325,36 @@
           </p:sp>
         </mc:Fallback>
       </mc:AlternateContent>
+      <p:pic>
+        <p:nvPicPr>
+          <p:cNvPr id="3" name="Picture 2">
+            <a:extLst>
+              <a:ext uri="{FF2B5EF4-FFF2-40B4-BE49-F238E27FC236}">
+                <a16:creationId xmlns:a16="http://schemas.microsoft.com/office/drawing/2014/main" id="{4D05C4A4-08D6-0BCE-45BC-55105FCBAB87}"/>
+              </a:ext>
+            </a:extLst>
+          </p:cNvPr>
+          <p:cNvPicPr>
+            <a:picLocks noChangeAspect="1"/>
+          </p:cNvPicPr>
+          <p:nvPr/>
+        </p:nvPicPr>
+        <p:blipFill>
+          <a:blip r:embed="rId4"/>
+          <a:stretch>
+            <a:fillRect/>
+          </a:stretch>
+        </p:blipFill>
+        <p:spPr>
+          <a:xfrm>
+            <a:off x="1834526" y="2038991"/>
+            <a:ext cx="8522947" cy="2780017"/>
+          </a:xfrm>
+          <a:prstGeom prst="rect">
+            <a:avLst/>
+          </a:prstGeom>
+        </p:spPr>
+      </p:pic>
     </p:spTree>
     <p:extLst>
       <p:ext uri="{BB962C8B-B14F-4D97-AF65-F5344CB8AC3E}">
@@ -11538,8 +11415,8 @@
           </a:prstGeom>
         </p:spPr>
       </p:pic>
-      <mc:AlternateContent xmlns:mc="http://schemas.openxmlformats.org/markup-compatibility/2006">
-        <mc:Choice xmlns:a14="http://schemas.microsoft.com/office/drawing/2010/main" Requires="a14">
+      <mc:AlternateContent xmlns:mc="http://schemas.openxmlformats.org/markup-compatibility/2006" xmlns:a14="http://schemas.microsoft.com/office/drawing/2010/main">
+        <mc:Choice Requires="a14">
           <p:sp>
             <p:nvSpPr>
               <p:cNvPr id="3" name="TextBox 2">
@@ -11568,7 +11445,6 @@
               </a:bodyPr>
               <a:lstStyle/>
               <a:p>
-                <a:pPr/>
                 <a14:m>
                   <m:oMath xmlns:m="http://schemas.openxmlformats.org/officeDocument/2006/math">
                     <m:sSub>
@@ -11649,7 +11525,7 @@
             </p:txBody>
           </p:sp>
         </mc:Choice>
-        <mc:Fallback>
+        <mc:Fallback xmlns="">
           <p:sp>
             <p:nvSpPr>
               <p:cNvPr id="3" name="TextBox 2">
@@ -11754,8 +11630,8 @@
           </a:prstGeom>
         </p:spPr>
       </p:pic>
-      <mc:AlternateContent xmlns:mc="http://schemas.openxmlformats.org/markup-compatibility/2006">
-        <mc:Choice xmlns:a14="http://schemas.microsoft.com/office/drawing/2010/main" Requires="a14">
+      <mc:AlternateContent xmlns:mc="http://schemas.openxmlformats.org/markup-compatibility/2006" xmlns:a14="http://schemas.microsoft.com/office/drawing/2010/main">
+        <mc:Choice Requires="a14">
           <p:sp>
             <p:nvSpPr>
               <p:cNvPr id="3" name="TextBox 2">
@@ -11784,7 +11660,6 @@
               </a:bodyPr>
               <a:lstStyle/>
               <a:p>
-                <a:pPr/>
                 <a14:m>
                   <m:oMath xmlns:m="http://schemas.openxmlformats.org/officeDocument/2006/math">
                     <m:sSub>
@@ -11870,7 +11745,7 @@
             </p:txBody>
           </p:sp>
         </mc:Choice>
-        <mc:Fallback>
+        <mc:Fallback xmlns="">
           <p:sp>
             <p:nvSpPr>
               <p:cNvPr id="3" name="TextBox 2">

</xml_diff>

<commit_message>
feat(proof): clarify person-level vs household-level hh size by adding figure 1.1
</commit_message>
<xml_diff>
--- a/images-for-proof.pptx
+++ b/images-for-proof.pptx
@@ -7,11 +7,13 @@
   <p:sldIdLst>
     <p:sldId id="257" r:id="rId2"/>
     <p:sldId id="258" r:id="rId3"/>
-    <p:sldId id="260" r:id="rId4"/>
-    <p:sldId id="261" r:id="rId5"/>
-    <p:sldId id="259" r:id="rId6"/>
-    <p:sldId id="262" r:id="rId7"/>
-    <p:sldId id="263" r:id="rId8"/>
+    <p:sldId id="265" r:id="rId4"/>
+    <p:sldId id="260" r:id="rId5"/>
+    <p:sldId id="261" r:id="rId6"/>
+    <p:sldId id="266" r:id="rId7"/>
+    <p:sldId id="259" r:id="rId8"/>
+    <p:sldId id="262" r:id="rId9"/>
+    <p:sldId id="263" r:id="rId10"/>
   </p:sldIdLst>
   <p:sldSz cx="12192000" cy="6858000"/>
   <p:notesSz cx="6858000" cy="9144000"/>
@@ -265,7 +267,7 @@
           <a:p>
             <a:fld id="{80B7F96D-77AA-4333-BC36-470FA2610C7E}" type="datetimeFigureOut">
               <a:rPr lang="en-US" smtClean="0"/>
-              <a:t>3/27/2025</a:t>
+              <a:t>3/31/2025</a:t>
             </a:fld>
             <a:endParaRPr lang="en-US"/>
           </a:p>
@@ -463,7 +465,7 @@
           <a:p>
             <a:fld id="{80B7F96D-77AA-4333-BC36-470FA2610C7E}" type="datetimeFigureOut">
               <a:rPr lang="en-US" smtClean="0"/>
-              <a:t>3/27/2025</a:t>
+              <a:t>3/31/2025</a:t>
             </a:fld>
             <a:endParaRPr lang="en-US"/>
           </a:p>
@@ -671,7 +673,7 @@
           <a:p>
             <a:fld id="{80B7F96D-77AA-4333-BC36-470FA2610C7E}" type="datetimeFigureOut">
               <a:rPr lang="en-US" smtClean="0"/>
-              <a:t>3/27/2025</a:t>
+              <a:t>3/31/2025</a:t>
             </a:fld>
             <a:endParaRPr lang="en-US"/>
           </a:p>
@@ -869,7 +871,7 @@
           <a:p>
             <a:fld id="{80B7F96D-77AA-4333-BC36-470FA2610C7E}" type="datetimeFigureOut">
               <a:rPr lang="en-US" smtClean="0"/>
-              <a:t>3/27/2025</a:t>
+              <a:t>3/31/2025</a:t>
             </a:fld>
             <a:endParaRPr lang="en-US"/>
           </a:p>
@@ -1144,7 +1146,7 @@
           <a:p>
             <a:fld id="{80B7F96D-77AA-4333-BC36-470FA2610C7E}" type="datetimeFigureOut">
               <a:rPr lang="en-US" smtClean="0"/>
-              <a:t>3/27/2025</a:t>
+              <a:t>3/31/2025</a:t>
             </a:fld>
             <a:endParaRPr lang="en-US"/>
           </a:p>
@@ -1409,7 +1411,7 @@
           <a:p>
             <a:fld id="{80B7F96D-77AA-4333-BC36-470FA2610C7E}" type="datetimeFigureOut">
               <a:rPr lang="en-US" smtClean="0"/>
-              <a:t>3/27/2025</a:t>
+              <a:t>3/31/2025</a:t>
             </a:fld>
             <a:endParaRPr lang="en-US"/>
           </a:p>
@@ -1821,7 +1823,7 @@
           <a:p>
             <a:fld id="{80B7F96D-77AA-4333-BC36-470FA2610C7E}" type="datetimeFigureOut">
               <a:rPr lang="en-US" smtClean="0"/>
-              <a:t>3/27/2025</a:t>
+              <a:t>3/31/2025</a:t>
             </a:fld>
             <a:endParaRPr lang="en-US"/>
           </a:p>
@@ -1962,7 +1964,7 @@
           <a:p>
             <a:fld id="{80B7F96D-77AA-4333-BC36-470FA2610C7E}" type="datetimeFigureOut">
               <a:rPr lang="en-US" smtClean="0"/>
-              <a:t>3/27/2025</a:t>
+              <a:t>3/31/2025</a:t>
             </a:fld>
             <a:endParaRPr lang="en-US"/>
           </a:p>
@@ -2075,7 +2077,7 @@
           <a:p>
             <a:fld id="{80B7F96D-77AA-4333-BC36-470FA2610C7E}" type="datetimeFigureOut">
               <a:rPr lang="en-US" smtClean="0"/>
-              <a:t>3/27/2025</a:t>
+              <a:t>3/31/2025</a:t>
             </a:fld>
             <a:endParaRPr lang="en-US"/>
           </a:p>
@@ -2386,7 +2388,7 @@
           <a:p>
             <a:fld id="{80B7F96D-77AA-4333-BC36-470FA2610C7E}" type="datetimeFigureOut">
               <a:rPr lang="en-US" smtClean="0"/>
-              <a:t>3/27/2025</a:t>
+              <a:t>3/31/2025</a:t>
             </a:fld>
             <a:endParaRPr lang="en-US"/>
           </a:p>
@@ -2674,7 +2676,7 @@
           <a:p>
             <a:fld id="{80B7F96D-77AA-4333-BC36-470FA2610C7E}" type="datetimeFigureOut">
               <a:rPr lang="en-US" smtClean="0"/>
-              <a:t>3/27/2025</a:t>
+              <a:t>3/31/2025</a:t>
             </a:fld>
             <a:endParaRPr lang="en-US"/>
           </a:p>
@@ -2915,7 +2917,7 @@
           <a:p>
             <a:fld id="{80B7F96D-77AA-4333-BC36-470FA2610C7E}" type="datetimeFigureOut">
               <a:rPr lang="en-US" smtClean="0"/>
-              <a:t>3/27/2025</a:t>
+              <a:t>3/31/2025</a:t>
             </a:fld>
             <a:endParaRPr lang="en-US"/>
           </a:p>
@@ -4410,10 +4412,909 @@
       </p:grpSpPr>
       <p:sp>
         <p:nvSpPr>
-          <p:cNvPr id="5" name="Oval 4">
-            <a:extLst>
-              <a:ext uri="{FF2B5EF4-FFF2-40B4-BE49-F238E27FC236}">
-                <a16:creationId xmlns:a16="http://schemas.microsoft.com/office/drawing/2014/main" id="{E647D604-AEA9-AD2F-ED25-7CEAA0605509}"/>
+          <p:cNvPr id="19" name="Rectangle 18">
+            <a:extLst>
+              <a:ext uri="{FF2B5EF4-FFF2-40B4-BE49-F238E27FC236}">
+                <a16:creationId xmlns:a16="http://schemas.microsoft.com/office/drawing/2014/main" id="{A726B0CE-594C-9AE0-3D98-8937ACE9C36B}"/>
+              </a:ext>
+            </a:extLst>
+          </p:cNvPr>
+          <p:cNvSpPr/>
+          <p:nvPr/>
+        </p:nvSpPr>
+        <p:spPr>
+          <a:xfrm>
+            <a:off x="3327982" y="2756952"/>
+            <a:ext cx="1371600" cy="1411550"/>
+          </a:xfrm>
+          <a:prstGeom prst="rect">
+            <a:avLst/>
+          </a:prstGeom>
+          <a:noFill/>
+          <a:ln>
+            <a:solidFill>
+              <a:schemeClr val="tx1"/>
+            </a:solidFill>
+          </a:ln>
+        </p:spPr>
+        <p:style>
+          <a:lnRef idx="2">
+            <a:schemeClr val="accent1">
+              <a:shade val="15000"/>
+            </a:schemeClr>
+          </a:lnRef>
+          <a:fillRef idx="1">
+            <a:schemeClr val="accent1"/>
+          </a:fillRef>
+          <a:effectRef idx="0">
+            <a:schemeClr val="accent1"/>
+          </a:effectRef>
+          <a:fontRef idx="minor">
+            <a:schemeClr val="lt1"/>
+          </a:fontRef>
+        </p:style>
+        <p:txBody>
+          <a:bodyPr rtlCol="0" anchor="ctr"/>
+          <a:lstStyle/>
+          <a:p>
+            <a:pPr algn="ctr"/>
+            <a:endParaRPr lang="en-US"/>
+          </a:p>
+        </p:txBody>
+      </p:sp>
+      <mc:AlternateContent xmlns:mc="http://schemas.openxmlformats.org/markup-compatibility/2006">
+        <mc:Choice xmlns:a14="http://schemas.microsoft.com/office/drawing/2010/main" Requires="a14">
+          <p:sp>
+            <p:nvSpPr>
+              <p:cNvPr id="32" name="TextBox 31">
+                <a:extLst>
+                  <a:ext uri="{FF2B5EF4-FFF2-40B4-BE49-F238E27FC236}">
+                    <a16:creationId xmlns:a16="http://schemas.microsoft.com/office/drawing/2014/main" id="{1749C1C7-5CB3-FB7B-643B-1A3CA9DC4B03}"/>
+                  </a:ext>
+                </a:extLst>
+              </p:cNvPr>
+              <p:cNvSpPr txBox="1"/>
+              <p:nvPr/>
+            </p:nvSpPr>
+            <p:spPr>
+              <a:xfrm>
+                <a:off x="3336662" y="2069900"/>
+                <a:ext cx="1371600" cy="646331"/>
+              </a:xfrm>
+              <a:prstGeom prst="rect">
+                <a:avLst/>
+              </a:prstGeom>
+              <a:noFill/>
+            </p:spPr>
+            <p:txBody>
+              <a:bodyPr wrap="square" rtlCol="0">
+                <a:spAutoFit/>
+              </a:bodyPr>
+              <a:lstStyle/>
+              <a:p>
+                <a:r>
+                  <a:rPr lang="en-US" dirty="0"/>
+                  <a:t>Household </a:t>
+                </a:r>
+              </a:p>
+              <a:p>
+                <a:pPr algn="ctr"/>
+                <a14:m>
+                  <m:oMathPara xmlns:m="http://schemas.openxmlformats.org/officeDocument/2006/math">
+                    <m:oMathParaPr>
+                      <m:jc m:val="centerGroup"/>
+                    </m:oMathParaPr>
+                    <m:oMath xmlns:m="http://schemas.openxmlformats.org/officeDocument/2006/math">
+                      <m:r>
+                        <a:rPr lang="en-US" b="0" i="1" smtClean="0">
+                          <a:latin typeface="Cambria Math" panose="02040503050406030204" pitchFamily="18" charset="0"/>
+                        </a:rPr>
+                        <m:t>1</m:t>
+                      </m:r>
+                    </m:oMath>
+                  </m:oMathPara>
+                </a14:m>
+                <a:endParaRPr lang="en-US" dirty="0"/>
+              </a:p>
+            </p:txBody>
+          </p:sp>
+        </mc:Choice>
+        <mc:Fallback>
+          <p:sp>
+            <p:nvSpPr>
+              <p:cNvPr id="32" name="TextBox 31">
+                <a:extLst>
+                  <a:ext uri="{FF2B5EF4-FFF2-40B4-BE49-F238E27FC236}">
+                    <a16:creationId xmlns:a16="http://schemas.microsoft.com/office/drawing/2014/main" id="{1749C1C7-5CB3-FB7B-643B-1A3CA9DC4B03}"/>
+                  </a:ext>
+                </a:extLst>
+              </p:cNvPr>
+              <p:cNvSpPr txBox="1">
+                <a:spLocks noRot="1" noChangeAspect="1" noMove="1" noResize="1" noEditPoints="1" noAdjustHandles="1" noChangeArrowheads="1" noChangeShapeType="1" noTextEdit="1"/>
+              </p:cNvSpPr>
+              <p:nvPr/>
+            </p:nvSpPr>
+            <p:spPr>
+              <a:xfrm>
+                <a:off x="3336662" y="2069900"/>
+                <a:ext cx="1371600" cy="646331"/>
+              </a:xfrm>
+              <a:prstGeom prst="rect">
+                <a:avLst/>
+              </a:prstGeom>
+              <a:blipFill>
+                <a:blip r:embed="rId2"/>
+                <a:stretch>
+                  <a:fillRect l="-3556" t="-4717"/>
+                </a:stretch>
+              </a:blipFill>
+            </p:spPr>
+            <p:txBody>
+              <a:bodyPr/>
+              <a:lstStyle/>
+              <a:p>
+                <a:r>
+                  <a:rPr lang="en-US">
+                    <a:noFill/>
+                  </a:rPr>
+                  <a:t> </a:t>
+                </a:r>
+              </a:p>
+            </p:txBody>
+          </p:sp>
+        </mc:Fallback>
+      </mc:AlternateContent>
+      <mc:AlternateContent xmlns:mc="http://schemas.openxmlformats.org/markup-compatibility/2006">
+        <mc:Choice xmlns:a14="http://schemas.microsoft.com/office/drawing/2010/main" Requires="a14">
+          <p:sp>
+            <p:nvSpPr>
+              <p:cNvPr id="33" name="TextBox 32">
+                <a:extLst>
+                  <a:ext uri="{FF2B5EF4-FFF2-40B4-BE49-F238E27FC236}">
+                    <a16:creationId xmlns:a16="http://schemas.microsoft.com/office/drawing/2014/main" id="{313F0090-7712-76AC-555F-5B0EFAE32D87}"/>
+                  </a:ext>
+                </a:extLst>
+              </p:cNvPr>
+              <p:cNvSpPr txBox="1"/>
+              <p:nvPr/>
+            </p:nvSpPr>
+            <p:spPr>
+              <a:xfrm>
+                <a:off x="5055405" y="2064787"/>
+                <a:ext cx="1371600" cy="646331"/>
+              </a:xfrm>
+              <a:prstGeom prst="rect">
+                <a:avLst/>
+              </a:prstGeom>
+              <a:noFill/>
+            </p:spPr>
+            <p:txBody>
+              <a:bodyPr wrap="square" rtlCol="0">
+                <a:spAutoFit/>
+              </a:bodyPr>
+              <a:lstStyle/>
+              <a:p>
+                <a:r>
+                  <a:rPr lang="en-US" dirty="0"/>
+                  <a:t>Household </a:t>
+                </a:r>
+              </a:p>
+              <a:p>
+                <a:pPr algn="ctr"/>
+                <a14:m>
+                  <m:oMathPara xmlns:m="http://schemas.openxmlformats.org/officeDocument/2006/math">
+                    <m:oMathParaPr>
+                      <m:jc m:val="centerGroup"/>
+                    </m:oMathParaPr>
+                    <m:oMath xmlns:m="http://schemas.openxmlformats.org/officeDocument/2006/math">
+                      <m:r>
+                        <a:rPr lang="en-US" b="0" i="1" smtClean="0">
+                          <a:latin typeface="Cambria Math" panose="02040503050406030204" pitchFamily="18" charset="0"/>
+                        </a:rPr>
+                        <m:t>2</m:t>
+                      </m:r>
+                    </m:oMath>
+                  </m:oMathPara>
+                </a14:m>
+                <a:endParaRPr lang="en-US" dirty="0"/>
+              </a:p>
+            </p:txBody>
+          </p:sp>
+        </mc:Choice>
+        <mc:Fallback>
+          <p:sp>
+            <p:nvSpPr>
+              <p:cNvPr id="33" name="TextBox 32">
+                <a:extLst>
+                  <a:ext uri="{FF2B5EF4-FFF2-40B4-BE49-F238E27FC236}">
+                    <a16:creationId xmlns:a16="http://schemas.microsoft.com/office/drawing/2014/main" id="{313F0090-7712-76AC-555F-5B0EFAE32D87}"/>
+                  </a:ext>
+                </a:extLst>
+              </p:cNvPr>
+              <p:cNvSpPr txBox="1">
+                <a:spLocks noRot="1" noChangeAspect="1" noMove="1" noResize="1" noEditPoints="1" noAdjustHandles="1" noChangeArrowheads="1" noChangeShapeType="1" noTextEdit="1"/>
+              </p:cNvSpPr>
+              <p:nvPr/>
+            </p:nvSpPr>
+            <p:spPr>
+              <a:xfrm>
+                <a:off x="5055405" y="2064787"/>
+                <a:ext cx="1371600" cy="646331"/>
+              </a:xfrm>
+              <a:prstGeom prst="rect">
+                <a:avLst/>
+              </a:prstGeom>
+              <a:blipFill>
+                <a:blip r:embed="rId3"/>
+                <a:stretch>
+                  <a:fillRect l="-3556" t="-4717"/>
+                </a:stretch>
+              </a:blipFill>
+            </p:spPr>
+            <p:txBody>
+              <a:bodyPr/>
+              <a:lstStyle/>
+              <a:p>
+                <a:r>
+                  <a:rPr lang="en-US">
+                    <a:noFill/>
+                  </a:rPr>
+                  <a:t> </a:t>
+                </a:r>
+              </a:p>
+            </p:txBody>
+          </p:sp>
+        </mc:Fallback>
+      </mc:AlternateContent>
+      <p:sp>
+        <p:nvSpPr>
+          <p:cNvPr id="9" name="TextBox 8">
+            <a:extLst>
+              <a:ext uri="{FF2B5EF4-FFF2-40B4-BE49-F238E27FC236}">
+                <a16:creationId xmlns:a16="http://schemas.microsoft.com/office/drawing/2014/main" id="{0A1E69AB-3A34-24E1-441A-3C342625F5EB}"/>
+              </a:ext>
+            </a:extLst>
+          </p:cNvPr>
+          <p:cNvSpPr txBox="1"/>
+          <p:nvPr/>
+        </p:nvSpPr>
+        <p:spPr>
+          <a:xfrm>
+            <a:off x="659561" y="1203559"/>
+            <a:ext cx="7188122" cy="553998"/>
+          </a:xfrm>
+          <a:prstGeom prst="rect">
+            <a:avLst/>
+          </a:prstGeom>
+          <a:noFill/>
+        </p:spPr>
+        <p:txBody>
+          <a:bodyPr wrap="none" lIns="0" tIns="0" rIns="0" bIns="0" rtlCol="0">
+            <a:spAutoFit/>
+          </a:bodyPr>
+          <a:lstStyle/>
+          <a:p>
+            <a:pPr/>
+            <a:r>
+              <a:rPr lang="en-US" sz="3600" dirty="0"/>
+              <a:t>Person-level average household size</a:t>
+            </a:r>
+          </a:p>
+        </p:txBody>
+      </p:sp>
+      <mc:AlternateContent xmlns:mc="http://schemas.openxmlformats.org/markup-compatibility/2006">
+        <mc:Choice xmlns:a14="http://schemas.microsoft.com/office/drawing/2010/main" Requires="a14">
+          <p:sp>
+            <p:nvSpPr>
+              <p:cNvPr id="12" name="TextBox 11">
+                <a:extLst>
+                  <a:ext uri="{FF2B5EF4-FFF2-40B4-BE49-F238E27FC236}">
+                    <a16:creationId xmlns:a16="http://schemas.microsoft.com/office/drawing/2014/main" id="{7343C678-C484-3EDD-1DC6-CE58A7DE1CC3}"/>
+                  </a:ext>
+                </a:extLst>
+              </p:cNvPr>
+              <p:cNvSpPr txBox="1"/>
+              <p:nvPr/>
+            </p:nvSpPr>
+            <p:spPr>
+              <a:xfrm>
+                <a:off x="3284767" y="3870669"/>
+                <a:ext cx="991648" cy="338554"/>
+              </a:xfrm>
+              <a:prstGeom prst="rect">
+                <a:avLst/>
+              </a:prstGeom>
+              <a:noFill/>
+            </p:spPr>
+            <p:txBody>
+              <a:bodyPr wrap="square" rtlCol="0">
+                <a:spAutoFit/>
+              </a:bodyPr>
+              <a:lstStyle/>
+              <a:p>
+                <a:pPr algn="ctr"/>
+                <a14:m>
+                  <m:oMathPara xmlns:m="http://schemas.openxmlformats.org/officeDocument/2006/math">
+                    <m:oMathParaPr>
+                      <m:jc m:val="centerGroup"/>
+                    </m:oMathParaPr>
+                    <m:oMath xmlns:m="http://schemas.openxmlformats.org/officeDocument/2006/math">
+                      <m:sSub>
+                        <m:sSubPr>
+                          <m:ctrlPr>
+                            <a:rPr lang="en-US" sz="1600" b="0" i="1" smtClean="0">
+                              <a:latin typeface="Cambria Math" panose="02040503050406030204" pitchFamily="18" charset="0"/>
+                            </a:rPr>
+                          </m:ctrlPr>
+                        </m:sSubPr>
+                        <m:e>
+                          <m:r>
+                            <a:rPr lang="en-US" sz="1600" b="0" i="1" smtClean="0">
+                              <a:latin typeface="Cambria Math" panose="02040503050406030204" pitchFamily="18" charset="0"/>
+                            </a:rPr>
+                            <m:t>𝑚</m:t>
+                          </m:r>
+                        </m:e>
+                        <m:sub>
+                          <m:r>
+                            <a:rPr lang="en-US" sz="1600" b="0" i="1" smtClean="0">
+                              <a:latin typeface="Cambria Math" panose="02040503050406030204" pitchFamily="18" charset="0"/>
+                            </a:rPr>
+                            <m:t>1</m:t>
+                          </m:r>
+                        </m:sub>
+                      </m:sSub>
+                      <m:r>
+                        <a:rPr lang="en-US" sz="1600" b="0" i="1" smtClean="0">
+                          <a:latin typeface="Cambria Math" panose="02040503050406030204" pitchFamily="18" charset="0"/>
+                        </a:rPr>
+                        <m:t>=</m:t>
+                      </m:r>
+                      <m:r>
+                        <a:rPr lang="en-US" sz="1600" b="0" i="1" smtClean="0">
+                          <a:latin typeface="Cambria Math" panose="02040503050406030204" pitchFamily="18" charset="0"/>
+                        </a:rPr>
+                        <m:t>3</m:t>
+                      </m:r>
+                    </m:oMath>
+                  </m:oMathPara>
+                </a14:m>
+                <a:endParaRPr lang="en-US" sz="1600" dirty="0"/>
+              </a:p>
+            </p:txBody>
+          </p:sp>
+        </mc:Choice>
+        <mc:Fallback>
+          <p:sp>
+            <p:nvSpPr>
+              <p:cNvPr id="12" name="TextBox 11">
+                <a:extLst>
+                  <a:ext uri="{FF2B5EF4-FFF2-40B4-BE49-F238E27FC236}">
+                    <a16:creationId xmlns:a16="http://schemas.microsoft.com/office/drawing/2014/main" id="{7343C678-C484-3EDD-1DC6-CE58A7DE1CC3}"/>
+                  </a:ext>
+                </a:extLst>
+              </p:cNvPr>
+              <p:cNvSpPr txBox="1">
+                <a:spLocks noRot="1" noChangeAspect="1" noMove="1" noResize="1" noEditPoints="1" noAdjustHandles="1" noChangeArrowheads="1" noChangeShapeType="1" noTextEdit="1"/>
+              </p:cNvSpPr>
+              <p:nvPr/>
+            </p:nvSpPr>
+            <p:spPr>
+              <a:xfrm>
+                <a:off x="3284767" y="3870669"/>
+                <a:ext cx="991648" cy="338554"/>
+              </a:xfrm>
+              <a:prstGeom prst="rect">
+                <a:avLst/>
+              </a:prstGeom>
+              <a:blipFill>
+                <a:blip r:embed="rId4"/>
+                <a:stretch>
+                  <a:fillRect/>
+                </a:stretch>
+              </a:blipFill>
+            </p:spPr>
+            <p:txBody>
+              <a:bodyPr/>
+              <a:lstStyle/>
+              <a:p>
+                <a:r>
+                  <a:rPr lang="en-US">
+                    <a:noFill/>
+                  </a:rPr>
+                  <a:t> </a:t>
+                </a:r>
+              </a:p>
+            </p:txBody>
+          </p:sp>
+        </mc:Fallback>
+      </mc:AlternateContent>
+      <p:sp>
+        <p:nvSpPr>
+          <p:cNvPr id="4" name="Oval 3">
+            <a:extLst>
+              <a:ext uri="{FF2B5EF4-FFF2-40B4-BE49-F238E27FC236}">
+                <a16:creationId xmlns:a16="http://schemas.microsoft.com/office/drawing/2014/main" id="{CE57E54F-4D18-802B-9E5E-05025A8B4A35}"/>
+              </a:ext>
+            </a:extLst>
+          </p:cNvPr>
+          <p:cNvSpPr/>
+          <p:nvPr/>
+        </p:nvSpPr>
+        <p:spPr>
+          <a:xfrm>
+            <a:off x="5621658" y="3325567"/>
+            <a:ext cx="274320" cy="274320"/>
+          </a:xfrm>
+          <a:prstGeom prst="ellipse">
+            <a:avLst/>
+          </a:prstGeom>
+          <a:noFill/>
+          <a:ln>
+            <a:solidFill>
+              <a:schemeClr val="tx1"/>
+            </a:solidFill>
+          </a:ln>
+        </p:spPr>
+        <p:style>
+          <a:lnRef idx="2">
+            <a:schemeClr val="accent1">
+              <a:shade val="15000"/>
+            </a:schemeClr>
+          </a:lnRef>
+          <a:fillRef idx="1">
+            <a:schemeClr val="accent1"/>
+          </a:fillRef>
+          <a:effectRef idx="0">
+            <a:schemeClr val="accent1"/>
+          </a:effectRef>
+          <a:fontRef idx="minor">
+            <a:schemeClr val="lt1"/>
+          </a:fontRef>
+        </p:style>
+        <p:txBody>
+          <a:bodyPr rtlCol="0" anchor="ctr"/>
+          <a:lstStyle/>
+          <a:p>
+            <a:pPr algn="ctr"/>
+            <a:endParaRPr lang="en-US"/>
+          </a:p>
+        </p:txBody>
+      </p:sp>
+      <p:sp>
+        <p:nvSpPr>
+          <p:cNvPr id="13" name="Rectangle 12">
+            <a:extLst>
+              <a:ext uri="{FF2B5EF4-FFF2-40B4-BE49-F238E27FC236}">
+                <a16:creationId xmlns:a16="http://schemas.microsoft.com/office/drawing/2014/main" id="{0E08D9FB-60DA-D8AB-FB2D-06E5BCBAAE7E}"/>
+              </a:ext>
+            </a:extLst>
+          </p:cNvPr>
+          <p:cNvSpPr/>
+          <p:nvPr/>
+        </p:nvSpPr>
+        <p:spPr>
+          <a:xfrm>
+            <a:off x="5073018" y="2756952"/>
+            <a:ext cx="1371600" cy="1411550"/>
+          </a:xfrm>
+          <a:prstGeom prst="rect">
+            <a:avLst/>
+          </a:prstGeom>
+          <a:noFill/>
+          <a:ln>
+            <a:solidFill>
+              <a:schemeClr val="tx1"/>
+            </a:solidFill>
+          </a:ln>
+        </p:spPr>
+        <p:style>
+          <a:lnRef idx="2">
+            <a:schemeClr val="accent1">
+              <a:shade val="15000"/>
+            </a:schemeClr>
+          </a:lnRef>
+          <a:fillRef idx="1">
+            <a:schemeClr val="accent1"/>
+          </a:fillRef>
+          <a:effectRef idx="0">
+            <a:schemeClr val="accent1"/>
+          </a:effectRef>
+          <a:fontRef idx="minor">
+            <a:schemeClr val="lt1"/>
+          </a:fontRef>
+        </p:style>
+        <p:txBody>
+          <a:bodyPr rtlCol="0" anchor="ctr"/>
+          <a:lstStyle/>
+          <a:p>
+            <a:pPr algn="ctr"/>
+            <a:endParaRPr lang="en-US"/>
+          </a:p>
+        </p:txBody>
+      </p:sp>
+      <p:sp>
+        <p:nvSpPr>
+          <p:cNvPr id="20" name="Oval 19">
+            <a:extLst>
+              <a:ext uri="{FF2B5EF4-FFF2-40B4-BE49-F238E27FC236}">
+                <a16:creationId xmlns:a16="http://schemas.microsoft.com/office/drawing/2014/main" id="{DCE414D2-C5A9-FB4D-8FE4-EAE3F6E4632A}"/>
+              </a:ext>
+            </a:extLst>
+          </p:cNvPr>
+          <p:cNvSpPr/>
+          <p:nvPr/>
+        </p:nvSpPr>
+        <p:spPr>
+          <a:xfrm>
+            <a:off x="4082823" y="3515496"/>
+            <a:ext cx="274320" cy="274320"/>
+          </a:xfrm>
+          <a:prstGeom prst="ellipse">
+            <a:avLst/>
+          </a:prstGeom>
+          <a:noFill/>
+          <a:ln>
+            <a:solidFill>
+              <a:schemeClr val="tx1"/>
+            </a:solidFill>
+          </a:ln>
+        </p:spPr>
+        <p:style>
+          <a:lnRef idx="2">
+            <a:schemeClr val="accent1">
+              <a:shade val="15000"/>
+            </a:schemeClr>
+          </a:lnRef>
+          <a:fillRef idx="1">
+            <a:schemeClr val="accent1"/>
+          </a:fillRef>
+          <a:effectRef idx="0">
+            <a:schemeClr val="accent1"/>
+          </a:effectRef>
+          <a:fontRef idx="minor">
+            <a:schemeClr val="lt1"/>
+          </a:fontRef>
+        </p:style>
+        <p:txBody>
+          <a:bodyPr rtlCol="0" anchor="ctr"/>
+          <a:lstStyle/>
+          <a:p>
+            <a:pPr algn="ctr"/>
+            <a:endParaRPr lang="en-US"/>
+          </a:p>
+        </p:txBody>
+      </p:sp>
+      <p:sp>
+        <p:nvSpPr>
+          <p:cNvPr id="21" name="Oval 20">
+            <a:extLst>
+              <a:ext uri="{FF2B5EF4-FFF2-40B4-BE49-F238E27FC236}">
+                <a16:creationId xmlns:a16="http://schemas.microsoft.com/office/drawing/2014/main" id="{3D4850CF-E188-44C7-72C1-BC0067BE857E}"/>
+              </a:ext>
+            </a:extLst>
+          </p:cNvPr>
+          <p:cNvSpPr/>
+          <p:nvPr/>
+        </p:nvSpPr>
+        <p:spPr>
+          <a:xfrm>
+            <a:off x="3876622" y="3116912"/>
+            <a:ext cx="274320" cy="274320"/>
+          </a:xfrm>
+          <a:prstGeom prst="ellipse">
+            <a:avLst/>
+          </a:prstGeom>
+          <a:noFill/>
+          <a:ln>
+            <a:solidFill>
+              <a:schemeClr val="tx1"/>
+            </a:solidFill>
+          </a:ln>
+        </p:spPr>
+        <p:style>
+          <a:lnRef idx="2">
+            <a:schemeClr val="accent1">
+              <a:shade val="15000"/>
+            </a:schemeClr>
+          </a:lnRef>
+          <a:fillRef idx="1">
+            <a:schemeClr val="accent1"/>
+          </a:fillRef>
+          <a:effectRef idx="0">
+            <a:schemeClr val="accent1"/>
+          </a:effectRef>
+          <a:fontRef idx="minor">
+            <a:schemeClr val="lt1"/>
+          </a:fontRef>
+        </p:style>
+        <p:txBody>
+          <a:bodyPr rtlCol="0" anchor="ctr"/>
+          <a:lstStyle/>
+          <a:p>
+            <a:pPr algn="ctr"/>
+            <a:endParaRPr lang="en-US"/>
+          </a:p>
+        </p:txBody>
+      </p:sp>
+      <mc:AlternateContent xmlns:mc="http://schemas.openxmlformats.org/markup-compatibility/2006">
+        <mc:Choice xmlns:a14="http://schemas.microsoft.com/office/drawing/2010/main" Requires="a14">
+          <p:sp>
+            <p:nvSpPr>
+              <p:cNvPr id="24" name="TextBox 23">
+                <a:extLst>
+                  <a:ext uri="{FF2B5EF4-FFF2-40B4-BE49-F238E27FC236}">
+                    <a16:creationId xmlns:a16="http://schemas.microsoft.com/office/drawing/2014/main" id="{9A82AA74-379B-4882-2A84-486233F758D7}"/>
+                  </a:ext>
+                </a:extLst>
+              </p:cNvPr>
+              <p:cNvSpPr txBox="1"/>
+              <p:nvPr/>
+            </p:nvSpPr>
+            <p:spPr>
+              <a:xfrm>
+                <a:off x="5055405" y="3829948"/>
+                <a:ext cx="991648" cy="338554"/>
+              </a:xfrm>
+              <a:prstGeom prst="rect">
+                <a:avLst/>
+              </a:prstGeom>
+              <a:noFill/>
+            </p:spPr>
+            <p:txBody>
+              <a:bodyPr wrap="square" rtlCol="0">
+                <a:spAutoFit/>
+              </a:bodyPr>
+              <a:lstStyle/>
+              <a:p>
+                <a:pPr algn="ctr"/>
+                <a14:m>
+                  <m:oMathPara xmlns:m="http://schemas.openxmlformats.org/officeDocument/2006/math">
+                    <m:oMathParaPr>
+                      <m:jc m:val="centerGroup"/>
+                    </m:oMathParaPr>
+                    <m:oMath xmlns:m="http://schemas.openxmlformats.org/officeDocument/2006/math">
+                      <m:sSub>
+                        <m:sSubPr>
+                          <m:ctrlPr>
+                            <a:rPr lang="en-US" sz="1600" b="0" i="1" smtClean="0">
+                              <a:latin typeface="Cambria Math" panose="02040503050406030204" pitchFamily="18" charset="0"/>
+                            </a:rPr>
+                          </m:ctrlPr>
+                        </m:sSubPr>
+                        <m:e>
+                          <m:r>
+                            <a:rPr lang="en-US" sz="1600" b="0" i="1" smtClean="0">
+                              <a:latin typeface="Cambria Math" panose="02040503050406030204" pitchFamily="18" charset="0"/>
+                            </a:rPr>
+                            <m:t>𝑚</m:t>
+                          </m:r>
+                        </m:e>
+                        <m:sub>
+                          <m:r>
+                            <a:rPr lang="en-US" sz="1600" b="0" i="1" smtClean="0">
+                              <a:latin typeface="Cambria Math" panose="02040503050406030204" pitchFamily="18" charset="0"/>
+                            </a:rPr>
+                            <m:t>2</m:t>
+                          </m:r>
+                        </m:sub>
+                      </m:sSub>
+                      <m:r>
+                        <a:rPr lang="en-US" sz="1600" b="0" i="1" smtClean="0">
+                          <a:latin typeface="Cambria Math" panose="02040503050406030204" pitchFamily="18" charset="0"/>
+                        </a:rPr>
+                        <m:t>=</m:t>
+                      </m:r>
+                      <m:r>
+                        <a:rPr lang="en-US" sz="1600" b="0" i="1" smtClean="0">
+                          <a:latin typeface="Cambria Math" panose="02040503050406030204" pitchFamily="18" charset="0"/>
+                        </a:rPr>
+                        <m:t>1</m:t>
+                      </m:r>
+                    </m:oMath>
+                  </m:oMathPara>
+                </a14:m>
+                <a:endParaRPr lang="en-US" sz="1600" dirty="0"/>
+              </a:p>
+            </p:txBody>
+          </p:sp>
+        </mc:Choice>
+        <mc:Fallback>
+          <p:sp>
+            <p:nvSpPr>
+              <p:cNvPr id="24" name="TextBox 23">
+                <a:extLst>
+                  <a:ext uri="{FF2B5EF4-FFF2-40B4-BE49-F238E27FC236}">
+                    <a16:creationId xmlns:a16="http://schemas.microsoft.com/office/drawing/2014/main" id="{9A82AA74-379B-4882-2A84-486233F758D7}"/>
+                  </a:ext>
+                </a:extLst>
+              </p:cNvPr>
+              <p:cNvSpPr txBox="1">
+                <a:spLocks noRot="1" noChangeAspect="1" noMove="1" noResize="1" noEditPoints="1" noAdjustHandles="1" noChangeArrowheads="1" noChangeShapeType="1" noTextEdit="1"/>
+              </p:cNvSpPr>
+              <p:nvPr/>
+            </p:nvSpPr>
+            <p:spPr>
+              <a:xfrm>
+                <a:off x="5055405" y="3829948"/>
+                <a:ext cx="991648" cy="338554"/>
+              </a:xfrm>
+              <a:prstGeom prst="rect">
+                <a:avLst/>
+              </a:prstGeom>
+              <a:blipFill>
+                <a:blip r:embed="rId5"/>
+                <a:stretch>
+                  <a:fillRect/>
+                </a:stretch>
+              </a:blipFill>
+            </p:spPr>
+            <p:txBody>
+              <a:bodyPr/>
+              <a:lstStyle/>
+              <a:p>
+                <a:r>
+                  <a:rPr lang="en-US">
+                    <a:noFill/>
+                  </a:rPr>
+                  <a:t> </a:t>
+                </a:r>
+              </a:p>
+            </p:txBody>
+          </p:sp>
+        </mc:Fallback>
+      </mc:AlternateContent>
+      <mc:AlternateContent xmlns:mc="http://schemas.openxmlformats.org/markup-compatibility/2006">
+        <mc:Choice xmlns:a14="http://schemas.microsoft.com/office/drawing/2010/main" Requires="a14">
+          <p:sp>
+            <p:nvSpPr>
+              <p:cNvPr id="25" name="TextBox 24">
+                <a:extLst>
+                  <a:ext uri="{FF2B5EF4-FFF2-40B4-BE49-F238E27FC236}">
+                    <a16:creationId xmlns:a16="http://schemas.microsoft.com/office/drawing/2014/main" id="{43F3A35B-B807-D63A-40C8-A4185F79BE12}"/>
+                  </a:ext>
+                </a:extLst>
+              </p:cNvPr>
+              <p:cNvSpPr txBox="1"/>
+              <p:nvPr/>
+            </p:nvSpPr>
+            <p:spPr>
+              <a:xfrm>
+                <a:off x="6258275" y="6053308"/>
+                <a:ext cx="875881" cy="516745"/>
+              </a:xfrm>
+              <a:prstGeom prst="rect">
+                <a:avLst/>
+              </a:prstGeom>
+              <a:noFill/>
+            </p:spPr>
+            <p:txBody>
+              <a:bodyPr wrap="none" lIns="0" tIns="0" rIns="0" bIns="0" rtlCol="0">
+                <a:spAutoFit/>
+              </a:bodyPr>
+              <a:lstStyle/>
+              <a:p>
+                <a14:m>
+                  <m:oMathPara xmlns:m="http://schemas.openxmlformats.org/officeDocument/2006/math">
+                    <m:oMathParaPr>
+                      <m:jc m:val="centerGroup"/>
+                    </m:oMathParaPr>
+                    <m:oMath xmlns:m="http://schemas.openxmlformats.org/officeDocument/2006/math">
+                      <m:sSub>
+                        <m:sSubPr>
+                          <m:ctrlPr>
+                            <a:rPr lang="en-US" b="0" i="1" smtClean="0">
+                              <a:latin typeface="Cambria Math" panose="02040503050406030204" pitchFamily="18" charset="0"/>
+                            </a:rPr>
+                          </m:ctrlPr>
+                        </m:sSubPr>
+                        <m:e>
+                          <m:r>
+                            <a:rPr lang="en-US" b="0" i="1" smtClean="0">
+                              <a:latin typeface="Cambria Math" panose="02040503050406030204" pitchFamily="18" charset="0"/>
+                            </a:rPr>
+                            <m:t>𝑀</m:t>
+                          </m:r>
+                        </m:e>
+                        <m:sub>
+                          <m:r>
+                            <a:rPr lang="en-US" b="0" i="1" smtClean="0">
+                              <a:latin typeface="Cambria Math" panose="02040503050406030204" pitchFamily="18" charset="0"/>
+                            </a:rPr>
+                            <m:t>h</m:t>
+                          </m:r>
+                        </m:sub>
+                      </m:sSub>
+                      <m:r>
+                        <a:rPr lang="en-US" b="0" i="1" smtClean="0">
+                          <a:latin typeface="Cambria Math" panose="02040503050406030204" pitchFamily="18" charset="0"/>
+                        </a:rPr>
+                        <m:t>= </m:t>
+                      </m:r>
+                      <m:f>
+                        <m:fPr>
+                          <m:ctrlPr>
+                            <a:rPr lang="en-US" b="0" i="1" smtClean="0">
+                              <a:latin typeface="Cambria Math" panose="02040503050406030204" pitchFamily="18" charset="0"/>
+                            </a:rPr>
+                          </m:ctrlPr>
+                        </m:fPr>
+                        <m:num>
+                          <m:r>
+                            <a:rPr lang="en-US" b="0" i="1" smtClean="0">
+                              <a:latin typeface="Cambria Math" panose="02040503050406030204" pitchFamily="18" charset="0"/>
+                            </a:rPr>
+                            <m:t>𝑃</m:t>
+                          </m:r>
+                        </m:num>
+                        <m:den>
+                          <m:r>
+                            <a:rPr lang="en-US" b="0" i="1" smtClean="0">
+                              <a:latin typeface="Cambria Math" panose="02040503050406030204" pitchFamily="18" charset="0"/>
+                            </a:rPr>
+                            <m:t>𝐻</m:t>
+                          </m:r>
+                        </m:den>
+                      </m:f>
+                    </m:oMath>
+                  </m:oMathPara>
+                </a14:m>
+                <a:endParaRPr lang="en-US" b="0" dirty="0"/>
+              </a:p>
+            </p:txBody>
+          </p:sp>
+        </mc:Choice>
+        <mc:Fallback>
+          <p:sp>
+            <p:nvSpPr>
+              <p:cNvPr id="25" name="TextBox 24">
+                <a:extLst>
+                  <a:ext uri="{FF2B5EF4-FFF2-40B4-BE49-F238E27FC236}">
+                    <a16:creationId xmlns:a16="http://schemas.microsoft.com/office/drawing/2014/main" id="{43F3A35B-B807-D63A-40C8-A4185F79BE12}"/>
+                  </a:ext>
+                </a:extLst>
+              </p:cNvPr>
+              <p:cNvSpPr txBox="1">
+                <a:spLocks noRot="1" noChangeAspect="1" noMove="1" noResize="1" noEditPoints="1" noAdjustHandles="1" noChangeArrowheads="1" noChangeShapeType="1" noTextEdit="1"/>
+              </p:cNvSpPr>
+              <p:nvPr/>
+            </p:nvSpPr>
+            <p:spPr>
+              <a:xfrm>
+                <a:off x="6258275" y="6053308"/>
+                <a:ext cx="875881" cy="516745"/>
+              </a:xfrm>
+              <a:prstGeom prst="rect">
+                <a:avLst/>
+              </a:prstGeom>
+              <a:blipFill>
+                <a:blip r:embed="rId6"/>
+                <a:stretch>
+                  <a:fillRect/>
+                </a:stretch>
+              </a:blipFill>
+            </p:spPr>
+            <p:txBody>
+              <a:bodyPr/>
+              <a:lstStyle/>
+              <a:p>
+                <a:r>
+                  <a:rPr lang="en-US">
+                    <a:noFill/>
+                  </a:rPr>
+                  <a:t> </a:t>
+                </a:r>
+              </a:p>
+            </p:txBody>
+          </p:sp>
+        </mc:Fallback>
+      </mc:AlternateContent>
+      <p:sp>
+        <p:nvSpPr>
+          <p:cNvPr id="36" name="Oval 35">
+            <a:extLst>
+              <a:ext uri="{FF2B5EF4-FFF2-40B4-BE49-F238E27FC236}">
+                <a16:creationId xmlns:a16="http://schemas.microsoft.com/office/drawing/2014/main" id="{05277116-A78E-9B74-8077-BFEBA711148D}"/>
               </a:ext>
             </a:extLst>
           </p:cNvPr>
@@ -4462,10 +5363,250 @@
       </p:sp>
       <p:sp>
         <p:nvSpPr>
+          <p:cNvPr id="42" name="Rectangle 41">
+            <a:extLst>
+              <a:ext uri="{FF2B5EF4-FFF2-40B4-BE49-F238E27FC236}">
+                <a16:creationId xmlns:a16="http://schemas.microsoft.com/office/drawing/2014/main" id="{1EF8F576-16BE-D97C-5A96-DD32C6AA5305}"/>
+              </a:ext>
+            </a:extLst>
+          </p:cNvPr>
+          <p:cNvSpPr/>
+          <p:nvPr/>
+        </p:nvSpPr>
+        <p:spPr>
+          <a:xfrm>
+            <a:off x="659561" y="2723225"/>
+            <a:ext cx="1371600" cy="1411550"/>
+          </a:xfrm>
+          <a:prstGeom prst="rect">
+            <a:avLst/>
+          </a:prstGeom>
+          <a:noFill/>
+          <a:ln>
+            <a:noFill/>
+          </a:ln>
+        </p:spPr>
+        <p:style>
+          <a:lnRef idx="2">
+            <a:schemeClr val="accent1">
+              <a:shade val="15000"/>
+            </a:schemeClr>
+          </a:lnRef>
+          <a:fillRef idx="1">
+            <a:schemeClr val="accent1"/>
+          </a:fillRef>
+          <a:effectRef idx="0">
+            <a:schemeClr val="accent1"/>
+          </a:effectRef>
+          <a:fontRef idx="minor">
+            <a:schemeClr val="lt1"/>
+          </a:fontRef>
+        </p:style>
+        <p:txBody>
+          <a:bodyPr rtlCol="0" anchor="ctr"/>
+          <a:lstStyle/>
+          <a:p>
+            <a:pPr algn="ctr"/>
+            <a:endParaRPr lang="en-US"/>
+          </a:p>
+        </p:txBody>
+      </p:sp>
+      <p:sp>
+        <p:nvSpPr>
+          <p:cNvPr id="43" name="Rectangle 42">
+            <a:extLst>
+              <a:ext uri="{FF2B5EF4-FFF2-40B4-BE49-F238E27FC236}">
+                <a16:creationId xmlns:a16="http://schemas.microsoft.com/office/drawing/2014/main" id="{214133FA-6DB9-FA7D-37C9-70E625B5B229}"/>
+              </a:ext>
+            </a:extLst>
+          </p:cNvPr>
+          <p:cNvSpPr/>
+          <p:nvPr/>
+        </p:nvSpPr>
+        <p:spPr>
+          <a:xfrm>
+            <a:off x="3327982" y="2756952"/>
+            <a:ext cx="1371600" cy="1411550"/>
+          </a:xfrm>
+          <a:prstGeom prst="rect">
+            <a:avLst/>
+          </a:prstGeom>
+          <a:noFill/>
+          <a:ln>
+            <a:solidFill>
+              <a:schemeClr val="tx1"/>
+            </a:solidFill>
+          </a:ln>
+        </p:spPr>
+        <p:style>
+          <a:lnRef idx="2">
+            <a:schemeClr val="accent1">
+              <a:shade val="15000"/>
+            </a:schemeClr>
+          </a:lnRef>
+          <a:fillRef idx="1">
+            <a:schemeClr val="accent1"/>
+          </a:fillRef>
+          <a:effectRef idx="0">
+            <a:schemeClr val="accent1"/>
+          </a:effectRef>
+          <a:fontRef idx="minor">
+            <a:schemeClr val="lt1"/>
+          </a:fontRef>
+        </p:style>
+        <p:txBody>
+          <a:bodyPr rtlCol="0" anchor="ctr"/>
+          <a:lstStyle/>
+          <a:p>
+            <a:pPr algn="ctr"/>
+            <a:endParaRPr lang="en-US"/>
+          </a:p>
+        </p:txBody>
+      </p:sp>
+      <p:sp>
+        <p:nvSpPr>
+          <p:cNvPr id="49" name="Rectangle 48">
+            <a:extLst>
+              <a:ext uri="{FF2B5EF4-FFF2-40B4-BE49-F238E27FC236}">
+                <a16:creationId xmlns:a16="http://schemas.microsoft.com/office/drawing/2014/main" id="{23A01E58-04BB-5694-7988-78D6BD69DEEF}"/>
+              </a:ext>
+            </a:extLst>
+          </p:cNvPr>
+          <p:cNvSpPr/>
+          <p:nvPr/>
+        </p:nvSpPr>
+        <p:spPr>
+          <a:xfrm>
+            <a:off x="7755070" y="2756952"/>
+            <a:ext cx="1371600" cy="1411550"/>
+          </a:xfrm>
+          <a:prstGeom prst="rect">
+            <a:avLst/>
+          </a:prstGeom>
+          <a:noFill/>
+          <a:ln>
+            <a:noFill/>
+          </a:ln>
+        </p:spPr>
+        <p:style>
+          <a:lnRef idx="2">
+            <a:schemeClr val="accent1">
+              <a:shade val="15000"/>
+            </a:schemeClr>
+          </a:lnRef>
+          <a:fillRef idx="1">
+            <a:schemeClr val="accent1"/>
+          </a:fillRef>
+          <a:effectRef idx="0">
+            <a:schemeClr val="accent1"/>
+          </a:effectRef>
+          <a:fontRef idx="minor">
+            <a:schemeClr val="lt1"/>
+          </a:fontRef>
+        </p:style>
+        <p:txBody>
+          <a:bodyPr rtlCol="0" anchor="ctr"/>
+          <a:lstStyle/>
+          <a:p>
+            <a:pPr algn="ctr"/>
+            <a:endParaRPr lang="en-US"/>
+          </a:p>
+        </p:txBody>
+      </p:sp>
+    </p:spTree>
+    <p:extLst>
+      <p:ext uri="{BB962C8B-B14F-4D97-AF65-F5344CB8AC3E}">
+        <p14:creationId xmlns:p14="http://schemas.microsoft.com/office/powerpoint/2010/main" val="2696115594"/>
+      </p:ext>
+    </p:extLst>
+  </p:cSld>
+  <p:clrMapOvr>
+    <a:masterClrMapping/>
+  </p:clrMapOvr>
+</p:sld>
+</file>
+
+<file path=ppt/slides/slide3.xml><?xml version="1.0" encoding="utf-8"?>
+<p:sld xmlns:a="http://schemas.openxmlformats.org/drawingml/2006/main" xmlns:r="http://schemas.openxmlformats.org/officeDocument/2006/relationships" xmlns:p="http://schemas.openxmlformats.org/presentationml/2006/main">
+  <p:cSld>
+    <p:spTree>
+      <p:nvGrpSpPr>
+        <p:cNvPr id="1" name="">
+          <a:extLst>
+            <a:ext uri="{FF2B5EF4-FFF2-40B4-BE49-F238E27FC236}">
+              <a16:creationId xmlns:a16="http://schemas.microsoft.com/office/drawing/2014/main" id="{7143E370-57FD-1E5A-00FF-3FF82D239DC2}"/>
+            </a:ext>
+          </a:extLst>
+        </p:cNvPr>
+        <p:cNvGrpSpPr/>
+        <p:nvPr/>
+      </p:nvGrpSpPr>
+      <p:grpSpPr>
+        <a:xfrm>
+          <a:off x="0" y="0"/>
+          <a:ext cx="0" cy="0"/>
+          <a:chOff x="0" y="0"/>
+          <a:chExt cx="0" cy="0"/>
+        </a:xfrm>
+      </p:grpSpPr>
+      <p:sp>
+        <p:nvSpPr>
+          <p:cNvPr id="5" name="Oval 4">
+            <a:extLst>
+              <a:ext uri="{FF2B5EF4-FFF2-40B4-BE49-F238E27FC236}">
+                <a16:creationId xmlns:a16="http://schemas.microsoft.com/office/drawing/2014/main" id="{2F791112-608B-43BF-E3F3-4D09E54FAA6E}"/>
+              </a:ext>
+            </a:extLst>
+          </p:cNvPr>
+          <p:cNvSpPr/>
+          <p:nvPr/>
+        </p:nvSpPr>
+        <p:spPr>
+          <a:xfrm>
+            <a:off x="3655253" y="3516055"/>
+            <a:ext cx="274320" cy="274320"/>
+          </a:xfrm>
+          <a:prstGeom prst="ellipse">
+            <a:avLst/>
+          </a:prstGeom>
+          <a:noFill/>
+          <a:ln>
+            <a:solidFill>
+              <a:schemeClr val="tx1"/>
+            </a:solidFill>
+          </a:ln>
+        </p:spPr>
+        <p:style>
+          <a:lnRef idx="2">
+            <a:schemeClr val="accent1">
+              <a:shade val="15000"/>
+            </a:schemeClr>
+          </a:lnRef>
+          <a:fillRef idx="1">
+            <a:schemeClr val="accent1"/>
+          </a:fillRef>
+          <a:effectRef idx="0">
+            <a:schemeClr val="accent1"/>
+          </a:effectRef>
+          <a:fontRef idx="minor">
+            <a:schemeClr val="lt1"/>
+          </a:fontRef>
+        </p:style>
+        <p:txBody>
+          <a:bodyPr rtlCol="0" anchor="ctr"/>
+          <a:lstStyle/>
+          <a:p>
+            <a:pPr algn="ctr"/>
+            <a:endParaRPr lang="en-US"/>
+          </a:p>
+        </p:txBody>
+      </p:sp>
+      <p:sp>
+        <p:nvSpPr>
           <p:cNvPr id="6" name="Oval 5">
             <a:extLst>
               <a:ext uri="{FF2B5EF4-FFF2-40B4-BE49-F238E27FC236}">
-                <a16:creationId xmlns:a16="http://schemas.microsoft.com/office/drawing/2014/main" id="{5CB29627-146C-B9A3-C685-02C6E69F328E}"/>
+                <a16:creationId xmlns:a16="http://schemas.microsoft.com/office/drawing/2014/main" id="{A9654431-90AB-60A2-B65B-373FBA38BA22}"/>
               </a:ext>
             </a:extLst>
           </p:cNvPr>
@@ -4517,7 +5658,7 @@
           <p:cNvPr id="7" name="Oval 6">
             <a:extLst>
               <a:ext uri="{FF2B5EF4-FFF2-40B4-BE49-F238E27FC236}">
-                <a16:creationId xmlns:a16="http://schemas.microsoft.com/office/drawing/2014/main" id="{0E920BBA-BFA8-BBFE-A1FF-95FB164B7BFC}"/>
+                <a16:creationId xmlns:a16="http://schemas.microsoft.com/office/drawing/2014/main" id="{7B7D01AB-90F7-B655-F2A6-4AE6FF64BD48}"/>
               </a:ext>
             </a:extLst>
           </p:cNvPr>
@@ -4570,7 +5711,7 @@
           <p:cNvPr id="8" name="Oval 7">
             <a:extLst>
               <a:ext uri="{FF2B5EF4-FFF2-40B4-BE49-F238E27FC236}">
-                <a16:creationId xmlns:a16="http://schemas.microsoft.com/office/drawing/2014/main" id="{5AE3FDA4-CF9B-D1BB-25B2-E5CC5382F63D}"/>
+                <a16:creationId xmlns:a16="http://schemas.microsoft.com/office/drawing/2014/main" id="{D09581CE-9C1D-D335-8433-BC3CE25EEC7B}"/>
               </a:ext>
             </a:extLst>
           </p:cNvPr>
@@ -4622,7 +5763,7 @@
           <p:cNvPr id="16" name="Oval 15">
             <a:extLst>
               <a:ext uri="{FF2B5EF4-FFF2-40B4-BE49-F238E27FC236}">
-                <a16:creationId xmlns:a16="http://schemas.microsoft.com/office/drawing/2014/main" id="{6C116D22-E201-42BC-5341-B3D4B4D85399}"/>
+                <a16:creationId xmlns:a16="http://schemas.microsoft.com/office/drawing/2014/main" id="{FD871282-5E84-B5B0-C752-E334FE881D62}"/>
               </a:ext>
             </a:extLst>
           </p:cNvPr>
@@ -4674,7 +5815,7 @@
           <p:cNvPr id="17" name="Rectangle 16">
             <a:extLst>
               <a:ext uri="{FF2B5EF4-FFF2-40B4-BE49-F238E27FC236}">
-                <a16:creationId xmlns:a16="http://schemas.microsoft.com/office/drawing/2014/main" id="{B64C0910-E928-2399-2B61-0944258BFD25}"/>
+                <a16:creationId xmlns:a16="http://schemas.microsoft.com/office/drawing/2014/main" id="{EAB2667A-B236-8593-02FD-AD890B523A33}"/>
               </a:ext>
             </a:extLst>
           </p:cNvPr>
@@ -4726,7 +5867,7 @@
           <p:cNvPr id="19" name="Rectangle 18">
             <a:extLst>
               <a:ext uri="{FF2B5EF4-FFF2-40B4-BE49-F238E27FC236}">
-                <a16:creationId xmlns:a16="http://schemas.microsoft.com/office/drawing/2014/main" id="{A726B0CE-594C-9AE0-3D98-8937ACE9C36B}"/>
+                <a16:creationId xmlns:a16="http://schemas.microsoft.com/office/drawing/2014/main" id="{5D6FA41B-BA63-30C4-A1A4-BCBCB1D8683B}"/>
               </a:ext>
             </a:extLst>
           </p:cNvPr>
@@ -4780,7 +5921,7 @@
               <p:cNvPr id="22" name="TextBox 21">
                 <a:extLst>
                   <a:ext uri="{FF2B5EF4-FFF2-40B4-BE49-F238E27FC236}">
-                    <a16:creationId xmlns:a16="http://schemas.microsoft.com/office/drawing/2014/main" id="{EDF4C7AD-CC58-F860-F6C1-B3222968BE46}"/>
+                    <a16:creationId xmlns:a16="http://schemas.microsoft.com/office/drawing/2014/main" id="{E5DFDBF4-9D8F-736C-97D6-855C86E03FFE}"/>
                   </a:ext>
                 </a:extLst>
               </p:cNvPr>
@@ -4880,7 +6021,7 @@
           <p:cNvPr id="28" name="Oval 27">
             <a:extLst>
               <a:ext uri="{FF2B5EF4-FFF2-40B4-BE49-F238E27FC236}">
-                <a16:creationId xmlns:a16="http://schemas.microsoft.com/office/drawing/2014/main" id="{CC316D0F-1E3F-0AC1-8498-6B6B7B441C09}"/>
+                <a16:creationId xmlns:a16="http://schemas.microsoft.com/office/drawing/2014/main" id="{1D970967-5852-E4F9-E19F-0D7F5A8C7810}"/>
               </a:ext>
             </a:extLst>
           </p:cNvPr>
@@ -4932,7 +6073,7 @@
           <p:cNvPr id="29" name="Oval 28">
             <a:extLst>
               <a:ext uri="{FF2B5EF4-FFF2-40B4-BE49-F238E27FC236}">
-                <a16:creationId xmlns:a16="http://schemas.microsoft.com/office/drawing/2014/main" id="{A0E501C7-7609-C152-F7DA-6246A484AC5C}"/>
+                <a16:creationId xmlns:a16="http://schemas.microsoft.com/office/drawing/2014/main" id="{1C3E6BD8-2870-FEBF-E25E-C00260E1FEB3}"/>
               </a:ext>
             </a:extLst>
           </p:cNvPr>
@@ -4984,7 +6125,7 @@
           <p:cNvPr id="30" name="Rectangle 29">
             <a:extLst>
               <a:ext uri="{FF2B5EF4-FFF2-40B4-BE49-F238E27FC236}">
-                <a16:creationId xmlns:a16="http://schemas.microsoft.com/office/drawing/2014/main" id="{98BE49F1-CCD6-D225-667A-B348B47E213C}"/>
+                <a16:creationId xmlns:a16="http://schemas.microsoft.com/office/drawing/2014/main" id="{4935097B-F7D3-996B-D9A9-115ADA1692F7}"/>
               </a:ext>
             </a:extLst>
           </p:cNvPr>
@@ -5038,7 +6179,7 @@
               <p:cNvPr id="31" name="TextBox 30">
                 <a:extLst>
                   <a:ext uri="{FF2B5EF4-FFF2-40B4-BE49-F238E27FC236}">
-                    <a16:creationId xmlns:a16="http://schemas.microsoft.com/office/drawing/2014/main" id="{FEF58902-F263-F145-A74B-9F15C98052FD}"/>
+                    <a16:creationId xmlns:a16="http://schemas.microsoft.com/office/drawing/2014/main" id="{74B4A846-8542-155D-38F5-3B9CCBE24B16}"/>
                   </a:ext>
                 </a:extLst>
               </p:cNvPr>
@@ -5140,7 +6281,7 @@
               <p:cNvPr id="32" name="TextBox 31">
                 <a:extLst>
                   <a:ext uri="{FF2B5EF4-FFF2-40B4-BE49-F238E27FC236}">
-                    <a16:creationId xmlns:a16="http://schemas.microsoft.com/office/drawing/2014/main" id="{1749C1C7-5CB3-FB7B-643B-1A3CA9DC4B03}"/>
+                    <a16:creationId xmlns:a16="http://schemas.microsoft.com/office/drawing/2014/main" id="{F2665024-A343-43D2-9E1F-035A22FDC88E}"/>
                   </a:ext>
                 </a:extLst>
               </p:cNvPr>
@@ -5242,7 +6383,7 @@
               <p:cNvPr id="33" name="TextBox 32">
                 <a:extLst>
                   <a:ext uri="{FF2B5EF4-FFF2-40B4-BE49-F238E27FC236}">
-                    <a16:creationId xmlns:a16="http://schemas.microsoft.com/office/drawing/2014/main" id="{313F0090-7712-76AC-555F-5B0EFAE32D87}"/>
+                    <a16:creationId xmlns:a16="http://schemas.microsoft.com/office/drawing/2014/main" id="{CDCA8B4C-3525-7B65-EDEB-F9895055897A}"/>
                   </a:ext>
                 </a:extLst>
               </p:cNvPr>
@@ -5348,7 +6489,7 @@
           <p:cNvPr id="34" name="TextBox 33">
             <a:extLst>
               <a:ext uri="{FF2B5EF4-FFF2-40B4-BE49-F238E27FC236}">
-                <a16:creationId xmlns:a16="http://schemas.microsoft.com/office/drawing/2014/main" id="{85C07052-111C-09DD-C713-F3D445B6B718}"/>
+                <a16:creationId xmlns:a16="http://schemas.microsoft.com/office/drawing/2014/main" id="{4567F940-0178-2744-7A05-683F607D2C1D}"/>
               </a:ext>
             </a:extLst>
           </p:cNvPr>
@@ -5384,7 +6525,7 @@
           <p:cNvPr id="35" name="TextBox 34">
             <a:extLst>
               <a:ext uri="{FF2B5EF4-FFF2-40B4-BE49-F238E27FC236}">
-                <a16:creationId xmlns:a16="http://schemas.microsoft.com/office/drawing/2014/main" id="{AEE2C469-C525-D2B3-5C0A-CD36685F433D}"/>
+                <a16:creationId xmlns:a16="http://schemas.microsoft.com/office/drawing/2014/main" id="{5283BF17-7C11-0686-9B9B-55916E41B66A}"/>
               </a:ext>
             </a:extLst>
           </p:cNvPr>
@@ -5422,7 +6563,7 @@
               <p:cNvPr id="9" name="TextBox 8">
                 <a:extLst>
                   <a:ext uri="{FF2B5EF4-FFF2-40B4-BE49-F238E27FC236}">
-                    <a16:creationId xmlns:a16="http://schemas.microsoft.com/office/drawing/2014/main" id="{0A1E69AB-3A34-24E1-441A-3C342625F5EB}"/>
+                    <a16:creationId xmlns:a16="http://schemas.microsoft.com/office/drawing/2014/main" id="{F625FAE0-B8FC-CE5C-BAF8-D62A0FDA9BE5}"/>
                   </a:ext>
                 </a:extLst>
               </p:cNvPr>
@@ -5580,7 +6721,7 @@
               <p:cNvPr id="10" name="TextBox 9">
                 <a:extLst>
                   <a:ext uri="{FF2B5EF4-FFF2-40B4-BE49-F238E27FC236}">
-                    <a16:creationId xmlns:a16="http://schemas.microsoft.com/office/drawing/2014/main" id="{169BCDE5-C572-2C0D-A2A9-57067DCE3181}"/>
+                    <a16:creationId xmlns:a16="http://schemas.microsoft.com/office/drawing/2014/main" id="{3A2B839E-BDCB-01BB-D174-5E4F2225D044}"/>
                   </a:ext>
                 </a:extLst>
               </p:cNvPr>
@@ -5701,7 +6842,7 @@
               <p:cNvPr id="12" name="TextBox 11">
                 <a:extLst>
                   <a:ext uri="{FF2B5EF4-FFF2-40B4-BE49-F238E27FC236}">
-                    <a16:creationId xmlns:a16="http://schemas.microsoft.com/office/drawing/2014/main" id="{7343C678-C484-3EDD-1DC6-CE58A7DE1CC3}"/>
+                    <a16:creationId xmlns:a16="http://schemas.microsoft.com/office/drawing/2014/main" id="{5AE253EF-C9FB-930C-3E41-ED3FAE6F1D73}"/>
                   </a:ext>
                 </a:extLst>
               </p:cNvPr>
@@ -5822,7 +6963,7 @@
               <p:cNvPr id="14" name="TextBox 13">
                 <a:extLst>
                   <a:ext uri="{FF2B5EF4-FFF2-40B4-BE49-F238E27FC236}">
-                    <a16:creationId xmlns:a16="http://schemas.microsoft.com/office/drawing/2014/main" id="{540803A6-FB32-B6F7-3390-5CE259E2BB26}"/>
+                    <a16:creationId xmlns:a16="http://schemas.microsoft.com/office/drawing/2014/main" id="{A92CB0D9-7487-7FBD-E6F0-8E57407A0972}"/>
                   </a:ext>
                 </a:extLst>
               </p:cNvPr>
@@ -5941,7 +7082,7 @@
           <p:cNvPr id="18" name="Connector: Curved 17">
             <a:extLst>
               <a:ext uri="{FF2B5EF4-FFF2-40B4-BE49-F238E27FC236}">
-                <a16:creationId xmlns:a16="http://schemas.microsoft.com/office/drawing/2014/main" id="{6F6EC37A-7B8D-5EE1-9036-B9AC9A239628}"/>
+                <a16:creationId xmlns:a16="http://schemas.microsoft.com/office/drawing/2014/main" id="{E5C1C63A-C6AB-5D4F-1310-D328800AB959}"/>
               </a:ext>
             </a:extLst>
           </p:cNvPr>
@@ -5986,7 +7127,7 @@
           <p:cNvPr id="23" name="Rectangle 22">
             <a:extLst>
               <a:ext uri="{FF2B5EF4-FFF2-40B4-BE49-F238E27FC236}">
-                <a16:creationId xmlns:a16="http://schemas.microsoft.com/office/drawing/2014/main" id="{5916CE32-660B-5DCC-5202-6F2D44C143F6}"/>
+                <a16:creationId xmlns:a16="http://schemas.microsoft.com/office/drawing/2014/main" id="{0A5C3A28-6410-DB81-C57F-E0081159C52E}"/>
               </a:ext>
             </a:extLst>
           </p:cNvPr>
@@ -6038,7 +7179,7 @@
           <p:cNvPr id="26" name="Oval 25">
             <a:extLst>
               <a:ext uri="{FF2B5EF4-FFF2-40B4-BE49-F238E27FC236}">
-                <a16:creationId xmlns:a16="http://schemas.microsoft.com/office/drawing/2014/main" id="{F680068D-CFA7-8195-1FD5-25B8083522F9}"/>
+                <a16:creationId xmlns:a16="http://schemas.microsoft.com/office/drawing/2014/main" id="{9194A509-A61C-E74A-EF20-999EA4FFAFC6}"/>
               </a:ext>
             </a:extLst>
           </p:cNvPr>
@@ -6090,14 +7231,14 @@
           </a:p>
         </p:txBody>
       </p:sp>
-      <mc:AlternateContent xmlns:mc="http://schemas.openxmlformats.org/markup-compatibility/2006">
-        <mc:Choice xmlns:a14="http://schemas.microsoft.com/office/drawing/2010/main" Requires="a14">
+      <mc:AlternateContent xmlns:mc="http://schemas.openxmlformats.org/markup-compatibility/2006" xmlns:a14="http://schemas.microsoft.com/office/drawing/2010/main">
+        <mc:Choice Requires="a14">
           <p:sp>
             <p:nvSpPr>
               <p:cNvPr id="27" name="TextBox 26">
                 <a:extLst>
                   <a:ext uri="{FF2B5EF4-FFF2-40B4-BE49-F238E27FC236}">
-                    <a16:creationId xmlns:a16="http://schemas.microsoft.com/office/drawing/2014/main" id="{8961CCAE-77DA-593D-7405-D4557DB0635E}"/>
+                    <a16:creationId xmlns:a16="http://schemas.microsoft.com/office/drawing/2014/main" id="{73C7B6E7-EA0C-C383-3173-D09B9C31945A}"/>
                   </a:ext>
                 </a:extLst>
               </p:cNvPr>
@@ -6162,13 +7303,7 @@
                         <a:rPr lang="en-US" sz="1600" b="0" i="1" smtClean="0">
                           <a:latin typeface="Cambria Math" panose="02040503050406030204" pitchFamily="18" charset="0"/>
                         </a:rPr>
-                        <m:t>=</m:t>
-                      </m:r>
-                      <m:r>
-                        <a:rPr lang="en-US" sz="1600" b="0" i="1" smtClean="0">
-                          <a:latin typeface="Cambria Math" panose="02040503050406030204" pitchFamily="18" charset="0"/>
-                        </a:rPr>
-                        <m:t>3</m:t>
+                        <m:t>=3</m:t>
                       </m:r>
                     </m:oMath>
                   </m:oMathPara>
@@ -6218,13 +7353,7 @@
                         <a:rPr lang="en-US" sz="1600" b="0" i="1" smtClean="0">
                           <a:latin typeface="Cambria Math" panose="02040503050406030204" pitchFamily="18" charset="0"/>
                         </a:rPr>
-                        <m:t>′=</m:t>
-                      </m:r>
-                      <m:r>
-                        <a:rPr lang="en-US" sz="1600" b="0" i="1" smtClean="0">
-                          <a:latin typeface="Cambria Math" panose="02040503050406030204" pitchFamily="18" charset="0"/>
-                        </a:rPr>
-                        <m:t>4</m:t>
+                        <m:t>′=4</m:t>
                       </m:r>
                     </m:oMath>
                   </m:oMathPara>
@@ -6234,7 +7363,7 @@
             </p:txBody>
           </p:sp>
         </mc:Choice>
-        <mc:Fallback>
+        <mc:Fallback xmlns="">
           <p:sp>
             <p:nvSpPr>
               <p:cNvPr id="27" name="TextBox 26">
@@ -6286,7 +7415,7 @@
               <p:cNvPr id="38" name="TextBox 37">
                 <a:extLst>
                   <a:ext uri="{FF2B5EF4-FFF2-40B4-BE49-F238E27FC236}">
-                    <a16:creationId xmlns:a16="http://schemas.microsoft.com/office/drawing/2014/main" id="{D3BC5B82-7FBD-9898-344E-3E35C6D65860}"/>
+                    <a16:creationId xmlns:a16="http://schemas.microsoft.com/office/drawing/2014/main" id="{E9E25F5C-F6D2-890B-50D8-CB0AFAE7EBF8}"/>
                   </a:ext>
                 </a:extLst>
               </p:cNvPr>
@@ -6451,7 +7580,7 @@
               <p:cNvPr id="44" name="TextBox 43">
                 <a:extLst>
                   <a:ext uri="{FF2B5EF4-FFF2-40B4-BE49-F238E27FC236}">
-                    <a16:creationId xmlns:a16="http://schemas.microsoft.com/office/drawing/2014/main" id="{04C5ED1B-55DB-A027-9B6B-24680E65930F}"/>
+                    <a16:creationId xmlns:a16="http://schemas.microsoft.com/office/drawing/2014/main" id="{90535BFB-4CFC-8436-6486-543E3E91F541}"/>
                   </a:ext>
                 </a:extLst>
               </p:cNvPr>
@@ -6616,7 +7745,7 @@
               <p:cNvPr id="45" name="TextBox 44">
                 <a:extLst>
                   <a:ext uri="{FF2B5EF4-FFF2-40B4-BE49-F238E27FC236}">
-                    <a16:creationId xmlns:a16="http://schemas.microsoft.com/office/drawing/2014/main" id="{BC0786FE-5DBD-F66C-4A12-05695684846D}"/>
+                    <a16:creationId xmlns:a16="http://schemas.microsoft.com/office/drawing/2014/main" id="{1F0A7823-5EC2-BC2F-B9E0-BCC391DFE2C5}"/>
                   </a:ext>
                 </a:extLst>
               </p:cNvPr>
@@ -6779,7 +7908,7 @@
           <p:cNvPr id="2" name="Oval 1">
             <a:extLst>
               <a:ext uri="{FF2B5EF4-FFF2-40B4-BE49-F238E27FC236}">
-                <a16:creationId xmlns:a16="http://schemas.microsoft.com/office/drawing/2014/main" id="{6D933059-E379-E931-B78E-AC5E53C23BD3}"/>
+                <a16:creationId xmlns:a16="http://schemas.microsoft.com/office/drawing/2014/main" id="{6139D74C-C432-50E1-A710-21ECFAD517E3}"/>
               </a:ext>
             </a:extLst>
           </p:cNvPr>
@@ -6831,7 +7960,7 @@
           <p:cNvPr id="3" name="Oval 2">
             <a:extLst>
               <a:ext uri="{FF2B5EF4-FFF2-40B4-BE49-F238E27FC236}">
-                <a16:creationId xmlns:a16="http://schemas.microsoft.com/office/drawing/2014/main" id="{44BED1BC-5F8A-3768-686A-518EB7B751A8}"/>
+                <a16:creationId xmlns:a16="http://schemas.microsoft.com/office/drawing/2014/main" id="{8832E281-DA31-5930-4501-B3A507E899C4}"/>
               </a:ext>
             </a:extLst>
           </p:cNvPr>
@@ -6883,7 +8012,7 @@
           <p:cNvPr id="11" name="Oval 10">
             <a:extLst>
               <a:ext uri="{FF2B5EF4-FFF2-40B4-BE49-F238E27FC236}">
-                <a16:creationId xmlns:a16="http://schemas.microsoft.com/office/drawing/2014/main" id="{2676FB3B-7A42-0577-2F81-DFFBDF9EC511}"/>
+                <a16:creationId xmlns:a16="http://schemas.microsoft.com/office/drawing/2014/main" id="{D040C996-429C-34D9-CB59-F1EAC5004F30}"/>
               </a:ext>
             </a:extLst>
           </p:cNvPr>
@@ -6933,7 +8062,7 @@
     </p:spTree>
     <p:extLst>
       <p:ext uri="{BB962C8B-B14F-4D97-AF65-F5344CB8AC3E}">
-        <p14:creationId xmlns:p14="http://schemas.microsoft.com/office/powerpoint/2010/main" val="2696115594"/>
+        <p14:creationId xmlns:p14="http://schemas.microsoft.com/office/powerpoint/2010/main" val="450548384"/>
       </p:ext>
     </p:extLst>
   </p:cSld>
@@ -6943,7 +8072,7 @@
 </p:sld>
 </file>
 
-<file path=ppt/slides/slide3.xml><?xml version="1.0" encoding="utf-8"?>
+<file path=ppt/slides/slide4.xml><?xml version="1.0" encoding="utf-8"?>
 <p:sld xmlns:a="http://schemas.openxmlformats.org/drawingml/2006/main" xmlns:r="http://schemas.openxmlformats.org/officeDocument/2006/relationships" xmlns:p="http://schemas.openxmlformats.org/presentationml/2006/main">
   <p:cSld>
     <p:spTree>
@@ -9126,7 +10255,7 @@
 </p:sld>
 </file>
 
-<file path=ppt/slides/slide4.xml><?xml version="1.0" encoding="utf-8"?>
+<file path=ppt/slides/slide5.xml><?xml version="1.0" encoding="utf-8"?>
 <p:sld xmlns:a="http://schemas.openxmlformats.org/drawingml/2006/main" xmlns:r="http://schemas.openxmlformats.org/officeDocument/2006/relationships" xmlns:p="http://schemas.openxmlformats.org/presentationml/2006/main">
   <p:cSld>
     <p:spTree>
@@ -11153,7 +12282,67 @@
 </p:sld>
 </file>
 
-<file path=ppt/slides/slide5.xml><?xml version="1.0" encoding="utf-8"?>
+<file path=ppt/slides/slide6.xml><?xml version="1.0" encoding="utf-8"?>
+<p:sld xmlns:a="http://schemas.openxmlformats.org/drawingml/2006/main" xmlns:r="http://schemas.openxmlformats.org/officeDocument/2006/relationships" xmlns:p="http://schemas.openxmlformats.org/presentationml/2006/main">
+  <p:cSld>
+    <p:spTree>
+      <p:nvGrpSpPr>
+        <p:cNvPr id="1" name=""/>
+        <p:cNvGrpSpPr/>
+        <p:nvPr/>
+      </p:nvGrpSpPr>
+      <p:grpSpPr>
+        <a:xfrm>
+          <a:off x="0" y="0"/>
+          <a:ext cx="0" cy="0"/>
+          <a:chOff x="0" y="0"/>
+          <a:chExt cx="0" cy="0"/>
+        </a:xfrm>
+      </p:grpSpPr>
+      <p:pic>
+        <p:nvPicPr>
+          <p:cNvPr id="4" name="Picture 3">
+            <a:extLst>
+              <a:ext uri="{FF2B5EF4-FFF2-40B4-BE49-F238E27FC236}">
+                <a16:creationId xmlns:a16="http://schemas.microsoft.com/office/drawing/2014/main" id="{6D3E8264-DAC1-C739-16BB-72F5099D961D}"/>
+              </a:ext>
+            </a:extLst>
+          </p:cNvPr>
+          <p:cNvPicPr>
+            <a:picLocks noChangeAspect="1"/>
+          </p:cNvPicPr>
+          <p:nvPr/>
+        </p:nvPicPr>
+        <p:blipFill>
+          <a:blip r:embed="rId2"/>
+          <a:stretch>
+            <a:fillRect/>
+          </a:stretch>
+        </p:blipFill>
+        <p:spPr>
+          <a:xfrm>
+            <a:off x="1861961" y="2343818"/>
+            <a:ext cx="8468078" cy="2170364"/>
+          </a:xfrm>
+          <a:prstGeom prst="rect">
+            <a:avLst/>
+          </a:prstGeom>
+        </p:spPr>
+      </p:pic>
+    </p:spTree>
+    <p:extLst>
+      <p:ext uri="{BB962C8B-B14F-4D97-AF65-F5344CB8AC3E}">
+        <p14:creationId xmlns:p14="http://schemas.microsoft.com/office/powerpoint/2010/main" val="2640147942"/>
+      </p:ext>
+    </p:extLst>
+  </p:cSld>
+  <p:clrMapOvr>
+    <a:masterClrMapping/>
+  </p:clrMapOvr>
+</p:sld>
+</file>
+
+<file path=ppt/slides/slide7.xml><?xml version="1.0" encoding="utf-8"?>
 <p:sld xmlns:a="http://schemas.openxmlformats.org/drawingml/2006/main" xmlns:r="http://schemas.openxmlformats.org/officeDocument/2006/relationships" xmlns:p="http://schemas.openxmlformats.org/presentationml/2006/main">
   <p:cSld>
     <p:spTree>
@@ -11368,7 +12557,7 @@
 </p:sld>
 </file>
 
-<file path=ppt/slides/slide6.xml><?xml version="1.0" encoding="utf-8"?>
+<file path=ppt/slides/slide8.xml><?xml version="1.0" encoding="utf-8"?>
 <p:sld xmlns:a="http://schemas.openxmlformats.org/drawingml/2006/main" xmlns:r="http://schemas.openxmlformats.org/officeDocument/2006/relationships" xmlns:p="http://schemas.openxmlformats.org/presentationml/2006/main">
   <p:cSld>
     <p:spTree>
@@ -11583,7 +12772,7 @@
 </p:sld>
 </file>
 
-<file path=ppt/slides/slide7.xml><?xml version="1.0" encoding="utf-8"?>
+<file path=ppt/slides/slide9.xml><?xml version="1.0" encoding="utf-8"?>
 <p:sld xmlns:a="http://schemas.openxmlformats.org/drawingml/2006/main" xmlns:r="http://schemas.openxmlformats.org/officeDocument/2006/relationships" xmlns:p="http://schemas.openxmlformats.org/presentationml/2006/main">
   <p:cSld>
     <p:spTree>

</xml_diff>